<commit_message>
Imported other parts of presentation
</commit_message>
<xml_diff>
--- a/doc/pres2/wk8-progress.pptx
+++ b/doc/pres2/wk8-progress.pptx
@@ -5,10 +5,10 @@
     <p:sldMasterId id="2147483648" r:id="rId1"/>
   </p:sldMasterIdLst>
   <p:notesMasterIdLst>
-    <p:notesMasterId r:id="rId17"/>
+    <p:notesMasterId r:id="rId19"/>
   </p:notesMasterIdLst>
   <p:handoutMasterIdLst>
-    <p:handoutMasterId r:id="rId18"/>
+    <p:handoutMasterId r:id="rId20"/>
   </p:handoutMasterIdLst>
   <p:sldIdLst>
     <p:sldId id="256" r:id="rId2"/>
@@ -16,16 +16,18 @@
     <p:sldId id="257" r:id="rId4"/>
     <p:sldId id="264" r:id="rId5"/>
     <p:sldId id="279" r:id="rId6"/>
-    <p:sldId id="280" r:id="rId7"/>
-    <p:sldId id="281" r:id="rId8"/>
-    <p:sldId id="282" r:id="rId9"/>
-    <p:sldId id="285" r:id="rId10"/>
-    <p:sldId id="283" r:id="rId11"/>
-    <p:sldId id="284" r:id="rId12"/>
-    <p:sldId id="265" r:id="rId13"/>
-    <p:sldId id="270" r:id="rId14"/>
-    <p:sldId id="272" r:id="rId15"/>
-    <p:sldId id="273" r:id="rId16"/>
+    <p:sldId id="286" r:id="rId7"/>
+    <p:sldId id="287" r:id="rId8"/>
+    <p:sldId id="280" r:id="rId9"/>
+    <p:sldId id="281" r:id="rId10"/>
+    <p:sldId id="282" r:id="rId11"/>
+    <p:sldId id="285" r:id="rId12"/>
+    <p:sldId id="283" r:id="rId13"/>
+    <p:sldId id="284" r:id="rId14"/>
+    <p:sldId id="265" r:id="rId15"/>
+    <p:sldId id="270" r:id="rId16"/>
+    <p:sldId id="272" r:id="rId17"/>
+    <p:sldId id="273" r:id="rId18"/>
   </p:sldIdLst>
   <p:sldSz cx="9144000" cy="6858000" type="screen4x3"/>
   <p:notesSz cx="6858000" cy="9144000"/>
@@ -229,7 +231,7 @@
             <a:fld id="{18F98EB7-082C-9949-BFCA-B4BAD2D6FDBD}" type="datetimeFigureOut">
               <a:rPr lang="en-US" smtClean="0"/>
               <a:pPr/>
-              <a:t>11/16/2012</a:t>
+              <a:t>11/19/2012</a:t>
             </a:fld>
             <a:endParaRPr lang="en-US"/>
           </a:p>
@@ -305,7 +307,7 @@
     </p:spTree>
     <p:extLst>
       <p:ext uri="{BB962C8B-B14F-4D97-AF65-F5344CB8AC3E}">
-        <p14:creationId xmlns:p14="http://schemas.microsoft.com/office/powerpoint/2010/main" xmlns="" val="1901348598"/>
+        <p14:creationId xmlns:p14="http://schemas.microsoft.com/office/powerpoint/2010/main" val="1901348598"/>
       </p:ext>
     </p:extLst>
   </p:cSld>
@@ -396,7 +398,7 @@
             <a:fld id="{5C465251-34BA-484B-BD29-7371F8FBFAE2}" type="datetimeFigureOut">
               <a:rPr lang="en-GB" smtClean="0"/>
               <a:pPr/>
-              <a:t>16/11/2012</a:t>
+              <a:t>19/11/2012</a:t>
             </a:fld>
             <a:endParaRPr lang="en-GB"/>
           </a:p>
@@ -567,7 +569,7 @@
     </p:spTree>
     <p:extLst>
       <p:ext uri="{BB962C8B-B14F-4D97-AF65-F5344CB8AC3E}">
-        <p14:creationId xmlns:p14="http://schemas.microsoft.com/office/powerpoint/2010/main" xmlns="" val="1219798393"/>
+        <p14:creationId xmlns:p14="http://schemas.microsoft.com/office/powerpoint/2010/main" val="1219798393"/>
       </p:ext>
     </p:extLst>
   </p:cSld>
@@ -849,7 +851,7 @@
             <a:fld id="{9B2BCD74-F7F5-4BD6-83D7-1EBC56D75222}" type="datetimeFigureOut">
               <a:rPr lang="en-GB" smtClean="0"/>
               <a:pPr/>
-              <a:t>16/11/2012</a:t>
+              <a:t>19/11/2012</a:t>
             </a:fld>
             <a:endParaRPr lang="en-GB"/>
           </a:p>
@@ -1023,7 +1025,7 @@
             <a:fld id="{9B2BCD74-F7F5-4BD6-83D7-1EBC56D75222}" type="datetimeFigureOut">
               <a:rPr lang="en-GB" smtClean="0"/>
               <a:pPr/>
-              <a:t>16/11/2012</a:t>
+              <a:t>19/11/2012</a:t>
             </a:fld>
             <a:endParaRPr lang="en-GB"/>
           </a:p>
@@ -1200,7 +1202,7 @@
             <a:fld id="{9B2BCD74-F7F5-4BD6-83D7-1EBC56D75222}" type="datetimeFigureOut">
               <a:rPr lang="en-GB" smtClean="0"/>
               <a:pPr/>
-              <a:t>16/11/2012</a:t>
+              <a:t>19/11/2012</a:t>
             </a:fld>
             <a:endParaRPr lang="en-GB"/>
           </a:p>
@@ -1367,7 +1369,7 @@
             <a:fld id="{9B2BCD74-F7F5-4BD6-83D7-1EBC56D75222}" type="datetimeFigureOut">
               <a:rPr lang="en-GB" smtClean="0"/>
               <a:pPr/>
-              <a:t>16/11/2012</a:t>
+              <a:t>19/11/2012</a:t>
             </a:fld>
             <a:endParaRPr lang="en-GB"/>
           </a:p>
@@ -1610,7 +1612,7 @@
             <a:fld id="{9B2BCD74-F7F5-4BD6-83D7-1EBC56D75222}" type="datetimeFigureOut">
               <a:rPr lang="en-GB" smtClean="0"/>
               <a:pPr/>
-              <a:t>16/11/2012</a:t>
+              <a:t>19/11/2012</a:t>
             </a:fld>
             <a:endParaRPr lang="en-GB"/>
           </a:p>
@@ -1895,7 +1897,7 @@
             <a:fld id="{9B2BCD74-F7F5-4BD6-83D7-1EBC56D75222}" type="datetimeFigureOut">
               <a:rPr lang="en-GB" smtClean="0"/>
               <a:pPr/>
-              <a:t>16/11/2012</a:t>
+              <a:t>19/11/2012</a:t>
             </a:fld>
             <a:endParaRPr lang="en-GB"/>
           </a:p>
@@ -2314,7 +2316,7 @@
             <a:fld id="{9B2BCD74-F7F5-4BD6-83D7-1EBC56D75222}" type="datetimeFigureOut">
               <a:rPr lang="en-GB" smtClean="0"/>
               <a:pPr/>
-              <a:t>16/11/2012</a:t>
+              <a:t>19/11/2012</a:t>
             </a:fld>
             <a:endParaRPr lang="en-GB"/>
           </a:p>
@@ -2429,7 +2431,7 @@
             <a:fld id="{9B2BCD74-F7F5-4BD6-83D7-1EBC56D75222}" type="datetimeFigureOut">
               <a:rPr lang="en-GB" smtClean="0"/>
               <a:pPr/>
-              <a:t>16/11/2012</a:t>
+              <a:t>19/11/2012</a:t>
             </a:fld>
             <a:endParaRPr lang="en-GB"/>
           </a:p>
@@ -2521,7 +2523,7 @@
             <a:fld id="{9B2BCD74-F7F5-4BD6-83D7-1EBC56D75222}" type="datetimeFigureOut">
               <a:rPr lang="en-GB" smtClean="0"/>
               <a:pPr/>
-              <a:t>16/11/2012</a:t>
+              <a:t>19/11/2012</a:t>
             </a:fld>
             <a:endParaRPr lang="en-GB"/>
           </a:p>
@@ -2795,7 +2797,7 @@
             <a:fld id="{9B2BCD74-F7F5-4BD6-83D7-1EBC56D75222}" type="datetimeFigureOut">
               <a:rPr lang="en-GB" smtClean="0"/>
               <a:pPr/>
-              <a:t>16/11/2012</a:t>
+              <a:t>19/11/2012</a:t>
             </a:fld>
             <a:endParaRPr lang="en-GB"/>
           </a:p>
@@ -3045,7 +3047,7 @@
             <a:fld id="{9B2BCD74-F7F5-4BD6-83D7-1EBC56D75222}" type="datetimeFigureOut">
               <a:rPr lang="en-GB" smtClean="0"/>
               <a:pPr/>
-              <a:t>16/11/2012</a:t>
+              <a:t>19/11/2012</a:t>
             </a:fld>
             <a:endParaRPr lang="en-GB"/>
           </a:p>
@@ -3270,7 +3272,7 @@
             <a:fld id="{9B2BCD74-F7F5-4BD6-83D7-1EBC56D75222}" type="datetimeFigureOut">
               <a:rPr lang="en-GB" smtClean="0"/>
               <a:pPr/>
-              <a:t>16/11/2012</a:t>
+              <a:t>19/11/2012</a:t>
             </a:fld>
             <a:endParaRPr lang="en-GB"/>
           </a:p>
@@ -3697,15 +3699,7 @@
           <a:p>
             <a:r>
               <a:rPr lang="en-GB" dirty="0" smtClean="0"/>
-              <a:t>Week </a:t>
-            </a:r>
-            <a:r>
-              <a:rPr lang="en-GB" dirty="0" smtClean="0"/>
-              <a:t>8 </a:t>
-            </a:r>
-            <a:r>
-              <a:rPr lang="en-GB" dirty="0" smtClean="0"/>
-              <a:t>Progress Seminar</a:t>
+              <a:t>Week 8 Progress Seminar</a:t>
             </a:r>
             <a:endParaRPr lang="en-GB" dirty="0"/>
           </a:p>
@@ -3760,7 +3754,7 @@
           <a:p>
             <a:r>
               <a:rPr lang="en-GB" dirty="0" smtClean="0"/>
-              <a:t>Framework Integration</a:t>
+              <a:t>Good/Bad URL Lists</a:t>
             </a:r>
             <a:endParaRPr lang="en-GB" dirty="0"/>
           </a:p>
@@ -3827,7 +3821,7 @@
           <a:p>
             <a:r>
               <a:rPr lang="en-GB" dirty="0" smtClean="0"/>
-              <a:t>Storage of Analysis Results</a:t>
+              <a:t>Capture-HPC</a:t>
             </a:r>
             <a:endParaRPr lang="en-GB" dirty="0"/>
           </a:p>
@@ -3848,7 +3842,34 @@
           <a:bodyPr/>
           <a:lstStyle/>
           <a:p>
-            <a:endParaRPr lang="en-GB"/>
+            <a:r>
+              <a:rPr lang="en-GB" dirty="0" smtClean="0"/>
+              <a:t>Open source high-interaction “client honeypot”</a:t>
+            </a:r>
+          </a:p>
+          <a:p>
+            <a:r>
+              <a:rPr lang="en-GB" dirty="0" smtClean="0"/>
+              <a:t>Uses VM APIs combined with kernel drivers to automatically browse for malicious sites.</a:t>
+            </a:r>
+          </a:p>
+          <a:p>
+            <a:r>
+              <a:rPr lang="en-GB" dirty="0" smtClean="0"/>
+              <a:t>Slow, but provides high quality emulation of a vulnerable </a:t>
+            </a:r>
+            <a:r>
+              <a:rPr lang="en-GB" dirty="0" err="1" smtClean="0"/>
+              <a:t>envrionment</a:t>
+            </a:r>
+            <a:endParaRPr lang="en-GB" dirty="0" smtClean="0"/>
+          </a:p>
+          <a:p>
+            <a:r>
+              <a:rPr lang="en-GB" dirty="0" smtClean="0"/>
+              <a:t>Required customisation for ECS infrastructure.</a:t>
+            </a:r>
+            <a:endParaRPr lang="en-GB" dirty="0"/>
           </a:p>
         </p:txBody>
       </p:sp>
@@ -3894,7 +3915,7 @@
           <a:p>
             <a:r>
               <a:rPr lang="en-GB" dirty="0" smtClean="0"/>
-              <a:t>Malware Analysis Demo??!</a:t>
+              <a:t>Framework Integration</a:t>
             </a:r>
             <a:endParaRPr lang="en-GB" dirty="0"/>
           </a:p>
@@ -3902,7 +3923,7 @@
       </p:sp>
       <p:sp>
         <p:nvSpPr>
-          <p:cNvPr id="5" name="Content Placeholder 4"/>
+          <p:cNvPr id="3" name="Content Placeholder 2"/>
           <p:cNvSpPr>
             <a:spLocks noGrp="1"/>
           </p:cNvSpPr>
@@ -3915,25 +3936,15 @@
           <a:bodyPr/>
           <a:lstStyle/>
           <a:p>
-            <a:endParaRPr lang="en-GB" dirty="0"/>
+            <a:endParaRPr lang="en-GB"/>
           </a:p>
         </p:txBody>
       </p:sp>
     </p:spTree>
-    <p:controls>
-      <p:control spid="1026" name="ShockwaveFlash1" r:id="rId2" imgW="8207280" imgH="5183280"/>
-    </p:controls>
   </p:cSld>
   <p:clrMapOvr>
     <a:masterClrMapping/>
   </p:clrMapOvr>
-  <p:timing>
-    <p:tnLst>
-      <p:par>
-        <p:cTn id="1" dur="indefinite" restart="never" nodeType="tmRoot"/>
-      </p:par>
-    </p:tnLst>
-  </p:timing>
 </p:sld>
 </file>
 
@@ -3971,7 +3982,7 @@
           <a:p>
             <a:r>
               <a:rPr lang="en-GB" dirty="0" smtClean="0"/>
-              <a:t>Remaining Work</a:t>
+              <a:t>Storage of Analysis Results</a:t>
             </a:r>
             <a:endParaRPr lang="en-GB" dirty="0"/>
           </a:p>
@@ -3992,52 +4003,7 @@
           <a:bodyPr/>
           <a:lstStyle/>
           <a:p>
-            <a:r>
-              <a:rPr lang="en-GB" dirty="0" smtClean="0"/>
-              <a:t>Web Reporting interface</a:t>
-            </a:r>
-          </a:p>
-          <a:p>
-            <a:pPr lvl="1"/>
-            <a:r>
-              <a:rPr lang="en-GB" dirty="0" smtClean="0"/>
-              <a:t>Graphing</a:t>
-            </a:r>
-          </a:p>
-          <a:p>
-            <a:r>
-              <a:rPr lang="en-GB" dirty="0" smtClean="0"/>
-              <a:t>Compile </a:t>
-            </a:r>
-            <a:r>
-              <a:rPr lang="en-GB" dirty="0" smtClean="0"/>
-              <a:t>sample data for </a:t>
-            </a:r>
-            <a:r>
-              <a:rPr lang="en-GB" dirty="0" smtClean="0"/>
-              <a:t>report</a:t>
-            </a:r>
-          </a:p>
-          <a:p>
-            <a:r>
-              <a:rPr lang="en-GB" dirty="0" smtClean="0"/>
-              <a:t>Produce Report</a:t>
-            </a:r>
-          </a:p>
-          <a:p>
-            <a:pPr lvl="1"/>
-            <a:r>
-              <a:rPr lang="en-GB" dirty="0" smtClean="0"/>
-              <a:t>Latex template already produce</a:t>
-            </a:r>
-          </a:p>
-          <a:p>
-            <a:pPr lvl="1"/>
-            <a:r>
-              <a:rPr lang="en-GB" dirty="0" smtClean="0"/>
-              <a:t>Including productivity tools??!</a:t>
-            </a:r>
-            <a:endParaRPr lang="en-GB" dirty="0" smtClean="0"/>
+            <a:endParaRPr lang="en-GB"/>
           </a:p>
         </p:txBody>
       </p:sp>
@@ -4046,13 +4012,6 @@
   <p:clrMapOvr>
     <a:masterClrMapping/>
   </p:clrMapOvr>
-  <p:timing>
-    <p:tnLst>
-      <p:par>
-        <p:cTn id="1" dur="indefinite" restart="never" nodeType="tmRoot"/>
-      </p:par>
-    </p:tnLst>
-  </p:timing>
 </p:sld>
 </file>
 
@@ -4080,17 +4039,17 @@
             <a:spLocks noGrp="1"/>
           </p:cNvSpPr>
           <p:nvPr>
-            <p:ph type="ctrTitle"/>
-          </p:nvPr>
-        </p:nvSpPr>
-        <p:spPr/>
-        <p:txBody>
-          <a:bodyPr/>
-          <a:lstStyle/>
-          <a:p>
-            <a:r>
-              <a:rPr lang="en-GB" dirty="0" smtClean="0"/>
-              <a:t>Any Questions?</a:t>
+            <p:ph type="title"/>
+          </p:nvPr>
+        </p:nvSpPr>
+        <p:spPr/>
+        <p:txBody>
+          <a:bodyPr/>
+          <a:lstStyle/>
+          <a:p>
+            <a:r>
+              <a:rPr lang="en-GB" dirty="0" smtClean="0"/>
+              <a:t>Malware Analysis Demo??!</a:t>
             </a:r>
             <a:endParaRPr lang="en-GB" dirty="0"/>
           </a:p>
@@ -4098,20 +4057,190 @@
       </p:sp>
       <p:sp>
         <p:nvSpPr>
-          <p:cNvPr id="3" name="Subtitle 2"/>
-          <p:cNvSpPr>
-            <a:spLocks noGrp="1"/>
-          </p:cNvSpPr>
-          <p:nvPr>
-            <p:ph type="subTitle" idx="1"/>
-          </p:nvPr>
-        </p:nvSpPr>
-        <p:spPr/>
-        <p:txBody>
-          <a:bodyPr/>
-          <a:lstStyle/>
-          <a:p>
-            <a:endParaRPr lang="en-GB"/>
+          <p:cNvPr id="5" name="Content Placeholder 4"/>
+          <p:cNvSpPr>
+            <a:spLocks noGrp="1"/>
+          </p:cNvSpPr>
+          <p:nvPr>
+            <p:ph idx="1"/>
+          </p:nvPr>
+        </p:nvSpPr>
+        <p:spPr/>
+        <p:txBody>
+          <a:bodyPr/>
+          <a:lstStyle/>
+          <a:p>
+            <a:endParaRPr lang="en-GB" dirty="0"/>
+          </a:p>
+        </p:txBody>
+      </p:sp>
+    </p:spTree>
+    <p:controls>
+      <mc:AlternateContent xmlns:mc="http://schemas.openxmlformats.org/markup-compatibility/2006">
+        <mc:Choice xmlns:v="urn:schemas-microsoft-com:vml" Requires="v">
+          <p:control spid="1026" r:id="rId2" imgW="8207280" imgH="5183280"/>
+        </mc:Choice>
+        <mc:Fallback>
+          <p:control r:id="rId2" imgW="8207280" imgH="5183280">
+            <p:pic>
+              <p:nvPicPr>
+                <p:cNvPr id="0" name="ShockwaveFlash1"/>
+                <p:cNvPicPr preferRelativeResize="0">
+                  <a:picLocks noChangeArrowheads="1" noChangeShapeType="1"/>
+                </p:cNvPicPr>
+                <p:nvPr/>
+              </p:nvPicPr>
+              <p:blipFill>
+                <a:blip r:embed="rId4">
+                  <a:extLst>
+                    <a:ext uri="{28A0092B-C50C-407E-A947-70E740481C1C}">
+                      <a14:useLocalDpi xmlns:a14="http://schemas.microsoft.com/office/drawing/2010/main" val="0"/>
+                    </a:ext>
+                  </a:extLst>
+                </a:blip>
+                <a:srcRect/>
+                <a:stretch>
+                  <a:fillRect/>
+                </a:stretch>
+              </p:blipFill>
+              <p:spPr bwMode="auto">
+                <a:xfrm>
+                  <a:off x="468313" y="1341438"/>
+                  <a:ext cx="8207375" cy="5183187"/>
+                </a:xfrm>
+                <a:prstGeom prst="rect">
+                  <a:avLst/>
+                </a:prstGeom>
+                <a:noFill/>
+                <a:ln w="9525">
+                  <a:miter lim="800000"/>
+                  <a:headEnd/>
+                  <a:tailEnd/>
+                </a:ln>
+                <a:effectLst/>
+                <a:extLst>
+                  <a:ext uri="{AF507438-7753-43E0-B8FC-AC1667EBCBE1}">
+                    <a14:hiddenEffects xmlns:a14="http://schemas.microsoft.com/office/drawing/2010/main">
+                      <a:effectLst>
+                        <a:outerShdw dist="35921" dir="2700000" algn="ctr" rotWithShape="0">
+                          <a:schemeClr val="bg2"/>
+                        </a:outerShdw>
+                      </a:effectLst>
+                    </a14:hiddenEffects>
+                  </a:ext>
+                </a:extLst>
+              </p:spPr>
+            </p:pic>
+          </p:control>
+        </mc:Fallback>
+      </mc:AlternateContent>
+    </p:controls>
+  </p:cSld>
+  <p:clrMapOvr>
+    <a:masterClrMapping/>
+  </p:clrMapOvr>
+  <p:timing>
+    <p:tnLst>
+      <p:par>
+        <p:cTn id="1" dur="indefinite" restart="never" nodeType="tmRoot"/>
+      </p:par>
+    </p:tnLst>
+  </p:timing>
+</p:sld>
+</file>
+
+<file path=ppt/slides/slide15.xml><?xml version="1.0" encoding="utf-8"?>
+<p:sld xmlns:a="http://schemas.openxmlformats.org/drawingml/2006/main" xmlns:r="http://schemas.openxmlformats.org/officeDocument/2006/relationships" xmlns:p="http://schemas.openxmlformats.org/presentationml/2006/main">
+  <p:cSld>
+    <p:spTree>
+      <p:nvGrpSpPr>
+        <p:cNvPr id="1" name=""/>
+        <p:cNvGrpSpPr/>
+        <p:nvPr/>
+      </p:nvGrpSpPr>
+      <p:grpSpPr>
+        <a:xfrm>
+          <a:off x="0" y="0"/>
+          <a:ext cx="0" cy="0"/>
+          <a:chOff x="0" y="0"/>
+          <a:chExt cx="0" cy="0"/>
+        </a:xfrm>
+      </p:grpSpPr>
+      <p:sp>
+        <p:nvSpPr>
+          <p:cNvPr id="2" name="Title 1"/>
+          <p:cNvSpPr>
+            <a:spLocks noGrp="1"/>
+          </p:cNvSpPr>
+          <p:nvPr>
+            <p:ph type="title"/>
+          </p:nvPr>
+        </p:nvSpPr>
+        <p:spPr/>
+        <p:txBody>
+          <a:bodyPr/>
+          <a:lstStyle/>
+          <a:p>
+            <a:r>
+              <a:rPr lang="en-GB" dirty="0" smtClean="0"/>
+              <a:t>Remaining Work</a:t>
+            </a:r>
+            <a:endParaRPr lang="en-GB" dirty="0"/>
+          </a:p>
+        </p:txBody>
+      </p:sp>
+      <p:sp>
+        <p:nvSpPr>
+          <p:cNvPr id="3" name="Content Placeholder 2"/>
+          <p:cNvSpPr>
+            <a:spLocks noGrp="1"/>
+          </p:cNvSpPr>
+          <p:nvPr>
+            <p:ph idx="1"/>
+          </p:nvPr>
+        </p:nvSpPr>
+        <p:spPr/>
+        <p:txBody>
+          <a:bodyPr/>
+          <a:lstStyle/>
+          <a:p>
+            <a:r>
+              <a:rPr lang="en-GB" dirty="0" smtClean="0"/>
+              <a:t>Web Reporting interface</a:t>
+            </a:r>
+          </a:p>
+          <a:p>
+            <a:pPr lvl="1"/>
+            <a:r>
+              <a:rPr lang="en-GB" dirty="0" smtClean="0"/>
+              <a:t>Graphing</a:t>
+            </a:r>
+          </a:p>
+          <a:p>
+            <a:r>
+              <a:rPr lang="en-GB" dirty="0" smtClean="0"/>
+              <a:t>Compile sample data for report</a:t>
+            </a:r>
+          </a:p>
+          <a:p>
+            <a:r>
+              <a:rPr lang="en-GB" dirty="0" smtClean="0"/>
+              <a:t>Produce Report</a:t>
+            </a:r>
+          </a:p>
+          <a:p>
+            <a:pPr lvl="1"/>
+            <a:r>
+              <a:rPr lang="en-GB" dirty="0" smtClean="0"/>
+              <a:t>Latex template already produce</a:t>
+            </a:r>
+          </a:p>
+          <a:p>
+            <a:pPr lvl="1"/>
+            <a:r>
+              <a:rPr lang="en-GB" dirty="0" smtClean="0"/>
+              <a:t>Including productivity tools??!</a:t>
+            </a:r>
           </a:p>
         </p:txBody>
       </p:sp>
@@ -4130,7 +4259,81 @@
 </p:sld>
 </file>
 
-<file path=ppt/slides/slide15.xml><?xml version="1.0" encoding="utf-8"?>
+<file path=ppt/slides/slide16.xml><?xml version="1.0" encoding="utf-8"?>
+<p:sld xmlns:a="http://schemas.openxmlformats.org/drawingml/2006/main" xmlns:r="http://schemas.openxmlformats.org/officeDocument/2006/relationships" xmlns:p="http://schemas.openxmlformats.org/presentationml/2006/main">
+  <p:cSld>
+    <p:spTree>
+      <p:nvGrpSpPr>
+        <p:cNvPr id="1" name=""/>
+        <p:cNvGrpSpPr/>
+        <p:nvPr/>
+      </p:nvGrpSpPr>
+      <p:grpSpPr>
+        <a:xfrm>
+          <a:off x="0" y="0"/>
+          <a:ext cx="0" cy="0"/>
+          <a:chOff x="0" y="0"/>
+          <a:chExt cx="0" cy="0"/>
+        </a:xfrm>
+      </p:grpSpPr>
+      <p:sp>
+        <p:nvSpPr>
+          <p:cNvPr id="2" name="Title 1"/>
+          <p:cNvSpPr>
+            <a:spLocks noGrp="1"/>
+          </p:cNvSpPr>
+          <p:nvPr>
+            <p:ph type="ctrTitle"/>
+          </p:nvPr>
+        </p:nvSpPr>
+        <p:spPr/>
+        <p:txBody>
+          <a:bodyPr/>
+          <a:lstStyle/>
+          <a:p>
+            <a:r>
+              <a:rPr lang="en-GB" dirty="0" smtClean="0"/>
+              <a:t>Any Questions?</a:t>
+            </a:r>
+            <a:endParaRPr lang="en-GB" dirty="0"/>
+          </a:p>
+        </p:txBody>
+      </p:sp>
+      <p:sp>
+        <p:nvSpPr>
+          <p:cNvPr id="3" name="Subtitle 2"/>
+          <p:cNvSpPr>
+            <a:spLocks noGrp="1"/>
+          </p:cNvSpPr>
+          <p:nvPr>
+            <p:ph type="subTitle" idx="1"/>
+          </p:nvPr>
+        </p:nvSpPr>
+        <p:spPr/>
+        <p:txBody>
+          <a:bodyPr/>
+          <a:lstStyle/>
+          <a:p>
+            <a:endParaRPr lang="en-GB"/>
+          </a:p>
+        </p:txBody>
+      </p:sp>
+    </p:spTree>
+  </p:cSld>
+  <p:clrMapOvr>
+    <a:masterClrMapping/>
+  </p:clrMapOvr>
+  <p:timing>
+    <p:tnLst>
+      <p:par>
+        <p:cTn id="1" dur="indefinite" restart="never" nodeType="tmRoot"/>
+      </p:par>
+    </p:tnLst>
+  </p:timing>
+</p:sld>
+</file>
+
+<file path=ppt/slides/slide17.xml><?xml version="1.0" encoding="utf-8"?>
 <p:sld xmlns:a="http://schemas.openxmlformats.org/drawingml/2006/main" xmlns:r="http://schemas.openxmlformats.org/officeDocument/2006/relationships" xmlns:p="http://schemas.openxmlformats.org/presentationml/2006/main">
   <p:cSld>
     <p:spTree>
@@ -4421,51 +4624,48 @@
             </a:r>
           </a:p>
           <a:p>
+            <a:r>
+              <a:rPr lang="en-GB" dirty="0" smtClean="0"/>
+              <a:t>Is </a:t>
+            </a:r>
+            <a:r>
+              <a:rPr lang="en-GB" dirty="0" smtClean="0"/>
+              <a:t>Malware targeted towards trends?</a:t>
+            </a:r>
+          </a:p>
+          <a:p>
+            <a:r>
+              <a:rPr lang="en-GB" dirty="0" smtClean="0"/>
+              <a:t>Distributed Framework</a:t>
+            </a:r>
+          </a:p>
+          <a:p>
             <a:pPr lvl="1"/>
             <a:r>
               <a:rPr lang="en-GB" dirty="0" smtClean="0"/>
-              <a:t>Twitter</a:t>
+              <a:t>Gather Trends</a:t>
             </a:r>
           </a:p>
           <a:p>
             <a:pPr lvl="1"/>
             <a:r>
               <a:rPr lang="en-GB" dirty="0" smtClean="0"/>
-              <a:t>Media</a:t>
+              <a:t>Get URLs associated with trends</a:t>
             </a:r>
           </a:p>
           <a:p>
             <a:pPr lvl="1"/>
             <a:r>
               <a:rPr lang="en-GB" dirty="0" smtClean="0"/>
-              <a:t>Google</a:t>
-            </a:r>
-            <a:endParaRPr lang="en-GB" dirty="0"/>
-          </a:p>
-          <a:p>
-            <a:r>
-              <a:rPr lang="en-GB" dirty="0" smtClean="0"/>
-              <a:t>Is Malware targeted towards trends?</a:t>
-            </a:r>
-          </a:p>
-          <a:p>
-            <a:pPr lvl="1"/>
-            <a:r>
-              <a:rPr lang="en-GB" dirty="0" smtClean="0"/>
-              <a:t>Emma Watson =&gt; Malware?</a:t>
-            </a:r>
-          </a:p>
-          <a:p>
-            <a:pPr lvl="1"/>
-            <a:r>
-              <a:rPr lang="en-GB" dirty="0" smtClean="0"/>
-              <a:t>McAfee Report</a:t>
-            </a:r>
-          </a:p>
-          <a:p>
-            <a:r>
-              <a:rPr lang="en-GB" dirty="0" smtClean="0"/>
-              <a:t>Build Distributed Framework</a:t>
+              <a:t>Analyse URLs </a:t>
+            </a:r>
+            <a:r>
+              <a:rPr lang="en-GB" smtClean="0"/>
+              <a:t>for malicious </a:t>
+            </a:r>
+            <a:r>
+              <a:rPr lang="en-GB" dirty="0" smtClean="0"/>
+              <a:t>content</a:t>
             </a:r>
           </a:p>
         </p:txBody>
@@ -5194,10 +5394,80 @@
         </p:nvSpPr>
         <p:spPr/>
         <p:txBody>
-          <a:bodyPr/>
-          <a:lstStyle/>
-          <a:p>
-            <a:endParaRPr lang="en-GB"/>
+          <a:bodyPr>
+            <a:normAutofit/>
+          </a:bodyPr>
+          <a:lstStyle/>
+          <a:p>
+            <a:r>
+              <a:rPr lang="en-GB" dirty="0"/>
+              <a:t>Malware detection based on repetition of the trendy keyword</a:t>
+            </a:r>
+            <a:r>
+              <a:rPr lang="en-GB" dirty="0" smtClean="0"/>
+              <a:t>:</a:t>
+            </a:r>
+            <a:endParaRPr lang="en-GB" dirty="0"/>
+          </a:p>
+          <a:p>
+            <a:pPr lvl="1"/>
+            <a:r>
+              <a:rPr lang="en-GB" dirty="0" smtClean="0"/>
+              <a:t>Analyse </a:t>
+            </a:r>
+            <a:r>
+              <a:rPr lang="en-GB" dirty="0"/>
+              <a:t>the content of the given URL (Crawling</a:t>
+            </a:r>
+            <a:r>
+              <a:rPr lang="en-GB" dirty="0" smtClean="0"/>
+              <a:t>)</a:t>
+            </a:r>
+            <a:endParaRPr lang="en-GB" dirty="0"/>
+          </a:p>
+          <a:p>
+            <a:pPr lvl="1"/>
+            <a:r>
+              <a:rPr lang="en-GB" dirty="0" smtClean="0"/>
+              <a:t>Check </a:t>
+            </a:r>
+            <a:r>
+              <a:rPr lang="en-GB" dirty="0"/>
+              <a:t>content of each hyperlink on the </a:t>
+            </a:r>
+            <a:r>
+              <a:rPr lang="en-GB" dirty="0" smtClean="0"/>
+              <a:t>webpage</a:t>
+            </a:r>
+            <a:endParaRPr lang="en-GB" dirty="0"/>
+          </a:p>
+          <a:p>
+            <a:pPr lvl="1"/>
+            <a:r>
+              <a:rPr lang="en-GB" dirty="0" smtClean="0"/>
+              <a:t>Consider </a:t>
+            </a:r>
+            <a:r>
+              <a:rPr lang="en-GB" dirty="0"/>
+              <a:t>frequently of reappearances of trendy </a:t>
+            </a:r>
+            <a:r>
+              <a:rPr lang="en-GB" dirty="0" smtClean="0"/>
+              <a:t>keyword</a:t>
+            </a:r>
+            <a:endParaRPr lang="en-GB" dirty="0"/>
+          </a:p>
+          <a:p>
+            <a:pPr lvl="1"/>
+            <a:r>
+              <a:rPr lang="en-GB" dirty="0" smtClean="0"/>
+              <a:t>Used </a:t>
+            </a:r>
+            <a:r>
+              <a:rPr lang="en-GB" dirty="0"/>
+              <a:t>the result of this algorithm for URL classification</a:t>
+            </a:r>
+            <a:endParaRPr lang="en-GB" dirty="0"/>
           </a:p>
         </p:txBody>
       </p:sp>
@@ -5243,32 +5513,47 @@
           <a:p>
             <a:r>
               <a:rPr lang="en-GB" dirty="0" smtClean="0"/>
-              <a:t>Internet Explorer under Wine</a:t>
+              <a:t>URL Classification</a:t>
             </a:r>
             <a:endParaRPr lang="en-GB" dirty="0"/>
           </a:p>
         </p:txBody>
       </p:sp>
-      <p:sp>
-        <p:nvSpPr>
-          <p:cNvPr id="3" name="Content Placeholder 2"/>
-          <p:cNvSpPr>
-            <a:spLocks noGrp="1"/>
-          </p:cNvSpPr>
+      <p:pic>
+        <p:nvPicPr>
+          <p:cNvPr id="4" name="Content Placeholder 3"/>
+          <p:cNvPicPr>
+            <a:picLocks noGrp="1" noChangeAspect="1"/>
+          </p:cNvPicPr>
           <p:nvPr>
             <p:ph idx="1"/>
           </p:nvPr>
-        </p:nvSpPr>
-        <p:spPr/>
-        <p:txBody>
-          <a:bodyPr/>
-          <a:lstStyle/>
-          <a:p>
-            <a:endParaRPr lang="en-GB"/>
-          </a:p>
-        </p:txBody>
-      </p:sp>
+        </p:nvPicPr>
+        <p:blipFill>
+          <a:blip r:embed="rId2">
+            <a:extLst>
+              <a:ext uri="{28A0092B-C50C-407E-A947-70E740481C1C}">
+                <a14:useLocalDpi xmlns:a14="http://schemas.microsoft.com/office/drawing/2010/main" val="0"/>
+              </a:ext>
+            </a:extLst>
+          </a:blip>
+          <a:stretch>
+            <a:fillRect/>
+          </a:stretch>
+        </p:blipFill>
+        <p:spPr>
+          <a:xfrm>
+            <a:off x="1547664" y="1292996"/>
+            <a:ext cx="6048672" cy="5140372"/>
+          </a:xfrm>
+        </p:spPr>
+      </p:pic>
     </p:spTree>
+    <p:extLst>
+      <p:ext uri="{BB962C8B-B14F-4D97-AF65-F5344CB8AC3E}">
+        <p14:creationId xmlns:p14="http://schemas.microsoft.com/office/powerpoint/2010/main" val="1770833103"/>
+      </p:ext>
+    </p:extLst>
   </p:cSld>
   <p:clrMapOvr>
     <a:masterClrMapping/>
@@ -5310,7 +5595,7 @@
           <a:p>
             <a:r>
               <a:rPr lang="en-GB" dirty="0" smtClean="0"/>
-              <a:t>Clam AV HTML Scan</a:t>
+              <a:t>URL Classification</a:t>
             </a:r>
             <a:endParaRPr lang="en-GB" dirty="0"/>
           </a:p>
@@ -5328,14 +5613,98 @@
         </p:nvSpPr>
         <p:spPr/>
         <p:txBody>
-          <a:bodyPr/>
-          <a:lstStyle/>
-          <a:p>
+          <a:bodyPr>
+            <a:normAutofit fontScale="92500" lnSpcReduction="20000"/>
+          </a:bodyPr>
+          <a:lstStyle/>
+          <a:p>
+            <a:r>
+              <a:rPr lang="en-GB" dirty="0"/>
+              <a:t>Two machine-learning methods applied in classification algorithm:</a:t>
+            </a:r>
+          </a:p>
+          <a:p>
+            <a:pPr lvl="0"/>
+            <a:r>
+              <a:rPr lang="en-GB" dirty="0" err="1"/>
+              <a:t>Levenshtein</a:t>
+            </a:r>
+            <a:r>
+              <a:rPr lang="en-GB" dirty="0"/>
+              <a:t> distance</a:t>
+            </a:r>
+          </a:p>
+          <a:p>
+            <a:pPr lvl="1"/>
+            <a:r>
+              <a:rPr lang="en-GB" dirty="0"/>
+              <a:t>String metric for measuring the difference between two sequences</a:t>
+            </a:r>
+          </a:p>
+          <a:p>
+            <a:pPr lvl="1"/>
+            <a:r>
+              <a:rPr lang="en-GB" dirty="0"/>
+              <a:t>Minimum number of edits needed to transform one string into the other</a:t>
+            </a:r>
+          </a:p>
+          <a:p>
+            <a:pPr lvl="0"/>
+            <a:r>
+              <a:rPr lang="en-GB" dirty="0"/>
+              <a:t>K-mean Clustering </a:t>
+            </a:r>
+          </a:p>
+          <a:p>
+            <a:pPr lvl="1"/>
+            <a:r>
+              <a:rPr lang="en-GB" dirty="0"/>
+              <a:t>Data mining</a:t>
+            </a:r>
+          </a:p>
+          <a:p>
+            <a:pPr lvl="1"/>
+            <a:r>
+              <a:rPr lang="en-GB" dirty="0"/>
+              <a:t>Partition </a:t>
+            </a:r>
+            <a:r>
+              <a:rPr lang="en-GB" i="1" dirty="0"/>
+              <a:t>n</a:t>
+            </a:r>
+            <a:r>
+              <a:rPr lang="en-GB" dirty="0"/>
+              <a:t> observations into </a:t>
+            </a:r>
+            <a:r>
+              <a:rPr lang="en-GB" i="1" dirty="0"/>
+              <a:t>k</a:t>
+            </a:r>
+            <a:r>
+              <a:rPr lang="en-GB" dirty="0"/>
+              <a:t> clusters</a:t>
+            </a:r>
+          </a:p>
+          <a:p>
+            <a:pPr lvl="1"/>
+            <a:r>
+              <a:rPr lang="en-GB" dirty="0"/>
+              <a:t>Applicable on large amount of </a:t>
+            </a:r>
+            <a:r>
+              <a:rPr lang="en-GB" dirty="0" smtClean="0"/>
+              <a:t>data</a:t>
+            </a:r>
             <a:endParaRPr lang="en-GB" dirty="0"/>
           </a:p>
         </p:txBody>
       </p:sp>
     </p:spTree>
+    <p:extLst>
+      <p:ext uri="{BB962C8B-B14F-4D97-AF65-F5344CB8AC3E}">
+        <p14:creationId xmlns:p14="http://schemas.microsoft.com/office/powerpoint/2010/main" val="372575986"/>
+      </p:ext>
+    </p:extLst>
   </p:cSld>
   <p:clrMapOvr>
     <a:masterClrMapping/>
@@ -5377,7 +5746,7 @@
           <a:p>
             <a:r>
               <a:rPr lang="en-GB" dirty="0" smtClean="0"/>
-              <a:t>Good/Bad URL Lists</a:t>
+              <a:t>Internet Explorer under Wine</a:t>
             </a:r>
             <a:endParaRPr lang="en-GB" dirty="0"/>
           </a:p>
@@ -5395,10 +5764,59 @@
         </p:nvSpPr>
         <p:spPr/>
         <p:txBody>
-          <a:bodyPr/>
-          <a:lstStyle/>
-          <a:p>
-            <a:endParaRPr lang="en-GB"/>
+          <a:bodyPr>
+            <a:normAutofit lnSpcReduction="10000"/>
+          </a:bodyPr>
+          <a:lstStyle/>
+          <a:p>
+            <a:r>
+              <a:rPr lang="en-GB" dirty="0"/>
+              <a:t>High </a:t>
+            </a:r>
+            <a:r>
+              <a:rPr lang="en-GB" dirty="0" smtClean="0"/>
+              <a:t>interaction </a:t>
+            </a:r>
+            <a:r>
+              <a:rPr lang="en-GB" dirty="0"/>
+              <a:t>malware detection. </a:t>
+            </a:r>
+          </a:p>
+          <a:p>
+            <a:r>
+              <a:rPr lang="en-GB" dirty="0"/>
+              <a:t>Open suspicious URLs with Internet Explorer 6 by </a:t>
+            </a:r>
+            <a:r>
+              <a:rPr lang="en-GB" dirty="0" err="1"/>
+              <a:t>WineHQ</a:t>
+            </a:r>
+            <a:r>
+              <a:rPr lang="en-GB" dirty="0"/>
+              <a:t>.</a:t>
+            </a:r>
+          </a:p>
+          <a:p>
+            <a:r>
+              <a:rPr lang="en-GB" dirty="0" err="1"/>
+              <a:t>WineHQ</a:t>
+            </a:r>
+            <a:r>
+              <a:rPr lang="en-GB" dirty="0"/>
+              <a:t> is a Windows emulator for non-Windows OS.</a:t>
+            </a:r>
+          </a:p>
+          <a:p>
+            <a:r>
+              <a:rPr lang="en-GB" dirty="0"/>
+              <a:t>Each IE instance is ran in a separate Wine-prefix, i.e. an isolated temp virtual Windows environment. </a:t>
+            </a:r>
+          </a:p>
+          <a:p>
+            <a:r>
+              <a:rPr lang="en-GB" dirty="0"/>
+              <a:t>Check for file system activities after that. </a:t>
+            </a:r>
           </a:p>
         </p:txBody>
       </p:sp>
@@ -5444,7 +5862,7 @@
           <a:p>
             <a:r>
               <a:rPr lang="en-GB" dirty="0" smtClean="0"/>
-              <a:t>Capture-HPC</a:t>
+              <a:t>Clam AV HTML Scan</a:t>
             </a:r>
             <a:endParaRPr lang="en-GB" dirty="0"/>
           </a:p>
@@ -5465,7 +5883,47 @@
           <a:bodyPr/>
           <a:lstStyle/>
           <a:p>
-            <a:endParaRPr lang="en-GB"/>
+            <a:r>
+              <a:rPr lang="en-GB" dirty="0"/>
+              <a:t>Low </a:t>
+            </a:r>
+            <a:r>
+              <a:rPr lang="en-GB" dirty="0" smtClean="0"/>
+              <a:t>interaction </a:t>
+            </a:r>
+            <a:r>
+              <a:rPr lang="en-GB" dirty="0"/>
+              <a:t>malware detection.</a:t>
+            </a:r>
+          </a:p>
+          <a:p>
+            <a:r>
+              <a:rPr lang="en-GB" dirty="0"/>
+              <a:t>Download the content of a suspicious URL then scan with </a:t>
+            </a:r>
+            <a:r>
+              <a:rPr lang="en-GB" dirty="0" err="1"/>
+              <a:t>ClamAV</a:t>
+            </a:r>
+            <a:r>
+              <a:rPr lang="en-GB" dirty="0"/>
+              <a:t>. </a:t>
+            </a:r>
+          </a:p>
+          <a:p>
+            <a:endParaRPr lang="en-GB" dirty="0"/>
+          </a:p>
+          <a:p>
+            <a:r>
+              <a:rPr lang="en-GB" dirty="0"/>
+              <a:t>Both high interactive and low interactive approaches are achieved with Python. </a:t>
+            </a:r>
+          </a:p>
+          <a:p>
+            <a:r>
+              <a:rPr lang="en-GB" dirty="0"/>
+              <a:t>Concurrent processing via threading. </a:t>
+            </a:r>
           </a:p>
         </p:txBody>
       </p:sp>

</xml_diff>

<commit_message>
Added further presentation parts
</commit_message>
<xml_diff>
--- a/doc/pres2/wk8-progress.pptx
+++ b/doc/pres2/wk8-progress.pptx
@@ -1,6 +1,6 @@
 
 <file path=ppt/presentation.xml><?xml version="1.0" encoding="utf-8"?>
-<p:presentation xmlns:a="http://schemas.openxmlformats.org/drawingml/2006/main" xmlns:r="http://schemas.openxmlformats.org/officeDocument/2006/relationships" xmlns:p="http://schemas.openxmlformats.org/presentationml/2006/main" saveSubsetFonts="1">
+<p:presentation xmlns:a="http://schemas.openxmlformats.org/drawingml/2006/main" xmlns:r="http://schemas.openxmlformats.org/officeDocument/2006/relationships" xmlns:mc="http://schemas.openxmlformats.org/markup-compatibility/2006" xmlns:mv="urn:schemas-microsoft-com:mac:vml" xmlns:p="http://schemas.openxmlformats.org/presentationml/2006/main" mc:Ignorable="mv" mc:PreserveAttributes="mv:*" saveSubsetFonts="1">
   <p:sldMasterIdLst>
     <p:sldMasterId id="2147483648" r:id="rId1"/>
   </p:sldMasterIdLst>
@@ -15,16 +15,16 @@
     <p:sldId id="278" r:id="rId3"/>
     <p:sldId id="257" r:id="rId4"/>
     <p:sldId id="264" r:id="rId5"/>
-    <p:sldId id="279" r:id="rId6"/>
-    <p:sldId id="286" r:id="rId7"/>
-    <p:sldId id="287" r:id="rId8"/>
-    <p:sldId id="280" r:id="rId9"/>
-    <p:sldId id="281" r:id="rId10"/>
-    <p:sldId id="282" r:id="rId11"/>
+    <p:sldId id="288" r:id="rId6"/>
+    <p:sldId id="279" r:id="rId7"/>
+    <p:sldId id="286" r:id="rId8"/>
+    <p:sldId id="287" r:id="rId9"/>
+    <p:sldId id="280" r:id="rId10"/>
+    <p:sldId id="281" r:id="rId11"/>
     <p:sldId id="285" r:id="rId12"/>
-    <p:sldId id="283" r:id="rId13"/>
-    <p:sldId id="284" r:id="rId14"/>
-    <p:sldId id="265" r:id="rId15"/>
+    <p:sldId id="282" r:id="rId13"/>
+    <p:sldId id="283" r:id="rId14"/>
+    <p:sldId id="284" r:id="rId15"/>
     <p:sldId id="270" r:id="rId16"/>
     <p:sldId id="272" r:id="rId17"/>
     <p:sldId id="273" r:id="rId18"/>
@@ -130,17 +130,13 @@
 </file>
 
 <file path=ppt/commentAuthors.xml><?xml version="1.0" encoding="utf-8"?>
-<p:cmAuthorLst xmlns:a="http://schemas.openxmlformats.org/drawingml/2006/main" xmlns:r="http://schemas.openxmlformats.org/officeDocument/2006/relationships" xmlns:p="http://schemas.openxmlformats.org/presentationml/2006/main">
+<p:cmAuthorLst xmlns:a="http://schemas.openxmlformats.org/drawingml/2006/main" xmlns:r="http://schemas.openxmlformats.org/officeDocument/2006/relationships" xmlns:mc="http://schemas.openxmlformats.org/markup-compatibility/2006" xmlns:mv="urn:schemas-microsoft-com:mac:vml" xmlns:p="http://schemas.openxmlformats.org/presentationml/2006/main" mc:Ignorable="mv" mc:PreserveAttributes="mv:*">
   <p:cmAuthor id="0" name="tag1g09" initials="t" lastIdx="4" clrIdx="0"/>
 </p:cmAuthorLst>
 </file>
 
-<file path=ppt/activeX/activeX1.xml><?xml version="1.0" encoding="utf-8"?>
-<ax:ocx xmlns:ax="http://schemas.microsoft.com/office/2006/activeX" xmlns:r="http://schemas.openxmlformats.org/officeDocument/2006/relationships" ax:classid="{D27CDB6E-AE6D-11CF-96B8-444553540000}" ax:persistence="persistStorage" r:id="rId1"/>
-</file>
-
 <file path=ppt/comments/comment1.xml><?xml version="1.0" encoding="utf-8"?>
-<p:cmLst xmlns:a="http://schemas.openxmlformats.org/drawingml/2006/main" xmlns:r="http://schemas.openxmlformats.org/officeDocument/2006/relationships" xmlns:p="http://schemas.openxmlformats.org/presentationml/2006/main">
+<p:cmLst xmlns:a="http://schemas.openxmlformats.org/drawingml/2006/main" xmlns:r="http://schemas.openxmlformats.org/officeDocument/2006/relationships" xmlns:mc="http://schemas.openxmlformats.org/markup-compatibility/2006" xmlns:mv="urn:schemas-microsoft-com:mac:vml" xmlns:p="http://schemas.openxmlformats.org/presentationml/2006/main" mc:Ignorable="mv" mc:PreserveAttributes="mv:*">
   <p:cm authorId="0" dt="2012-10-23T13:15:13.711" idx="4">
     <p:pos x="10" y="10"/>
     <p:text>This digram does seem to work, It needs finishing.</p:text>
@@ -149,7 +145,7 @@
 </file>
 
 <file path=ppt/handoutMasters/handoutMaster1.xml><?xml version="1.0" encoding="utf-8"?>
-<p:handoutMaster xmlns:a="http://schemas.openxmlformats.org/drawingml/2006/main" xmlns:r="http://schemas.openxmlformats.org/officeDocument/2006/relationships" xmlns:p="http://schemas.openxmlformats.org/presentationml/2006/main">
+<p:handoutMaster xmlns:a="http://schemas.openxmlformats.org/drawingml/2006/main" xmlns:r="http://schemas.openxmlformats.org/officeDocument/2006/relationships" xmlns:mc="http://schemas.openxmlformats.org/markup-compatibility/2006" xmlns:mv="urn:schemas-microsoft-com:mac:vml" xmlns:p="http://schemas.openxmlformats.org/presentationml/2006/main" mc:Ignorable="mv" mc:PreserveAttributes="mv:*">
   <p:cSld>
     <p:bg>
       <p:bgRef idx="1001">
@@ -231,7 +227,7 @@
             <a:fld id="{18F98EB7-082C-9949-BFCA-B4BAD2D6FDBD}" type="datetimeFigureOut">
               <a:rPr lang="en-US" smtClean="0"/>
               <a:pPr/>
-              <a:t>11/19/2012</a:t>
+              <a:t>11/19/12</a:t>
             </a:fld>
             <a:endParaRPr lang="en-US"/>
           </a:p>
@@ -307,7 +303,7 @@
     </p:spTree>
     <p:extLst>
       <p:ext uri="{BB962C8B-B14F-4D97-AF65-F5344CB8AC3E}">
-        <p14:creationId xmlns:p14="http://schemas.microsoft.com/office/powerpoint/2010/main" val="1901348598"/>
+        <p14:creationId xmlns:p14="http://schemas.microsoft.com/office/powerpoint/2010/main" xmlns:p="http://schemas.openxmlformats.org/presentationml/2006/main" xmlns:r="http://schemas.openxmlformats.org/officeDocument/2006/relationships" xmlns:a="http://schemas.openxmlformats.org/drawingml/2006/main" xmlns="" val="1901348598"/>
       </p:ext>
     </p:extLst>
   </p:cSld>
@@ -316,7 +312,7 @@
 </file>
 
 <file path=ppt/notesMasters/notesMaster1.xml><?xml version="1.0" encoding="utf-8"?>
-<p:notesMaster xmlns:a="http://schemas.openxmlformats.org/drawingml/2006/main" xmlns:r="http://schemas.openxmlformats.org/officeDocument/2006/relationships" xmlns:p="http://schemas.openxmlformats.org/presentationml/2006/main">
+<p:notesMaster xmlns:a="http://schemas.openxmlformats.org/drawingml/2006/main" xmlns:r="http://schemas.openxmlformats.org/officeDocument/2006/relationships" xmlns:mc="http://schemas.openxmlformats.org/markup-compatibility/2006" xmlns:mv="urn:schemas-microsoft-com:mac:vml" xmlns:p="http://schemas.openxmlformats.org/presentationml/2006/main" mc:Ignorable="mv" mc:PreserveAttributes="mv:*">
   <p:cSld>
     <p:bg>
       <p:bgRef idx="1001">
@@ -398,7 +394,7 @@
             <a:fld id="{5C465251-34BA-484B-BD29-7371F8FBFAE2}" type="datetimeFigureOut">
               <a:rPr lang="en-GB" smtClean="0"/>
               <a:pPr/>
-              <a:t>19/11/2012</a:t>
+              <a:t>11/19/12</a:t>
             </a:fld>
             <a:endParaRPr lang="en-GB"/>
           </a:p>
@@ -569,7 +565,7 @@
     </p:spTree>
     <p:extLst>
       <p:ext uri="{BB962C8B-B14F-4D97-AF65-F5344CB8AC3E}">
-        <p14:creationId xmlns:p14="http://schemas.microsoft.com/office/powerpoint/2010/main" val="1219798393"/>
+        <p14:creationId xmlns:p14="http://schemas.microsoft.com/office/powerpoint/2010/main" xmlns:p="http://schemas.openxmlformats.org/presentationml/2006/main" xmlns:r="http://schemas.openxmlformats.org/officeDocument/2006/relationships" xmlns:a="http://schemas.openxmlformats.org/drawingml/2006/main" xmlns="" val="1219798393"/>
       </p:ext>
     </p:extLst>
   </p:cSld>
@@ -670,7 +666,7 @@
 </file>
 
 <file path=ppt/slideLayouts/slideLayout1.xml><?xml version="1.0" encoding="utf-8"?>
-<p:sldLayout xmlns:a="http://schemas.openxmlformats.org/drawingml/2006/main" xmlns:r="http://schemas.openxmlformats.org/officeDocument/2006/relationships" xmlns:p="http://schemas.openxmlformats.org/presentationml/2006/main" type="title" preserve="1">
+<p:sldLayout xmlns:a="http://schemas.openxmlformats.org/drawingml/2006/main" xmlns:r="http://schemas.openxmlformats.org/officeDocument/2006/relationships" xmlns:mc="http://schemas.openxmlformats.org/markup-compatibility/2006" xmlns:mv="urn:schemas-microsoft-com:mac:vml" xmlns:p="http://schemas.openxmlformats.org/presentationml/2006/main" mc:Ignorable="mv" mc:PreserveAttributes="mv:*" type="title" preserve="1">
   <p:cSld name="Title Slide">
     <p:spTree>
       <p:nvGrpSpPr>
@@ -851,7 +847,7 @@
             <a:fld id="{9B2BCD74-F7F5-4BD6-83D7-1EBC56D75222}" type="datetimeFigureOut">
               <a:rPr lang="en-GB" smtClean="0"/>
               <a:pPr/>
-              <a:t>19/11/2012</a:t>
+              <a:t>11/19/12</a:t>
             </a:fld>
             <a:endParaRPr lang="en-GB"/>
           </a:p>
@@ -916,7 +912,7 @@
 </file>
 
 <file path=ppt/slideLayouts/slideLayout10.xml><?xml version="1.0" encoding="utf-8"?>
-<p:sldLayout xmlns:a="http://schemas.openxmlformats.org/drawingml/2006/main" xmlns:r="http://schemas.openxmlformats.org/officeDocument/2006/relationships" xmlns:p="http://schemas.openxmlformats.org/presentationml/2006/main" type="vertTx" preserve="1">
+<p:sldLayout xmlns:a="http://schemas.openxmlformats.org/drawingml/2006/main" xmlns:r="http://schemas.openxmlformats.org/officeDocument/2006/relationships" xmlns:mc="http://schemas.openxmlformats.org/markup-compatibility/2006" xmlns:mv="urn:schemas-microsoft-com:mac:vml" xmlns:p="http://schemas.openxmlformats.org/presentationml/2006/main" mc:Ignorable="mv" mc:PreserveAttributes="mv:*" type="vertTx" preserve="1">
   <p:cSld name="Title and Vertical Text">
     <p:spTree>
       <p:nvGrpSpPr>
@@ -1025,7 +1021,7 @@
             <a:fld id="{9B2BCD74-F7F5-4BD6-83D7-1EBC56D75222}" type="datetimeFigureOut">
               <a:rPr lang="en-GB" smtClean="0"/>
               <a:pPr/>
-              <a:t>19/11/2012</a:t>
+              <a:t>11/19/12</a:t>
             </a:fld>
             <a:endParaRPr lang="en-GB"/>
           </a:p>
@@ -1083,7 +1079,7 @@
 </file>
 
 <file path=ppt/slideLayouts/slideLayout11.xml><?xml version="1.0" encoding="utf-8"?>
-<p:sldLayout xmlns:a="http://schemas.openxmlformats.org/drawingml/2006/main" xmlns:r="http://schemas.openxmlformats.org/officeDocument/2006/relationships" xmlns:p="http://schemas.openxmlformats.org/presentationml/2006/main" type="vertTitleAndTx" preserve="1">
+<p:sldLayout xmlns:a="http://schemas.openxmlformats.org/drawingml/2006/main" xmlns:r="http://schemas.openxmlformats.org/officeDocument/2006/relationships" xmlns:mc="http://schemas.openxmlformats.org/markup-compatibility/2006" xmlns:mv="urn:schemas-microsoft-com:mac:vml" xmlns:p="http://schemas.openxmlformats.org/presentationml/2006/main" mc:Ignorable="mv" mc:PreserveAttributes="mv:*" type="vertTitleAndTx" preserve="1">
   <p:cSld name="Vertical Title and Text">
     <p:spTree>
       <p:nvGrpSpPr>
@@ -1202,7 +1198,7 @@
             <a:fld id="{9B2BCD74-F7F5-4BD6-83D7-1EBC56D75222}" type="datetimeFigureOut">
               <a:rPr lang="en-GB" smtClean="0"/>
               <a:pPr/>
-              <a:t>19/11/2012</a:t>
+              <a:t>11/19/12</a:t>
             </a:fld>
             <a:endParaRPr lang="en-GB"/>
           </a:p>
@@ -1260,7 +1256,7 @@
 </file>
 
 <file path=ppt/slideLayouts/slideLayout2.xml><?xml version="1.0" encoding="utf-8"?>
-<p:sldLayout xmlns:a="http://schemas.openxmlformats.org/drawingml/2006/main" xmlns:r="http://schemas.openxmlformats.org/officeDocument/2006/relationships" xmlns:p="http://schemas.openxmlformats.org/presentationml/2006/main" type="obj" preserve="1">
+<p:sldLayout xmlns:a="http://schemas.openxmlformats.org/drawingml/2006/main" xmlns:r="http://schemas.openxmlformats.org/officeDocument/2006/relationships" xmlns:mc="http://schemas.openxmlformats.org/markup-compatibility/2006" xmlns:mv="urn:schemas-microsoft-com:mac:vml" xmlns:p="http://schemas.openxmlformats.org/presentationml/2006/main" mc:Ignorable="mv" mc:PreserveAttributes="mv:*" type="obj" preserve="1">
   <p:cSld name="Title and Content">
     <p:spTree>
       <p:nvGrpSpPr>
@@ -1369,7 +1365,7 @@
             <a:fld id="{9B2BCD74-F7F5-4BD6-83D7-1EBC56D75222}" type="datetimeFigureOut">
               <a:rPr lang="en-GB" smtClean="0"/>
               <a:pPr/>
-              <a:t>19/11/2012</a:t>
+              <a:t>11/19/12</a:t>
             </a:fld>
             <a:endParaRPr lang="en-GB"/>
           </a:p>
@@ -1427,7 +1423,7 @@
 </file>
 
 <file path=ppt/slideLayouts/slideLayout3.xml><?xml version="1.0" encoding="utf-8"?>
-<p:sldLayout xmlns:a="http://schemas.openxmlformats.org/drawingml/2006/main" xmlns:r="http://schemas.openxmlformats.org/officeDocument/2006/relationships" xmlns:p="http://schemas.openxmlformats.org/presentationml/2006/main" type="secHead" preserve="1">
+<p:sldLayout xmlns:a="http://schemas.openxmlformats.org/drawingml/2006/main" xmlns:r="http://schemas.openxmlformats.org/officeDocument/2006/relationships" xmlns:mc="http://schemas.openxmlformats.org/markup-compatibility/2006" xmlns:mv="urn:schemas-microsoft-com:mac:vml" xmlns:p="http://schemas.openxmlformats.org/presentationml/2006/main" mc:Ignorable="mv" mc:PreserveAttributes="mv:*" type="secHead" preserve="1">
   <p:cSld name="Section Header">
     <p:spTree>
       <p:nvGrpSpPr>
@@ -1612,7 +1608,7 @@
             <a:fld id="{9B2BCD74-F7F5-4BD6-83D7-1EBC56D75222}" type="datetimeFigureOut">
               <a:rPr lang="en-GB" smtClean="0"/>
               <a:pPr/>
-              <a:t>19/11/2012</a:t>
+              <a:t>11/19/12</a:t>
             </a:fld>
             <a:endParaRPr lang="en-GB"/>
           </a:p>
@@ -1670,7 +1666,7 @@
 </file>
 
 <file path=ppt/slideLayouts/slideLayout4.xml><?xml version="1.0" encoding="utf-8"?>
-<p:sldLayout xmlns:a="http://schemas.openxmlformats.org/drawingml/2006/main" xmlns:r="http://schemas.openxmlformats.org/officeDocument/2006/relationships" xmlns:p="http://schemas.openxmlformats.org/presentationml/2006/main" type="twoObj" preserve="1">
+<p:sldLayout xmlns:a="http://schemas.openxmlformats.org/drawingml/2006/main" xmlns:r="http://schemas.openxmlformats.org/officeDocument/2006/relationships" xmlns:mc="http://schemas.openxmlformats.org/markup-compatibility/2006" xmlns:mv="urn:schemas-microsoft-com:mac:vml" xmlns:p="http://schemas.openxmlformats.org/presentationml/2006/main" mc:Ignorable="mv" mc:PreserveAttributes="mv:*" type="twoObj" preserve="1">
   <p:cSld name="Two Content">
     <p:spTree>
       <p:nvGrpSpPr>
@@ -1897,7 +1893,7 @@
             <a:fld id="{9B2BCD74-F7F5-4BD6-83D7-1EBC56D75222}" type="datetimeFigureOut">
               <a:rPr lang="en-GB" smtClean="0"/>
               <a:pPr/>
-              <a:t>19/11/2012</a:t>
+              <a:t>11/19/12</a:t>
             </a:fld>
             <a:endParaRPr lang="en-GB"/>
           </a:p>
@@ -1955,7 +1951,7 @@
 </file>
 
 <file path=ppt/slideLayouts/slideLayout5.xml><?xml version="1.0" encoding="utf-8"?>
-<p:sldLayout xmlns:a="http://schemas.openxmlformats.org/drawingml/2006/main" xmlns:r="http://schemas.openxmlformats.org/officeDocument/2006/relationships" xmlns:p="http://schemas.openxmlformats.org/presentationml/2006/main" type="twoTxTwoObj" preserve="1">
+<p:sldLayout xmlns:a="http://schemas.openxmlformats.org/drawingml/2006/main" xmlns:r="http://schemas.openxmlformats.org/officeDocument/2006/relationships" xmlns:mc="http://schemas.openxmlformats.org/markup-compatibility/2006" xmlns:mv="urn:schemas-microsoft-com:mac:vml" xmlns:p="http://schemas.openxmlformats.org/presentationml/2006/main" mc:Ignorable="mv" mc:PreserveAttributes="mv:*" type="twoTxTwoObj" preserve="1">
   <p:cSld name="Comparison">
     <p:spTree>
       <p:nvGrpSpPr>
@@ -2316,7 +2312,7 @@
             <a:fld id="{9B2BCD74-F7F5-4BD6-83D7-1EBC56D75222}" type="datetimeFigureOut">
               <a:rPr lang="en-GB" smtClean="0"/>
               <a:pPr/>
-              <a:t>19/11/2012</a:t>
+              <a:t>11/19/12</a:t>
             </a:fld>
             <a:endParaRPr lang="en-GB"/>
           </a:p>
@@ -2374,7 +2370,7 @@
 </file>
 
 <file path=ppt/slideLayouts/slideLayout6.xml><?xml version="1.0" encoding="utf-8"?>
-<p:sldLayout xmlns:a="http://schemas.openxmlformats.org/drawingml/2006/main" xmlns:r="http://schemas.openxmlformats.org/officeDocument/2006/relationships" xmlns:p="http://schemas.openxmlformats.org/presentationml/2006/main" type="titleOnly" preserve="1">
+<p:sldLayout xmlns:a="http://schemas.openxmlformats.org/drawingml/2006/main" xmlns:r="http://schemas.openxmlformats.org/officeDocument/2006/relationships" xmlns:mc="http://schemas.openxmlformats.org/markup-compatibility/2006" xmlns:mv="urn:schemas-microsoft-com:mac:vml" xmlns:p="http://schemas.openxmlformats.org/presentationml/2006/main" mc:Ignorable="mv" mc:PreserveAttributes="mv:*" type="titleOnly" preserve="1">
   <p:cSld name="Title Only">
     <p:spTree>
       <p:nvGrpSpPr>
@@ -2431,7 +2427,7 @@
             <a:fld id="{9B2BCD74-F7F5-4BD6-83D7-1EBC56D75222}" type="datetimeFigureOut">
               <a:rPr lang="en-GB" smtClean="0"/>
               <a:pPr/>
-              <a:t>19/11/2012</a:t>
+              <a:t>11/19/12</a:t>
             </a:fld>
             <a:endParaRPr lang="en-GB"/>
           </a:p>
@@ -2489,7 +2485,7 @@
 </file>
 
 <file path=ppt/slideLayouts/slideLayout7.xml><?xml version="1.0" encoding="utf-8"?>
-<p:sldLayout xmlns:a="http://schemas.openxmlformats.org/drawingml/2006/main" xmlns:r="http://schemas.openxmlformats.org/officeDocument/2006/relationships" xmlns:p="http://schemas.openxmlformats.org/presentationml/2006/main" type="blank" preserve="1">
+<p:sldLayout xmlns:a="http://schemas.openxmlformats.org/drawingml/2006/main" xmlns:r="http://schemas.openxmlformats.org/officeDocument/2006/relationships" xmlns:mc="http://schemas.openxmlformats.org/markup-compatibility/2006" xmlns:mv="urn:schemas-microsoft-com:mac:vml" xmlns:p="http://schemas.openxmlformats.org/presentationml/2006/main" mc:Ignorable="mv" mc:PreserveAttributes="mv:*" type="blank" preserve="1">
   <p:cSld name="Blank">
     <p:spTree>
       <p:nvGrpSpPr>
@@ -2523,7 +2519,7 @@
             <a:fld id="{9B2BCD74-F7F5-4BD6-83D7-1EBC56D75222}" type="datetimeFigureOut">
               <a:rPr lang="en-GB" smtClean="0"/>
               <a:pPr/>
-              <a:t>19/11/2012</a:t>
+              <a:t>11/19/12</a:t>
             </a:fld>
             <a:endParaRPr lang="en-GB"/>
           </a:p>
@@ -2581,7 +2577,7 @@
 </file>
 
 <file path=ppt/slideLayouts/slideLayout8.xml><?xml version="1.0" encoding="utf-8"?>
-<p:sldLayout xmlns:a="http://schemas.openxmlformats.org/drawingml/2006/main" xmlns:r="http://schemas.openxmlformats.org/officeDocument/2006/relationships" xmlns:p="http://schemas.openxmlformats.org/presentationml/2006/main" type="objTx" preserve="1">
+<p:sldLayout xmlns:a="http://schemas.openxmlformats.org/drawingml/2006/main" xmlns:r="http://schemas.openxmlformats.org/officeDocument/2006/relationships" xmlns:mc="http://schemas.openxmlformats.org/markup-compatibility/2006" xmlns:mv="urn:schemas-microsoft-com:mac:vml" xmlns:p="http://schemas.openxmlformats.org/presentationml/2006/main" mc:Ignorable="mv" mc:PreserveAttributes="mv:*" type="objTx" preserve="1">
   <p:cSld name="Content with Caption">
     <p:spTree>
       <p:nvGrpSpPr>
@@ -2797,7 +2793,7 @@
             <a:fld id="{9B2BCD74-F7F5-4BD6-83D7-1EBC56D75222}" type="datetimeFigureOut">
               <a:rPr lang="en-GB" smtClean="0"/>
               <a:pPr/>
-              <a:t>19/11/2012</a:t>
+              <a:t>11/19/12</a:t>
             </a:fld>
             <a:endParaRPr lang="en-GB"/>
           </a:p>
@@ -2855,7 +2851,7 @@
 </file>
 
 <file path=ppt/slideLayouts/slideLayout9.xml><?xml version="1.0" encoding="utf-8"?>
-<p:sldLayout xmlns:a="http://schemas.openxmlformats.org/drawingml/2006/main" xmlns:r="http://schemas.openxmlformats.org/officeDocument/2006/relationships" xmlns:p="http://schemas.openxmlformats.org/presentationml/2006/main" type="picTx" preserve="1">
+<p:sldLayout xmlns:a="http://schemas.openxmlformats.org/drawingml/2006/main" xmlns:r="http://schemas.openxmlformats.org/officeDocument/2006/relationships" xmlns:mc="http://schemas.openxmlformats.org/markup-compatibility/2006" xmlns:mv="urn:schemas-microsoft-com:mac:vml" xmlns:p="http://schemas.openxmlformats.org/presentationml/2006/main" mc:Ignorable="mv" mc:PreserveAttributes="mv:*" type="picTx" preserve="1">
   <p:cSld name="Picture with Caption">
     <p:spTree>
       <p:nvGrpSpPr>
@@ -3047,7 +3043,7 @@
             <a:fld id="{9B2BCD74-F7F5-4BD6-83D7-1EBC56D75222}" type="datetimeFigureOut">
               <a:rPr lang="en-GB" smtClean="0"/>
               <a:pPr/>
-              <a:t>19/11/2012</a:t>
+              <a:t>11/19/12</a:t>
             </a:fld>
             <a:endParaRPr lang="en-GB"/>
           </a:p>
@@ -3105,7 +3101,7 @@
 </file>
 
 <file path=ppt/slideMasters/slideMaster1.xml><?xml version="1.0" encoding="utf-8"?>
-<p:sldMaster xmlns:a="http://schemas.openxmlformats.org/drawingml/2006/main" xmlns:r="http://schemas.openxmlformats.org/officeDocument/2006/relationships" xmlns:p="http://schemas.openxmlformats.org/presentationml/2006/main">
+<p:sldMaster xmlns:a="http://schemas.openxmlformats.org/drawingml/2006/main" xmlns:r="http://schemas.openxmlformats.org/officeDocument/2006/relationships" xmlns:mc="http://schemas.openxmlformats.org/markup-compatibility/2006" xmlns:mv="urn:schemas-microsoft-com:mac:vml" xmlns:p="http://schemas.openxmlformats.org/presentationml/2006/main" mc:Ignorable="mv" mc:PreserveAttributes="mv:*">
   <p:cSld>
     <p:bg>
       <p:bgPr>
@@ -3272,7 +3268,7 @@
             <a:fld id="{9B2BCD74-F7F5-4BD6-83D7-1EBC56D75222}" type="datetimeFigureOut">
               <a:rPr lang="en-GB" smtClean="0"/>
               <a:pPr/>
-              <a:t>19/11/2012</a:t>
+              <a:t>11/19/12</a:t>
             </a:fld>
             <a:endParaRPr lang="en-GB"/>
           </a:p>
@@ -3634,7 +3630,7 @@
 </file>
 
 <file path=ppt/slides/slide1.xml><?xml version="1.0" encoding="utf-8"?>
-<p:sld xmlns:a="http://schemas.openxmlformats.org/drawingml/2006/main" xmlns:r="http://schemas.openxmlformats.org/officeDocument/2006/relationships" xmlns:p="http://schemas.openxmlformats.org/presentationml/2006/main">
+<p:sld xmlns:a="http://schemas.openxmlformats.org/drawingml/2006/main" xmlns:r="http://schemas.openxmlformats.org/officeDocument/2006/relationships" xmlns:mc="http://schemas.openxmlformats.org/markup-compatibility/2006" xmlns:mv="urn:schemas-microsoft-com:mac:vml" xmlns:p="http://schemas.openxmlformats.org/presentationml/2006/main" mc:Ignorable="mv" mc:PreserveAttributes="mv:*">
   <p:cSld>
     <p:spTree>
       <p:nvGrpSpPr>
@@ -3721,7 +3717,7 @@
 </file>
 
 <file path=ppt/slides/slide10.xml><?xml version="1.0" encoding="utf-8"?>
-<p:sld xmlns:a="http://schemas.openxmlformats.org/drawingml/2006/main" xmlns:r="http://schemas.openxmlformats.org/officeDocument/2006/relationships" xmlns:p="http://schemas.openxmlformats.org/presentationml/2006/main">
+<p:sld xmlns:a="http://schemas.openxmlformats.org/drawingml/2006/main" xmlns:r="http://schemas.openxmlformats.org/officeDocument/2006/relationships" xmlns:mc="http://schemas.openxmlformats.org/markup-compatibility/2006" xmlns:mv="urn:schemas-microsoft-com:mac:vml" xmlns:p="http://schemas.openxmlformats.org/presentationml/2006/main" mc:Ignorable="mv" mc:PreserveAttributes="mv:*">
   <p:cSld>
     <p:spTree>
       <p:nvGrpSpPr>
@@ -3754,7 +3750,7 @@
           <a:p>
             <a:r>
               <a:rPr lang="en-GB" dirty="0" smtClean="0"/>
-              <a:t>Good/Bad URL Lists</a:t>
+              <a:t>Clam AV HTML Scan</a:t>
             </a:r>
             <a:endParaRPr lang="en-GB" dirty="0"/>
           </a:p>
@@ -3775,7 +3771,47 @@
           <a:bodyPr/>
           <a:lstStyle/>
           <a:p>
-            <a:endParaRPr lang="en-GB"/>
+            <a:r>
+              <a:rPr lang="en-GB" dirty="0"/>
+              <a:t>Low </a:t>
+            </a:r>
+            <a:r>
+              <a:rPr lang="en-GB" dirty="0" smtClean="0"/>
+              <a:t>interaction </a:t>
+            </a:r>
+            <a:r>
+              <a:rPr lang="en-GB" dirty="0"/>
+              <a:t>malware detection.</a:t>
+            </a:r>
+          </a:p>
+          <a:p>
+            <a:r>
+              <a:rPr lang="en-GB" dirty="0"/>
+              <a:t>Download the content of a suspicious URL then scan with </a:t>
+            </a:r>
+            <a:r>
+              <a:rPr lang="en-GB" dirty="0" err="1"/>
+              <a:t>ClamAV</a:t>
+            </a:r>
+            <a:r>
+              <a:rPr lang="en-GB" dirty="0"/>
+              <a:t>. </a:t>
+            </a:r>
+          </a:p>
+          <a:p>
+            <a:endParaRPr lang="en-GB" dirty="0"/>
+          </a:p>
+          <a:p>
+            <a:r>
+              <a:rPr lang="en-GB" dirty="0"/>
+              <a:t>Both high interactive and low interactive approaches are achieved with Python. </a:t>
+            </a:r>
+          </a:p>
+          <a:p>
+            <a:r>
+              <a:rPr lang="en-GB" dirty="0"/>
+              <a:t>Concurrent processing via threading. </a:t>
+            </a:r>
           </a:p>
         </p:txBody>
       </p:sp>
@@ -3788,7 +3824,7 @@
 </file>
 
 <file path=ppt/slides/slide11.xml><?xml version="1.0" encoding="utf-8"?>
-<p:sld xmlns:a="http://schemas.openxmlformats.org/drawingml/2006/main" xmlns:r="http://schemas.openxmlformats.org/officeDocument/2006/relationships" xmlns:p="http://schemas.openxmlformats.org/presentationml/2006/main">
+<p:sld xmlns:a="http://schemas.openxmlformats.org/drawingml/2006/main" xmlns:r="http://schemas.openxmlformats.org/officeDocument/2006/relationships" xmlns:mc="http://schemas.openxmlformats.org/markup-compatibility/2006" xmlns:mv="urn:schemas-microsoft-com:mac:vml" xmlns:p="http://schemas.openxmlformats.org/presentationml/2006/main" mc:Ignorable="mv" mc:PreserveAttributes="mv:*">
   <p:cSld>
     <p:spTree>
       <p:nvGrpSpPr>
@@ -3882,7 +3918,7 @@
 </file>
 
 <file path=ppt/slides/slide12.xml><?xml version="1.0" encoding="utf-8"?>
-<p:sld xmlns:a="http://schemas.openxmlformats.org/drawingml/2006/main" xmlns:r="http://schemas.openxmlformats.org/officeDocument/2006/relationships" xmlns:p="http://schemas.openxmlformats.org/presentationml/2006/main">
+<p:sld xmlns:a="http://schemas.openxmlformats.org/drawingml/2006/main" xmlns:r="http://schemas.openxmlformats.org/officeDocument/2006/relationships" xmlns:mc="http://schemas.openxmlformats.org/markup-compatibility/2006" xmlns:mv="urn:schemas-microsoft-com:mac:vml" xmlns:p="http://schemas.openxmlformats.org/presentationml/2006/main" mc:Ignorable="mv" mc:PreserveAttributes="mv:*">
   <p:cSld>
     <p:spTree>
       <p:nvGrpSpPr>
@@ -3915,7 +3951,7 @@
           <a:p>
             <a:r>
               <a:rPr lang="en-GB" dirty="0" smtClean="0"/>
-              <a:t>Framework Integration</a:t>
+              <a:t>Good/Bad URL Lists</a:t>
             </a:r>
             <a:endParaRPr lang="en-GB" dirty="0"/>
           </a:p>
@@ -3949,7 +3985,7 @@
 </file>
 
 <file path=ppt/slides/slide13.xml><?xml version="1.0" encoding="utf-8"?>
-<p:sld xmlns:a="http://schemas.openxmlformats.org/drawingml/2006/main" xmlns:r="http://schemas.openxmlformats.org/officeDocument/2006/relationships" xmlns:p="http://schemas.openxmlformats.org/presentationml/2006/main">
+<p:sld xmlns:a="http://schemas.openxmlformats.org/drawingml/2006/main" xmlns:r="http://schemas.openxmlformats.org/officeDocument/2006/relationships" xmlns:mc="http://schemas.openxmlformats.org/markup-compatibility/2006" xmlns:mv="urn:schemas-microsoft-com:mac:vml" xmlns:p="http://schemas.openxmlformats.org/presentationml/2006/main" mc:Ignorable="mv" mc:PreserveAttributes="mv:*">
   <p:cSld>
     <p:spTree>
       <p:nvGrpSpPr>
@@ -3982,7 +4018,7 @@
           <a:p>
             <a:r>
               <a:rPr lang="en-GB" dirty="0" smtClean="0"/>
-              <a:t>Storage of Analysis Results</a:t>
+              <a:t>Framework Integration</a:t>
             </a:r>
             <a:endParaRPr lang="en-GB" dirty="0"/>
           </a:p>
@@ -4016,7 +4052,7 @@
 </file>
 
 <file path=ppt/slides/slide14.xml><?xml version="1.0" encoding="utf-8"?>
-<p:sld xmlns:a="http://schemas.openxmlformats.org/drawingml/2006/main" xmlns:r="http://schemas.openxmlformats.org/officeDocument/2006/relationships" xmlns:p="http://schemas.openxmlformats.org/presentationml/2006/main">
+<p:sld xmlns:a="http://schemas.openxmlformats.org/drawingml/2006/main" xmlns:r="http://schemas.openxmlformats.org/officeDocument/2006/relationships" xmlns:mc="http://schemas.openxmlformats.org/markup-compatibility/2006" xmlns:mv="urn:schemas-microsoft-com:mac:vml" xmlns:p="http://schemas.openxmlformats.org/presentationml/2006/main" mc:Ignorable="mv" mc:PreserveAttributes="mv:*">
   <p:cSld>
     <p:spTree>
       <p:nvGrpSpPr>
@@ -4049,7 +4085,7 @@
           <a:p>
             <a:r>
               <a:rPr lang="en-GB" dirty="0" smtClean="0"/>
-              <a:t>Malware Analysis Demo??!</a:t>
+              <a:t>Storage of Analysis Results</a:t>
             </a:r>
             <a:endParaRPr lang="en-GB" dirty="0"/>
           </a:p>
@@ -4057,7 +4093,7 @@
       </p:sp>
       <p:sp>
         <p:nvSpPr>
-          <p:cNvPr id="5" name="Content Placeholder 4"/>
+          <p:cNvPr id="3" name="Content Placeholder 2"/>
           <p:cNvSpPr>
             <a:spLocks noGrp="1"/>
           </p:cNvSpPr>
@@ -4070,87 +4106,20 @@
           <a:bodyPr/>
           <a:lstStyle/>
           <a:p>
-            <a:endParaRPr lang="en-GB" dirty="0"/>
+            <a:endParaRPr lang="en-GB"/>
           </a:p>
         </p:txBody>
       </p:sp>
     </p:spTree>
-    <p:controls>
-      <mc:AlternateContent xmlns:mc="http://schemas.openxmlformats.org/markup-compatibility/2006">
-        <mc:Choice xmlns:v="urn:schemas-microsoft-com:vml" Requires="v">
-          <p:control spid="1026" r:id="rId2" imgW="8207280" imgH="5183280"/>
-        </mc:Choice>
-        <mc:Fallback>
-          <p:control r:id="rId2" imgW="8207280" imgH="5183280">
-            <p:pic>
-              <p:nvPicPr>
-                <p:cNvPr id="0" name="ShockwaveFlash1"/>
-                <p:cNvPicPr preferRelativeResize="0">
-                  <a:picLocks noChangeArrowheads="1" noChangeShapeType="1"/>
-                </p:cNvPicPr>
-                <p:nvPr/>
-              </p:nvPicPr>
-              <p:blipFill>
-                <a:blip r:embed="rId4">
-                  <a:extLst>
-                    <a:ext uri="{28A0092B-C50C-407E-A947-70E740481C1C}">
-                      <a14:useLocalDpi xmlns:a14="http://schemas.microsoft.com/office/drawing/2010/main" val="0"/>
-                    </a:ext>
-                  </a:extLst>
-                </a:blip>
-                <a:srcRect/>
-                <a:stretch>
-                  <a:fillRect/>
-                </a:stretch>
-              </p:blipFill>
-              <p:spPr bwMode="auto">
-                <a:xfrm>
-                  <a:off x="468313" y="1341438"/>
-                  <a:ext cx="8207375" cy="5183187"/>
-                </a:xfrm>
-                <a:prstGeom prst="rect">
-                  <a:avLst/>
-                </a:prstGeom>
-                <a:noFill/>
-                <a:ln w="9525">
-                  <a:miter lim="800000"/>
-                  <a:headEnd/>
-                  <a:tailEnd/>
-                </a:ln>
-                <a:effectLst/>
-                <a:extLst>
-                  <a:ext uri="{AF507438-7753-43E0-B8FC-AC1667EBCBE1}">
-                    <a14:hiddenEffects xmlns:a14="http://schemas.microsoft.com/office/drawing/2010/main">
-                      <a:effectLst>
-                        <a:outerShdw dist="35921" dir="2700000" algn="ctr" rotWithShape="0">
-                          <a:schemeClr val="bg2"/>
-                        </a:outerShdw>
-                      </a:effectLst>
-                    </a14:hiddenEffects>
-                  </a:ext>
-                </a:extLst>
-              </p:spPr>
-            </p:pic>
-          </p:control>
-        </mc:Fallback>
-      </mc:AlternateContent>
-    </p:controls>
   </p:cSld>
   <p:clrMapOvr>
     <a:masterClrMapping/>
   </p:clrMapOvr>
-  <p:timing>
-    <p:tnLst>
-      <p:par>
-        <p:cTn id="1" dur="indefinite" restart="never" nodeType="tmRoot"/>
-      </p:par>
-    </p:tnLst>
-  </p:timing>
 </p:sld>
 </file>
 
 <file path=ppt/slides/slide15.xml><?xml version="1.0" encoding="utf-8"?>
-<p:sld xmlns:a="http://schemas.openxmlformats.org/drawingml/2006/main" xmlns:r="http://schemas.openxmlformats.org/officeDocument/2006/relationships" xmlns:p="http://schemas.openxmlformats.org/presentationml/2006/main">
+<p:sld xmlns:a="http://schemas.openxmlformats.org/drawingml/2006/main" xmlns:r="http://schemas.openxmlformats.org/officeDocument/2006/relationships" xmlns:mc="http://schemas.openxmlformats.org/markup-compatibility/2006" xmlns:mv="urn:schemas-microsoft-com:mac:vml" xmlns:p="http://schemas.openxmlformats.org/presentationml/2006/main" mc:Ignorable="mv" mc:PreserveAttributes="mv:*">
   <p:cSld>
     <p:spTree>
       <p:nvGrpSpPr>
@@ -4260,7 +4229,7 @@
 </file>
 
 <file path=ppt/slides/slide16.xml><?xml version="1.0" encoding="utf-8"?>
-<p:sld xmlns:a="http://schemas.openxmlformats.org/drawingml/2006/main" xmlns:r="http://schemas.openxmlformats.org/officeDocument/2006/relationships" xmlns:p="http://schemas.openxmlformats.org/presentationml/2006/main">
+<p:sld xmlns:a="http://schemas.openxmlformats.org/drawingml/2006/main" xmlns:r="http://schemas.openxmlformats.org/officeDocument/2006/relationships" xmlns:mc="http://schemas.openxmlformats.org/markup-compatibility/2006" xmlns:mv="urn:schemas-microsoft-com:mac:vml" xmlns:p="http://schemas.openxmlformats.org/presentationml/2006/main" mc:Ignorable="mv" mc:PreserveAttributes="mv:*">
   <p:cSld>
     <p:spTree>
       <p:nvGrpSpPr>
@@ -4334,7 +4303,7 @@
 </file>
 
 <file path=ppt/slides/slide17.xml><?xml version="1.0" encoding="utf-8"?>
-<p:sld xmlns:a="http://schemas.openxmlformats.org/drawingml/2006/main" xmlns:r="http://schemas.openxmlformats.org/officeDocument/2006/relationships" xmlns:p="http://schemas.openxmlformats.org/presentationml/2006/main">
+<p:sld xmlns:a="http://schemas.openxmlformats.org/drawingml/2006/main" xmlns:r="http://schemas.openxmlformats.org/officeDocument/2006/relationships" xmlns:mc="http://schemas.openxmlformats.org/markup-compatibility/2006" xmlns:mv="urn:schemas-microsoft-com:mac:vml" xmlns:p="http://schemas.openxmlformats.org/presentationml/2006/main" mc:Ignorable="mv" mc:PreserveAttributes="mv:*">
   <p:cSld>
     <p:spTree>
       <p:nvGrpSpPr>
@@ -4414,7 +4383,7 @@
 </file>
 
 <file path=ppt/slides/slide2.xml><?xml version="1.0" encoding="utf-8"?>
-<p:sld xmlns:a="http://schemas.openxmlformats.org/drawingml/2006/main" xmlns:r="http://schemas.openxmlformats.org/officeDocument/2006/relationships" xmlns:p="http://schemas.openxmlformats.org/presentationml/2006/main">
+<p:sld xmlns:a="http://schemas.openxmlformats.org/drawingml/2006/main" xmlns:r="http://schemas.openxmlformats.org/officeDocument/2006/relationships" xmlns:mc="http://schemas.openxmlformats.org/markup-compatibility/2006" xmlns:mv="urn:schemas-microsoft-com:mac:vml" xmlns:p="http://schemas.openxmlformats.org/presentationml/2006/main" mc:Ignorable="mv" mc:PreserveAttributes="mv:*">
   <p:cSld>
     <p:spTree>
       <p:nvGrpSpPr>
@@ -4484,7 +4453,11 @@
           <a:p>
             <a:r>
               <a:rPr lang="en-GB" dirty="0" smtClean="0"/>
-              <a:t>Implementation of Malware Analysis</a:t>
+              <a:t>Implementation of Malware </a:t>
+            </a:r>
+            <a:r>
+              <a:rPr lang="en-GB" dirty="0" smtClean="0"/>
+              <a:t>Analysis</a:t>
             </a:r>
           </a:p>
           <a:p>
@@ -4509,22 +4482,39 @@
             </a:r>
             <a:r>
               <a:rPr lang="en-GB" dirty="0" smtClean="0"/>
-              <a:t> HTML scan</a:t>
+              <a:t> HTML </a:t>
+            </a:r>
+            <a:r>
+              <a:rPr lang="en-GB" dirty="0" smtClean="0"/>
+              <a:t>scan</a:t>
             </a:r>
           </a:p>
           <a:p>
             <a:pPr lvl="1"/>
             <a:r>
               <a:rPr lang="en-GB" dirty="0" smtClean="0"/>
-              <a:t>Good/Bad URL Lists</a:t>
+              <a:t>Capture</a:t>
+            </a:r>
+            <a:r>
+              <a:rPr lang="en-GB" dirty="0" smtClean="0"/>
+              <a:t>-</a:t>
+            </a:r>
+            <a:r>
+              <a:rPr lang="en-GB" dirty="0" smtClean="0"/>
+              <a:t>HPC</a:t>
             </a:r>
           </a:p>
           <a:p>
             <a:pPr lvl="1"/>
             <a:r>
               <a:rPr lang="en-GB" dirty="0" smtClean="0"/>
-              <a:t>Capture-HPC</a:t>
-            </a:r>
+              <a:t>Good/Bad URL </a:t>
+            </a:r>
+            <a:r>
+              <a:rPr lang="en-GB" dirty="0" smtClean="0"/>
+              <a:t>Lists</a:t>
+            </a:r>
+            <a:endParaRPr lang="en-GB" dirty="0" smtClean="0"/>
           </a:p>
           <a:p>
             <a:r>
@@ -4560,11 +4550,18 @@
   <p:clrMapOvr>
     <a:masterClrMapping/>
   </p:clrMapOvr>
+  <p:timing>
+    <p:tnLst>
+      <p:par>
+        <p:cTn id="1" dur="indefinite" restart="never" nodeType="tmRoot"/>
+      </p:par>
+    </p:tnLst>
+  </p:timing>
 </p:sld>
 </file>
 
 <file path=ppt/slides/slide3.xml><?xml version="1.0" encoding="utf-8"?>
-<p:sld xmlns:a="http://schemas.openxmlformats.org/drawingml/2006/main" xmlns:r="http://schemas.openxmlformats.org/officeDocument/2006/relationships" xmlns:p="http://schemas.openxmlformats.org/presentationml/2006/main">
+<p:sld xmlns:a="http://schemas.openxmlformats.org/drawingml/2006/main" xmlns:r="http://schemas.openxmlformats.org/officeDocument/2006/relationships" xmlns:mc="http://schemas.openxmlformats.org/markup-compatibility/2006" xmlns:mv="urn:schemas-microsoft-com:mac:vml" xmlns:p="http://schemas.openxmlformats.org/presentationml/2006/main" mc:Ignorable="mv" mc:PreserveAttributes="mv:*">
   <p:cSld>
     <p:spTree>
       <p:nvGrpSpPr>
@@ -4626,11 +4623,7 @@
           <a:p>
             <a:r>
               <a:rPr lang="en-GB" dirty="0" smtClean="0"/>
-              <a:t>Is </a:t>
-            </a:r>
-            <a:r>
-              <a:rPr lang="en-GB" dirty="0" smtClean="0"/>
-              <a:t>Malware targeted towards trends?</a:t>
+              <a:t>Is Malware targeted towards trends?</a:t>
             </a:r>
           </a:p>
           <a:p>
@@ -4686,7 +4679,7 @@
 </file>
 
 <file path=ppt/slides/slide4.xml><?xml version="1.0" encoding="utf-8"?>
-<p:sld xmlns:a="http://schemas.openxmlformats.org/drawingml/2006/main" xmlns:r="http://schemas.openxmlformats.org/officeDocument/2006/relationships" xmlns:p="http://schemas.openxmlformats.org/presentationml/2006/main">
+<p:sld xmlns:a="http://schemas.openxmlformats.org/drawingml/2006/main" xmlns:r="http://schemas.openxmlformats.org/officeDocument/2006/relationships" xmlns:mc="http://schemas.openxmlformats.org/markup-compatibility/2006" xmlns:mv="urn:schemas-microsoft-com:mac:vml" xmlns:p="http://schemas.openxmlformats.org/presentationml/2006/main" mc:Ignorable="mv" mc:PreserveAttributes="mv:*">
   <p:cSld>
     <p:spTree>
       <p:nvGrpSpPr>
@@ -5343,7 +5336,7 @@
 </file>
 
 <file path=ppt/slides/slide5.xml><?xml version="1.0" encoding="utf-8"?>
-<p:sld xmlns:a="http://schemas.openxmlformats.org/drawingml/2006/main" xmlns:r="http://schemas.openxmlformats.org/officeDocument/2006/relationships" xmlns:p="http://schemas.openxmlformats.org/presentationml/2006/main">
+<p:sld xmlns:a="http://schemas.openxmlformats.org/drawingml/2006/main" xmlns:r="http://schemas.openxmlformats.org/officeDocument/2006/relationships" xmlns:mc="http://schemas.openxmlformats.org/markup-compatibility/2006" xmlns:mv="urn:schemas-microsoft-com:mac:vml" xmlns:p="http://schemas.openxmlformats.org/presentationml/2006/main" mc:Ignorable="mv" mc:PreserveAttributes="mv:*">
   <p:cSld>
     <p:spTree>
       <p:nvGrpSpPr>
@@ -5375,10 +5368,10 @@
           <a:lstStyle/>
           <a:p>
             <a:r>
-              <a:rPr lang="en-GB" dirty="0" smtClean="0"/>
-              <a:t>URL Classification</a:t>
-            </a:r>
-            <a:endParaRPr lang="en-GB" dirty="0"/>
+              <a:rPr lang="en-US" dirty="0" smtClean="0"/>
+              <a:t>Malware Analysis Implementation</a:t>
+            </a:r>
+            <a:endParaRPr lang="en-US" dirty="0"/>
           </a:p>
         </p:txBody>
       </p:sp>
@@ -5394,80 +5387,10 @@
         </p:nvSpPr>
         <p:spPr/>
         <p:txBody>
-          <a:bodyPr>
-            <a:normAutofit/>
-          </a:bodyPr>
-          <a:lstStyle/>
-          <a:p>
-            <a:r>
-              <a:rPr lang="en-GB" dirty="0"/>
-              <a:t>Malware detection based on repetition of the trendy keyword</a:t>
-            </a:r>
-            <a:r>
-              <a:rPr lang="en-GB" dirty="0" smtClean="0"/>
-              <a:t>:</a:t>
-            </a:r>
-            <a:endParaRPr lang="en-GB" dirty="0"/>
-          </a:p>
-          <a:p>
-            <a:pPr lvl="1"/>
-            <a:r>
-              <a:rPr lang="en-GB" dirty="0" smtClean="0"/>
-              <a:t>Analyse </a:t>
-            </a:r>
-            <a:r>
-              <a:rPr lang="en-GB" dirty="0"/>
-              <a:t>the content of the given URL (Crawling</a:t>
-            </a:r>
-            <a:r>
-              <a:rPr lang="en-GB" dirty="0" smtClean="0"/>
-              <a:t>)</a:t>
-            </a:r>
-            <a:endParaRPr lang="en-GB" dirty="0"/>
-          </a:p>
-          <a:p>
-            <a:pPr lvl="1"/>
-            <a:r>
-              <a:rPr lang="en-GB" dirty="0" smtClean="0"/>
-              <a:t>Check </a:t>
-            </a:r>
-            <a:r>
-              <a:rPr lang="en-GB" dirty="0"/>
-              <a:t>content of each hyperlink on the </a:t>
-            </a:r>
-            <a:r>
-              <a:rPr lang="en-GB" dirty="0" smtClean="0"/>
-              <a:t>webpage</a:t>
-            </a:r>
-            <a:endParaRPr lang="en-GB" dirty="0"/>
-          </a:p>
-          <a:p>
-            <a:pPr lvl="1"/>
-            <a:r>
-              <a:rPr lang="en-GB" dirty="0" smtClean="0"/>
-              <a:t>Consider </a:t>
-            </a:r>
-            <a:r>
-              <a:rPr lang="en-GB" dirty="0"/>
-              <a:t>frequently of reappearances of trendy </a:t>
-            </a:r>
-            <a:r>
-              <a:rPr lang="en-GB" dirty="0" smtClean="0"/>
-              <a:t>keyword</a:t>
-            </a:r>
-            <a:endParaRPr lang="en-GB" dirty="0"/>
-          </a:p>
-          <a:p>
-            <a:pPr lvl="1"/>
-            <a:r>
-              <a:rPr lang="en-GB" dirty="0" smtClean="0"/>
-              <a:t>Used </a:t>
-            </a:r>
-            <a:r>
-              <a:rPr lang="en-GB" dirty="0"/>
-              <a:t>the result of this algorithm for URL classification</a:t>
-            </a:r>
-            <a:endParaRPr lang="en-GB" dirty="0"/>
+          <a:bodyPr/>
+          <a:lstStyle/>
+          <a:p>
+            <a:endParaRPr lang="en-US"/>
           </a:p>
         </p:txBody>
       </p:sp>
@@ -5480,7 +5403,7 @@
 </file>
 
 <file path=ppt/slides/slide6.xml><?xml version="1.0" encoding="utf-8"?>
-<p:sld xmlns:a="http://schemas.openxmlformats.org/drawingml/2006/main" xmlns:r="http://schemas.openxmlformats.org/officeDocument/2006/relationships" xmlns:p="http://schemas.openxmlformats.org/presentationml/2006/main">
+<p:sld xmlns:a="http://schemas.openxmlformats.org/drawingml/2006/main" xmlns:r="http://schemas.openxmlformats.org/officeDocument/2006/relationships" xmlns:mc="http://schemas.openxmlformats.org/markup-compatibility/2006" xmlns:mv="urn:schemas-microsoft-com:mac:vml" xmlns:p="http://schemas.openxmlformats.org/presentationml/2006/main" mc:Ignorable="mv" mc:PreserveAttributes="mv:*">
   <p:cSld>
     <p:spTree>
       <p:nvGrpSpPr>
@@ -5519,6 +5442,142 @@
           </a:p>
         </p:txBody>
       </p:sp>
+      <p:sp>
+        <p:nvSpPr>
+          <p:cNvPr id="3" name="Content Placeholder 2"/>
+          <p:cNvSpPr>
+            <a:spLocks noGrp="1"/>
+          </p:cNvSpPr>
+          <p:nvPr>
+            <p:ph idx="1"/>
+          </p:nvPr>
+        </p:nvSpPr>
+        <p:spPr/>
+        <p:txBody>
+          <a:bodyPr>
+            <a:normAutofit/>
+          </a:bodyPr>
+          <a:lstStyle/>
+          <a:p>
+            <a:r>
+              <a:rPr lang="en-GB" dirty="0"/>
+              <a:t>Malware detection based on repetition of the trendy keyword</a:t>
+            </a:r>
+            <a:r>
+              <a:rPr lang="en-GB" dirty="0" smtClean="0"/>
+              <a:t>:</a:t>
+            </a:r>
+            <a:endParaRPr lang="en-GB" dirty="0"/>
+          </a:p>
+          <a:p>
+            <a:pPr lvl="1"/>
+            <a:r>
+              <a:rPr lang="en-GB" dirty="0" smtClean="0"/>
+              <a:t>Analyse </a:t>
+            </a:r>
+            <a:r>
+              <a:rPr lang="en-GB" dirty="0"/>
+              <a:t>the content of the given URL (Crawling</a:t>
+            </a:r>
+            <a:r>
+              <a:rPr lang="en-GB" dirty="0" smtClean="0"/>
+              <a:t>)</a:t>
+            </a:r>
+            <a:endParaRPr lang="en-GB" dirty="0"/>
+          </a:p>
+          <a:p>
+            <a:pPr lvl="1"/>
+            <a:r>
+              <a:rPr lang="en-GB" dirty="0" smtClean="0"/>
+              <a:t>Check </a:t>
+            </a:r>
+            <a:r>
+              <a:rPr lang="en-GB" dirty="0"/>
+              <a:t>content of each hyperlink on the </a:t>
+            </a:r>
+            <a:r>
+              <a:rPr lang="en-GB" dirty="0" smtClean="0"/>
+              <a:t>webpage</a:t>
+            </a:r>
+            <a:endParaRPr lang="en-GB" dirty="0"/>
+          </a:p>
+          <a:p>
+            <a:pPr lvl="1"/>
+            <a:r>
+              <a:rPr lang="en-GB" dirty="0" smtClean="0"/>
+              <a:t>Consider </a:t>
+            </a:r>
+            <a:r>
+              <a:rPr lang="en-GB" dirty="0"/>
+              <a:t>frequently of reappearances of trendy </a:t>
+            </a:r>
+            <a:r>
+              <a:rPr lang="en-GB" dirty="0" smtClean="0"/>
+              <a:t>keyword</a:t>
+            </a:r>
+            <a:endParaRPr lang="en-GB" dirty="0"/>
+          </a:p>
+          <a:p>
+            <a:pPr lvl="1"/>
+            <a:r>
+              <a:rPr lang="en-GB" dirty="0" smtClean="0"/>
+              <a:t>Used </a:t>
+            </a:r>
+            <a:r>
+              <a:rPr lang="en-GB" dirty="0"/>
+              <a:t>the result of this algorithm for URL classification</a:t>
+            </a:r>
+          </a:p>
+        </p:txBody>
+      </p:sp>
+    </p:spTree>
+  </p:cSld>
+  <p:clrMapOvr>
+    <a:masterClrMapping/>
+  </p:clrMapOvr>
+</p:sld>
+</file>
+
+<file path=ppt/slides/slide7.xml><?xml version="1.0" encoding="utf-8"?>
+<p:sld xmlns:a="http://schemas.openxmlformats.org/drawingml/2006/main" xmlns:r="http://schemas.openxmlformats.org/officeDocument/2006/relationships" xmlns:mc="http://schemas.openxmlformats.org/markup-compatibility/2006" xmlns:mv="urn:schemas-microsoft-com:mac:vml" xmlns:p="http://schemas.openxmlformats.org/presentationml/2006/main" mc:Ignorable="mv" mc:PreserveAttributes="mv:*">
+  <p:cSld>
+    <p:spTree>
+      <p:nvGrpSpPr>
+        <p:cNvPr id="1" name=""/>
+        <p:cNvGrpSpPr/>
+        <p:nvPr/>
+      </p:nvGrpSpPr>
+      <p:grpSpPr>
+        <a:xfrm>
+          <a:off x="0" y="0"/>
+          <a:ext cx="0" cy="0"/>
+          <a:chOff x="0" y="0"/>
+          <a:chExt cx="0" cy="0"/>
+        </a:xfrm>
+      </p:grpSpPr>
+      <p:sp>
+        <p:nvSpPr>
+          <p:cNvPr id="2" name="Title 1"/>
+          <p:cNvSpPr>
+            <a:spLocks noGrp="1"/>
+          </p:cNvSpPr>
+          <p:nvPr>
+            <p:ph type="title"/>
+          </p:nvPr>
+        </p:nvSpPr>
+        <p:spPr/>
+        <p:txBody>
+          <a:bodyPr/>
+          <a:lstStyle/>
+          <a:p>
+            <a:r>
+              <a:rPr lang="en-GB" dirty="0" smtClean="0"/>
+              <a:t>URL Classification</a:t>
+            </a:r>
+            <a:endParaRPr lang="en-GB" dirty="0"/>
+          </a:p>
+        </p:txBody>
+      </p:sp>
       <p:pic>
         <p:nvPicPr>
           <p:cNvPr id="4" name="Content Placeholder 3"/>
@@ -5533,7 +5592,7 @@
           <a:blip r:embed="rId2">
             <a:extLst>
               <a:ext uri="{28A0092B-C50C-407E-A947-70E740481C1C}">
-                <a14:useLocalDpi xmlns:a14="http://schemas.microsoft.com/office/drawing/2010/main" val="0"/>
+                <a14:useLocalDpi xmlns:a14="http://schemas.microsoft.com/office/drawing/2010/main" xmlns:p="http://schemas.openxmlformats.org/presentationml/2006/main" xmlns:r="http://schemas.openxmlformats.org/officeDocument/2006/relationships" xmlns:a="http://schemas.openxmlformats.org/drawingml/2006/main" xmlns="" val="0"/>
               </a:ext>
             </a:extLst>
           </a:blip>
@@ -5551,7 +5610,7 @@
     </p:spTree>
     <p:extLst>
       <p:ext uri="{BB962C8B-B14F-4D97-AF65-F5344CB8AC3E}">
-        <p14:creationId xmlns:p14="http://schemas.microsoft.com/office/powerpoint/2010/main" val="1770833103"/>
+        <p14:creationId xmlns:p14="http://schemas.microsoft.com/office/powerpoint/2010/main" xmlns:p="http://schemas.openxmlformats.org/presentationml/2006/main" xmlns:r="http://schemas.openxmlformats.org/officeDocument/2006/relationships" xmlns:a="http://schemas.openxmlformats.org/drawingml/2006/main" xmlns="" val="1770833103"/>
       </p:ext>
     </p:extLst>
   </p:cSld>
@@ -5561,8 +5620,8 @@
 </p:sld>
 </file>
 
-<file path=ppt/slides/slide7.xml><?xml version="1.0" encoding="utf-8"?>
-<p:sld xmlns:a="http://schemas.openxmlformats.org/drawingml/2006/main" xmlns:r="http://schemas.openxmlformats.org/officeDocument/2006/relationships" xmlns:p="http://schemas.openxmlformats.org/presentationml/2006/main">
+<file path=ppt/slides/slide8.xml><?xml version="1.0" encoding="utf-8"?>
+<p:sld xmlns:a="http://schemas.openxmlformats.org/drawingml/2006/main" xmlns:r="http://schemas.openxmlformats.org/officeDocument/2006/relationships" xmlns:mc="http://schemas.openxmlformats.org/markup-compatibility/2006" xmlns:mv="urn:schemas-microsoft-com:mac:vml" xmlns:p="http://schemas.openxmlformats.org/presentationml/2006/main" mc:Ignorable="mv" mc:PreserveAttributes="mv:*">
   <p:cSld>
     <p:spTree>
       <p:nvGrpSpPr>
@@ -5702,7 +5761,7 @@
     </p:spTree>
     <p:extLst>
       <p:ext uri="{BB962C8B-B14F-4D97-AF65-F5344CB8AC3E}">
-        <p14:creationId xmlns:p14="http://schemas.microsoft.com/office/powerpoint/2010/main" val="372575986"/>
+        <p14:creationId xmlns:p14="http://schemas.microsoft.com/office/powerpoint/2010/main" xmlns:p="http://schemas.openxmlformats.org/presentationml/2006/main" xmlns:r="http://schemas.openxmlformats.org/officeDocument/2006/relationships" xmlns:a="http://schemas.openxmlformats.org/drawingml/2006/main" xmlns="" val="372575986"/>
       </p:ext>
     </p:extLst>
   </p:cSld>
@@ -5712,8 +5771,8 @@
 </p:sld>
 </file>
 
-<file path=ppt/slides/slide8.xml><?xml version="1.0" encoding="utf-8"?>
-<p:sld xmlns:a="http://schemas.openxmlformats.org/drawingml/2006/main" xmlns:r="http://schemas.openxmlformats.org/officeDocument/2006/relationships" xmlns:p="http://schemas.openxmlformats.org/presentationml/2006/main">
+<file path=ppt/slides/slide9.xml><?xml version="1.0" encoding="utf-8"?>
+<p:sld xmlns:a="http://schemas.openxmlformats.org/drawingml/2006/main" xmlns:r="http://schemas.openxmlformats.org/officeDocument/2006/relationships" xmlns:mc="http://schemas.openxmlformats.org/markup-compatibility/2006" xmlns:mv="urn:schemas-microsoft-com:mac:vml" xmlns:p="http://schemas.openxmlformats.org/presentationml/2006/main" mc:Ignorable="mv" mc:PreserveAttributes="mv:*">
   <p:cSld>
     <p:spTree>
       <p:nvGrpSpPr>
@@ -5785,144 +5844,50 @@
           <a:p>
             <a:r>
               <a:rPr lang="en-GB" dirty="0"/>
-              <a:t>Open suspicious URLs with Internet Explorer 6 by </a:t>
-            </a:r>
-            <a:r>
-              <a:rPr lang="en-GB" dirty="0" err="1"/>
-              <a:t>WineHQ</a:t>
+              <a:t>Open suspicious URLs with Internet Explorer 6</a:t>
+            </a:r>
+            <a:r>
+              <a:rPr lang="en-GB" dirty="0" smtClean="0"/>
+              <a:t> </a:t>
+            </a:r>
+            <a:r>
+              <a:rPr lang="en-GB" dirty="0" smtClean="0"/>
+              <a:t>under</a:t>
+            </a:r>
+            <a:r>
+              <a:rPr lang="en-GB" dirty="0" smtClean="0"/>
+              <a:t> Wine.</a:t>
+            </a:r>
+            <a:endParaRPr lang="en-GB" dirty="0"/>
+          </a:p>
+          <a:p>
+            <a:r>
+              <a:rPr lang="en-GB" dirty="0" smtClean="0"/>
+              <a:t>Wine is not </a:t>
             </a:r>
             <a:r>
               <a:rPr lang="en-GB" dirty="0"/>
-              <a:t>.</a:t>
-            </a:r>
-          </a:p>
-          <a:p>
-            <a:r>
-              <a:rPr lang="en-GB" dirty="0" err="1"/>
-              <a:t>WineHQ</a:t>
-            </a:r>
+              <a:t>a Windows emulator for non-Windows OS.</a:t>
+            </a:r>
+          </a:p>
+          <a:p>
             <a:r>
               <a:rPr lang="en-GB" dirty="0"/>
-              <a:t> is a Windows emulator for non-Windows OS.</a:t>
-            </a:r>
-          </a:p>
-          <a:p>
+              <a:t>Each IE instance is </a:t>
+            </a:r>
+            <a:r>
+              <a:rPr lang="en-GB" dirty="0" smtClean="0"/>
+              <a:t>run </a:t>
+            </a:r>
             <a:r>
               <a:rPr lang="en-GB" dirty="0"/>
-              <a:t>Each IE instance is ran in a separate Wine-prefix, i.e. an isolated temp virtual Windows environment. </a:t>
+              <a:t>in a separate Wine-prefix, i.e. an isolated temp virtual Windows environment. </a:t>
             </a:r>
           </a:p>
           <a:p>
             <a:r>
               <a:rPr lang="en-GB" dirty="0"/>
               <a:t>Check for file system activities after that. </a:t>
-            </a:r>
-          </a:p>
-        </p:txBody>
-      </p:sp>
-    </p:spTree>
-  </p:cSld>
-  <p:clrMapOvr>
-    <a:masterClrMapping/>
-  </p:clrMapOvr>
-</p:sld>
-</file>
-
-<file path=ppt/slides/slide9.xml><?xml version="1.0" encoding="utf-8"?>
-<p:sld xmlns:a="http://schemas.openxmlformats.org/drawingml/2006/main" xmlns:r="http://schemas.openxmlformats.org/officeDocument/2006/relationships" xmlns:p="http://schemas.openxmlformats.org/presentationml/2006/main">
-  <p:cSld>
-    <p:spTree>
-      <p:nvGrpSpPr>
-        <p:cNvPr id="1" name=""/>
-        <p:cNvGrpSpPr/>
-        <p:nvPr/>
-      </p:nvGrpSpPr>
-      <p:grpSpPr>
-        <a:xfrm>
-          <a:off x="0" y="0"/>
-          <a:ext cx="0" cy="0"/>
-          <a:chOff x="0" y="0"/>
-          <a:chExt cx="0" cy="0"/>
-        </a:xfrm>
-      </p:grpSpPr>
-      <p:sp>
-        <p:nvSpPr>
-          <p:cNvPr id="2" name="Title 1"/>
-          <p:cNvSpPr>
-            <a:spLocks noGrp="1"/>
-          </p:cNvSpPr>
-          <p:nvPr>
-            <p:ph type="title"/>
-          </p:nvPr>
-        </p:nvSpPr>
-        <p:spPr/>
-        <p:txBody>
-          <a:bodyPr/>
-          <a:lstStyle/>
-          <a:p>
-            <a:r>
-              <a:rPr lang="en-GB" dirty="0" smtClean="0"/>
-              <a:t>Clam AV HTML Scan</a:t>
-            </a:r>
-            <a:endParaRPr lang="en-GB" dirty="0"/>
-          </a:p>
-        </p:txBody>
-      </p:sp>
-      <p:sp>
-        <p:nvSpPr>
-          <p:cNvPr id="3" name="Content Placeholder 2"/>
-          <p:cNvSpPr>
-            <a:spLocks noGrp="1"/>
-          </p:cNvSpPr>
-          <p:nvPr>
-            <p:ph idx="1"/>
-          </p:nvPr>
-        </p:nvSpPr>
-        <p:spPr/>
-        <p:txBody>
-          <a:bodyPr/>
-          <a:lstStyle/>
-          <a:p>
-            <a:r>
-              <a:rPr lang="en-GB" dirty="0"/>
-              <a:t>Low </a:t>
-            </a:r>
-            <a:r>
-              <a:rPr lang="en-GB" dirty="0" smtClean="0"/>
-              <a:t>interaction </a:t>
-            </a:r>
-            <a:r>
-              <a:rPr lang="en-GB" dirty="0"/>
-              <a:t>malware detection.</a:t>
-            </a:r>
-          </a:p>
-          <a:p>
-            <a:r>
-              <a:rPr lang="en-GB" dirty="0"/>
-              <a:t>Download the content of a suspicious URL then scan with </a:t>
-            </a:r>
-            <a:r>
-              <a:rPr lang="en-GB" dirty="0" err="1"/>
-              <a:t>ClamAV</a:t>
-            </a:r>
-            <a:r>
-              <a:rPr lang="en-GB" dirty="0"/>
-              <a:t>. </a:t>
-            </a:r>
-          </a:p>
-          <a:p>
-            <a:endParaRPr lang="en-GB" dirty="0"/>
-          </a:p>
-          <a:p>
-            <a:r>
-              <a:rPr lang="en-GB" dirty="0"/>
-              <a:t>Both high interactive and low interactive approaches are achieved with Python. </a:t>
-            </a:r>
-          </a:p>
-          <a:p>
-            <a:r>
-              <a:rPr lang="en-GB" dirty="0"/>
-              <a:t>Concurrent processing via threading. </a:t>
             </a:r>
           </a:p>
         </p:txBody>

</xml_diff>

<commit_message>
added @graingert's slides to presentation 2
</commit_message>
<xml_diff>
--- a/doc/pres2/wk8-progress.pptx
+++ b/doc/pres2/wk8-progress.pptx
@@ -5,10 +5,10 @@
     <p:sldMasterId id="2147483648" r:id="rId1"/>
   </p:sldMasterIdLst>
   <p:notesMasterIdLst>
-    <p:notesMasterId r:id="rId19"/>
+    <p:notesMasterId r:id="rId21"/>
   </p:notesMasterIdLst>
   <p:handoutMasterIdLst>
-    <p:handoutMasterId r:id="rId20"/>
+    <p:handoutMasterId r:id="rId22"/>
   </p:handoutMasterIdLst>
   <p:sldIdLst>
     <p:sldId id="256" r:id="rId2"/>
@@ -16,18 +16,20 @@
     <p:sldId id="257" r:id="rId4"/>
     <p:sldId id="264" r:id="rId5"/>
     <p:sldId id="288" r:id="rId6"/>
-    <p:sldId id="279" r:id="rId7"/>
-    <p:sldId id="286" r:id="rId8"/>
-    <p:sldId id="287" r:id="rId9"/>
-    <p:sldId id="280" r:id="rId10"/>
-    <p:sldId id="281" r:id="rId11"/>
-    <p:sldId id="285" r:id="rId12"/>
-    <p:sldId id="282" r:id="rId13"/>
-    <p:sldId id="283" r:id="rId14"/>
-    <p:sldId id="284" r:id="rId15"/>
-    <p:sldId id="270" r:id="rId16"/>
-    <p:sldId id="272" r:id="rId17"/>
-    <p:sldId id="273" r:id="rId18"/>
+    <p:sldId id="289" r:id="rId7"/>
+    <p:sldId id="279" r:id="rId8"/>
+    <p:sldId id="290" r:id="rId9"/>
+    <p:sldId id="287" r:id="rId10"/>
+    <p:sldId id="280" r:id="rId11"/>
+    <p:sldId id="281" r:id="rId12"/>
+    <p:sldId id="285" r:id="rId13"/>
+    <p:sldId id="282" r:id="rId14"/>
+    <p:sldId id="291" r:id="rId15"/>
+    <p:sldId id="283" r:id="rId16"/>
+    <p:sldId id="284" r:id="rId17"/>
+    <p:sldId id="270" r:id="rId18"/>
+    <p:sldId id="272" r:id="rId19"/>
+    <p:sldId id="273" r:id="rId20"/>
   </p:sldIdLst>
   <p:sldSz cx="9144000" cy="6858000" type="screen4x3"/>
   <p:notesSz cx="6858000" cy="9144000"/>
@@ -227,7 +229,7 @@
             <a:fld id="{18F98EB7-082C-9949-BFCA-B4BAD2D6FDBD}" type="datetimeFigureOut">
               <a:rPr lang="en-US" smtClean="0"/>
               <a:pPr/>
-              <a:t>11/19/12</a:t>
+              <a:t>11/20/12</a:t>
             </a:fld>
             <a:endParaRPr lang="en-US"/>
           </a:p>
@@ -303,7 +305,7 @@
     </p:spTree>
     <p:extLst>
       <p:ext uri="{BB962C8B-B14F-4D97-AF65-F5344CB8AC3E}">
-        <p14:creationId xmlns:p14="http://schemas.microsoft.com/office/powerpoint/2010/main" xmlns:p="http://schemas.openxmlformats.org/presentationml/2006/main" xmlns:r="http://schemas.openxmlformats.org/officeDocument/2006/relationships" xmlns:a="http://schemas.openxmlformats.org/drawingml/2006/main" xmlns="" val="1901348598"/>
+        <p14:creationId xmlns:mc="http://schemas.openxmlformats.org/markup-compatibility/2006" xmlns:mv="urn:schemas-microsoft-com:mac:vml" xmlns:p14="http://schemas.microsoft.com/office/powerpoint/2010/main" xmlns:p="http://schemas.openxmlformats.org/presentationml/2006/main" xmlns:r="http://schemas.openxmlformats.org/officeDocument/2006/relationships" xmlns:a="http://schemas.openxmlformats.org/drawingml/2006/main" xmlns="" val="1901348598"/>
       </p:ext>
     </p:extLst>
   </p:cSld>
@@ -394,7 +396,7 @@
             <a:fld id="{5C465251-34BA-484B-BD29-7371F8FBFAE2}" type="datetimeFigureOut">
               <a:rPr lang="en-GB" smtClean="0"/>
               <a:pPr/>
-              <a:t>11/19/12</a:t>
+              <a:t>11/20/12</a:t>
             </a:fld>
             <a:endParaRPr lang="en-GB"/>
           </a:p>
@@ -565,7 +567,7 @@
     </p:spTree>
     <p:extLst>
       <p:ext uri="{BB962C8B-B14F-4D97-AF65-F5344CB8AC3E}">
-        <p14:creationId xmlns:p14="http://schemas.microsoft.com/office/powerpoint/2010/main" xmlns:p="http://schemas.openxmlformats.org/presentationml/2006/main" xmlns:r="http://schemas.openxmlformats.org/officeDocument/2006/relationships" xmlns:a="http://schemas.openxmlformats.org/drawingml/2006/main" xmlns="" val="1219798393"/>
+        <p14:creationId xmlns:mc="http://schemas.openxmlformats.org/markup-compatibility/2006" xmlns:mv="urn:schemas-microsoft-com:mac:vml" xmlns:p14="http://schemas.microsoft.com/office/powerpoint/2010/main" xmlns:p="http://schemas.openxmlformats.org/presentationml/2006/main" xmlns:r="http://schemas.openxmlformats.org/officeDocument/2006/relationships" xmlns:a="http://schemas.openxmlformats.org/drawingml/2006/main" xmlns="" val="1219798393"/>
       </p:ext>
     </p:extLst>
   </p:cSld>
@@ -847,7 +849,7 @@
             <a:fld id="{9B2BCD74-F7F5-4BD6-83D7-1EBC56D75222}" type="datetimeFigureOut">
               <a:rPr lang="en-GB" smtClean="0"/>
               <a:pPr/>
-              <a:t>11/19/12</a:t>
+              <a:t>11/20/12</a:t>
             </a:fld>
             <a:endParaRPr lang="en-GB"/>
           </a:p>
@@ -1021,7 +1023,7 @@
             <a:fld id="{9B2BCD74-F7F5-4BD6-83D7-1EBC56D75222}" type="datetimeFigureOut">
               <a:rPr lang="en-GB" smtClean="0"/>
               <a:pPr/>
-              <a:t>11/19/12</a:t>
+              <a:t>11/20/12</a:t>
             </a:fld>
             <a:endParaRPr lang="en-GB"/>
           </a:p>
@@ -1198,7 +1200,7 @@
             <a:fld id="{9B2BCD74-F7F5-4BD6-83D7-1EBC56D75222}" type="datetimeFigureOut">
               <a:rPr lang="en-GB" smtClean="0"/>
               <a:pPr/>
-              <a:t>11/19/12</a:t>
+              <a:t>11/20/12</a:t>
             </a:fld>
             <a:endParaRPr lang="en-GB"/>
           </a:p>
@@ -1365,7 +1367,7 @@
             <a:fld id="{9B2BCD74-F7F5-4BD6-83D7-1EBC56D75222}" type="datetimeFigureOut">
               <a:rPr lang="en-GB" smtClean="0"/>
               <a:pPr/>
-              <a:t>11/19/12</a:t>
+              <a:t>11/20/12</a:t>
             </a:fld>
             <a:endParaRPr lang="en-GB"/>
           </a:p>
@@ -1608,7 +1610,7 @@
             <a:fld id="{9B2BCD74-F7F5-4BD6-83D7-1EBC56D75222}" type="datetimeFigureOut">
               <a:rPr lang="en-GB" smtClean="0"/>
               <a:pPr/>
-              <a:t>11/19/12</a:t>
+              <a:t>11/20/12</a:t>
             </a:fld>
             <a:endParaRPr lang="en-GB"/>
           </a:p>
@@ -1893,7 +1895,7 @@
             <a:fld id="{9B2BCD74-F7F5-4BD6-83D7-1EBC56D75222}" type="datetimeFigureOut">
               <a:rPr lang="en-GB" smtClean="0"/>
               <a:pPr/>
-              <a:t>11/19/12</a:t>
+              <a:t>11/20/12</a:t>
             </a:fld>
             <a:endParaRPr lang="en-GB"/>
           </a:p>
@@ -2312,7 +2314,7 @@
             <a:fld id="{9B2BCD74-F7F5-4BD6-83D7-1EBC56D75222}" type="datetimeFigureOut">
               <a:rPr lang="en-GB" smtClean="0"/>
               <a:pPr/>
-              <a:t>11/19/12</a:t>
+              <a:t>11/20/12</a:t>
             </a:fld>
             <a:endParaRPr lang="en-GB"/>
           </a:p>
@@ -2427,7 +2429,7 @@
             <a:fld id="{9B2BCD74-F7F5-4BD6-83D7-1EBC56D75222}" type="datetimeFigureOut">
               <a:rPr lang="en-GB" smtClean="0"/>
               <a:pPr/>
-              <a:t>11/19/12</a:t>
+              <a:t>11/20/12</a:t>
             </a:fld>
             <a:endParaRPr lang="en-GB"/>
           </a:p>
@@ -2519,7 +2521,7 @@
             <a:fld id="{9B2BCD74-F7F5-4BD6-83D7-1EBC56D75222}" type="datetimeFigureOut">
               <a:rPr lang="en-GB" smtClean="0"/>
               <a:pPr/>
-              <a:t>11/19/12</a:t>
+              <a:t>11/20/12</a:t>
             </a:fld>
             <a:endParaRPr lang="en-GB"/>
           </a:p>
@@ -2793,7 +2795,7 @@
             <a:fld id="{9B2BCD74-F7F5-4BD6-83D7-1EBC56D75222}" type="datetimeFigureOut">
               <a:rPr lang="en-GB" smtClean="0"/>
               <a:pPr/>
-              <a:t>11/19/12</a:t>
+              <a:t>11/20/12</a:t>
             </a:fld>
             <a:endParaRPr lang="en-GB"/>
           </a:p>
@@ -3043,7 +3045,7 @@
             <a:fld id="{9B2BCD74-F7F5-4BD6-83D7-1EBC56D75222}" type="datetimeFigureOut">
               <a:rPr lang="en-GB" smtClean="0"/>
               <a:pPr/>
-              <a:t>11/19/12</a:t>
+              <a:t>11/20/12</a:t>
             </a:fld>
             <a:endParaRPr lang="en-GB"/>
           </a:p>
@@ -3268,7 +3270,7 @@
             <a:fld id="{9B2BCD74-F7F5-4BD6-83D7-1EBC56D75222}" type="datetimeFigureOut">
               <a:rPr lang="en-GB" smtClean="0"/>
               <a:pPr/>
-              <a:t>11/19/12</a:t>
+              <a:t>11/20/12</a:t>
             </a:fld>
             <a:endParaRPr lang="en-GB"/>
           </a:p>
@@ -3750,7 +3752,7 @@
           <a:p>
             <a:r>
               <a:rPr lang="en-GB" dirty="0" smtClean="0"/>
-              <a:t>Clam AV HTML Scan</a:t>
+              <a:t>Internet Explorer under Wine</a:t>
             </a:r>
             <a:endParaRPr lang="en-GB" dirty="0"/>
           </a:p>
@@ -3768,12 +3770,14 @@
         </p:nvSpPr>
         <p:spPr/>
         <p:txBody>
-          <a:bodyPr/>
+          <a:bodyPr>
+            <a:normAutofit lnSpcReduction="10000"/>
+          </a:bodyPr>
           <a:lstStyle/>
           <a:p>
             <a:r>
               <a:rPr lang="en-GB" dirty="0"/>
-              <a:t>Low </a:t>
+              <a:t>High </a:t>
             </a:r>
             <a:r>
               <a:rPr lang="en-GB" dirty="0" smtClean="0"/>
@@ -3781,36 +3785,48 @@
             </a:r>
             <a:r>
               <a:rPr lang="en-GB" dirty="0"/>
-              <a:t>malware detection.</a:t>
+              <a:t>malware detection. </a:t>
             </a:r>
           </a:p>
           <a:p>
             <a:r>
               <a:rPr lang="en-GB" dirty="0"/>
-              <a:t>Download the content of a suspicious URL then scan with </a:t>
-            </a:r>
-            <a:r>
-              <a:rPr lang="en-GB" dirty="0" err="1"/>
-              <a:t>ClamAV</a:t>
+              <a:t>Open suspicious URLs with Internet Explorer 6</a:t>
+            </a:r>
+            <a:r>
+              <a:rPr lang="en-GB" dirty="0" smtClean="0"/>
+              <a:t> under Wine.</a:t>
+            </a:r>
+            <a:endParaRPr lang="en-GB" dirty="0"/>
+          </a:p>
+          <a:p>
+            <a:r>
+              <a:rPr lang="en-GB" dirty="0" smtClean="0"/>
+              <a:t>Wine is not </a:t>
             </a:r>
             <a:r>
               <a:rPr lang="en-GB" dirty="0"/>
-              <a:t>. </a:t>
-            </a:r>
-          </a:p>
-          <a:p>
-            <a:endParaRPr lang="en-GB" dirty="0"/>
+              <a:t>a Windows emulator for non-Windows OS.</a:t>
+            </a:r>
           </a:p>
           <a:p>
             <a:r>
               <a:rPr lang="en-GB" dirty="0"/>
-              <a:t>Both high interactive and low interactive approaches are achieved with Python. </a:t>
-            </a:r>
-          </a:p>
-          <a:p>
+              <a:t>Each IE instance is </a:t>
+            </a:r>
+            <a:r>
+              <a:rPr lang="en-GB" dirty="0" smtClean="0"/>
+              <a:t>run </a:t>
+            </a:r>
             <a:r>
               <a:rPr lang="en-GB" dirty="0"/>
-              <a:t>Concurrent processing via threading. </a:t>
+              <a:t>in a separate Wine-prefix, i.e. an isolated temp virtual Windows environment. </a:t>
+            </a:r>
+          </a:p>
+          <a:p>
+            <a:r>
+              <a:rPr lang="en-GB" dirty="0"/>
+              <a:t>Check for file system activities after that. </a:t>
             </a:r>
           </a:p>
         </p:txBody>
@@ -3857,7 +3873,7 @@
           <a:p>
             <a:r>
               <a:rPr lang="en-GB" dirty="0" smtClean="0"/>
-              <a:t>Capture-HPC</a:t>
+              <a:t>Clam AV HTML Scan</a:t>
             </a:r>
             <a:endParaRPr lang="en-GB" dirty="0"/>
           </a:p>
@@ -3879,33 +3895,46 @@
           <a:lstStyle/>
           <a:p>
             <a:r>
-              <a:rPr lang="en-GB" dirty="0" smtClean="0"/>
-              <a:t>Open source high-interaction “client honeypot”</a:t>
-            </a:r>
-          </a:p>
-          <a:p>
-            <a:r>
-              <a:rPr lang="en-GB" dirty="0" smtClean="0"/>
-              <a:t>Uses VM APIs combined with kernel drivers to automatically browse for malicious sites.</a:t>
-            </a:r>
-          </a:p>
-          <a:p>
-            <a:r>
-              <a:rPr lang="en-GB" dirty="0" smtClean="0"/>
-              <a:t>Slow, but provides high quality emulation of a vulnerable </a:t>
-            </a:r>
-            <a:r>
-              <a:rPr lang="en-GB" dirty="0" err="1" smtClean="0"/>
-              <a:t>envrionment</a:t>
-            </a:r>
-            <a:endParaRPr lang="en-GB" dirty="0" smtClean="0"/>
-          </a:p>
-          <a:p>
-            <a:r>
-              <a:rPr lang="en-GB" dirty="0" smtClean="0"/>
-              <a:t>Required customisation for ECS infrastructure.</a:t>
-            </a:r>
+              <a:rPr lang="en-GB" dirty="0"/>
+              <a:t>Low </a:t>
+            </a:r>
+            <a:r>
+              <a:rPr lang="en-GB" dirty="0" smtClean="0"/>
+              <a:t>interaction </a:t>
+            </a:r>
+            <a:r>
+              <a:rPr lang="en-GB" dirty="0"/>
+              <a:t>malware detection.</a:t>
+            </a:r>
+          </a:p>
+          <a:p>
+            <a:r>
+              <a:rPr lang="en-GB" dirty="0"/>
+              <a:t>Download the content of a suspicious URL then scan with </a:t>
+            </a:r>
+            <a:r>
+              <a:rPr lang="en-GB" dirty="0" err="1"/>
+              <a:t>ClamAV</a:t>
+            </a:r>
+            <a:r>
+              <a:rPr lang="en-GB" dirty="0"/>
+              <a:t>. </a:t>
+            </a:r>
+          </a:p>
+          <a:p>
             <a:endParaRPr lang="en-GB" dirty="0"/>
+          </a:p>
+          <a:p>
+            <a:r>
+              <a:rPr lang="en-GB" dirty="0"/>
+              <a:t>Both high interactive and low interactive approaches are achieved with Python. </a:t>
+            </a:r>
+          </a:p>
+          <a:p>
+            <a:r>
+              <a:rPr lang="en-GB" dirty="0"/>
+              <a:t>Concurrent processing via threading. </a:t>
+            </a:r>
           </a:p>
         </p:txBody>
       </p:sp>
@@ -3951,7 +3980,7 @@
           <a:p>
             <a:r>
               <a:rPr lang="en-GB" dirty="0" smtClean="0"/>
-              <a:t>Good/Bad URL Lists</a:t>
+              <a:t>Capture-HPC</a:t>
             </a:r>
             <a:endParaRPr lang="en-GB" dirty="0"/>
           </a:p>
@@ -3972,7 +4001,34 @@
           <a:bodyPr/>
           <a:lstStyle/>
           <a:p>
-            <a:endParaRPr lang="en-GB"/>
+            <a:r>
+              <a:rPr lang="en-GB" dirty="0" smtClean="0"/>
+              <a:t>Open source high-interaction “client honeypot”</a:t>
+            </a:r>
+          </a:p>
+          <a:p>
+            <a:r>
+              <a:rPr lang="en-GB" dirty="0" smtClean="0"/>
+              <a:t>Uses VM APIs combined with kernel drivers to automatically browse for malicious sites.</a:t>
+            </a:r>
+          </a:p>
+          <a:p>
+            <a:r>
+              <a:rPr lang="en-GB" dirty="0" smtClean="0"/>
+              <a:t>Slow, but provides high quality emulation of a vulnerable </a:t>
+            </a:r>
+            <a:r>
+              <a:rPr lang="en-GB" dirty="0" err="1" smtClean="0"/>
+              <a:t>envrionment</a:t>
+            </a:r>
+            <a:endParaRPr lang="en-GB" dirty="0" smtClean="0"/>
+          </a:p>
+          <a:p>
+            <a:r>
+              <a:rPr lang="en-GB" dirty="0" smtClean="0"/>
+              <a:t>Required customisation for ECS infrastructure.</a:t>
+            </a:r>
+            <a:endParaRPr lang="en-GB" dirty="0"/>
           </a:p>
         </p:txBody>
       </p:sp>
@@ -4018,7 +4074,7 @@
           <a:p>
             <a:r>
               <a:rPr lang="en-GB" dirty="0" smtClean="0"/>
-              <a:t>Framework Integration</a:t>
+              <a:t>Good/Bad URL Lists</a:t>
             </a:r>
             <a:endParaRPr lang="en-GB" dirty="0"/>
           </a:p>
@@ -4039,7 +4095,43 @@
           <a:bodyPr/>
           <a:lstStyle/>
           <a:p>
-            <a:endParaRPr lang="en-GB"/>
+            <a:r>
+              <a:rPr lang="en-GB" dirty="0" err="1" smtClean="0"/>
+              <a:t>Alexa</a:t>
+            </a:r>
+            <a:r>
+              <a:rPr lang="en-GB" dirty="0" smtClean="0"/>
+              <a:t>, Google “Safe Browsing Lookup API”, Web </a:t>
+            </a:r>
+            <a:r>
+              <a:rPr lang="en-GB" dirty="0" smtClean="0"/>
+              <a:t>Of Trust “WOT” API</a:t>
+            </a:r>
+          </a:p>
+          <a:p>
+            <a:r>
+              <a:rPr lang="en-GB" dirty="0" smtClean="0"/>
+              <a:t>Make request to Google or WOT, return reformatted result</a:t>
+            </a:r>
+          </a:p>
+          <a:p>
+            <a:r>
+              <a:rPr lang="en-GB" dirty="0" err="1" smtClean="0"/>
+              <a:t>Alexa</a:t>
+            </a:r>
+            <a:r>
+              <a:rPr lang="en-GB" dirty="0" smtClean="0"/>
+              <a:t> </a:t>
+            </a:r>
+            <a:r>
+              <a:rPr lang="en-GB" dirty="0" smtClean="0"/>
+              <a:t>provides daily ZIP of top million results…</a:t>
+            </a:r>
+            <a:r>
+              <a:rPr lang="en-GB" dirty="0" smtClean="0"/>
+              <a:t> </a:t>
+            </a:r>
+            <a:endParaRPr lang="en-GB" dirty="0"/>
           </a:p>
         </p:txBody>
       </p:sp>
@@ -4085,7 +4177,7 @@
           <a:p>
             <a:r>
               <a:rPr lang="en-GB" dirty="0" smtClean="0"/>
-              <a:t>Storage of Analysis Results</a:t>
+              <a:t>Good/Bad URL Lists</a:t>
             </a:r>
             <a:endParaRPr lang="en-GB" dirty="0"/>
           </a:p>
@@ -4106,7 +4198,67 @@
           <a:bodyPr/>
           <a:lstStyle/>
           <a:p>
-            <a:endParaRPr lang="en-GB"/>
+            <a:r>
+              <a:rPr lang="en-GB" dirty="0" smtClean="0"/>
+              <a:t>Daily </a:t>
+            </a:r>
+            <a:r>
+              <a:rPr lang="en-GB" dirty="0" err="1" smtClean="0"/>
+              <a:t>Celerybeat</a:t>
+            </a:r>
+            <a:r>
+              <a:rPr lang="en-GB" dirty="0" smtClean="0"/>
+              <a:t> Task</a:t>
+            </a:r>
+          </a:p>
+          <a:p>
+            <a:pPr lvl="1"/>
+            <a:r>
+              <a:rPr lang="en-GB" dirty="0" smtClean="0"/>
+              <a:t>Download, extract and store </a:t>
+            </a:r>
+            <a:r>
+              <a:rPr lang="en-GB" dirty="0" err="1" smtClean="0"/>
+              <a:t>Alexa</a:t>
+            </a:r>
+            <a:r>
+              <a:rPr lang="en-GB" dirty="0" smtClean="0"/>
+              <a:t> Zipped CSV in </a:t>
+            </a:r>
+            <a:r>
+              <a:rPr lang="en-GB" dirty="0" err="1" smtClean="0"/>
+              <a:t>Redis</a:t>
+            </a:r>
+            <a:r>
+              <a:rPr lang="en-GB" dirty="0" smtClean="0"/>
+              <a:t> write master</a:t>
+            </a:r>
+          </a:p>
+          <a:p>
+            <a:pPr lvl="1"/>
+            <a:r>
+              <a:rPr lang="en-GB" dirty="0" err="1" smtClean="0"/>
+              <a:t>Redis</a:t>
+            </a:r>
+            <a:r>
+              <a:rPr lang="en-GB" dirty="0" smtClean="0"/>
+              <a:t> read slaves on each worker machine mirror write master</a:t>
+            </a:r>
+          </a:p>
+          <a:p>
+            <a:r>
+              <a:rPr lang="en-GB" dirty="0" smtClean="0"/>
+              <a:t>Tasks check </a:t>
+            </a:r>
+            <a:r>
+              <a:rPr lang="en-GB" dirty="0" err="1" smtClean="0"/>
+              <a:t>Redis</a:t>
+            </a:r>
+            <a:r>
+              <a:rPr lang="en-GB" dirty="0" smtClean="0"/>
+              <a:t> read slave</a:t>
+            </a:r>
+            <a:endParaRPr lang="en-GB" dirty="0"/>
           </a:p>
         </p:txBody>
       </p:sp>
@@ -4152,7 +4304,7 @@
           <a:p>
             <a:r>
               <a:rPr lang="en-GB" dirty="0" smtClean="0"/>
-              <a:t>Remaining Work</a:t>
+              <a:t>Framework Integration</a:t>
             </a:r>
             <a:endParaRPr lang="en-GB" dirty="0"/>
           </a:p>
@@ -4175,41 +4327,39 @@
           <a:p>
             <a:r>
               <a:rPr lang="en-GB" dirty="0" smtClean="0"/>
-              <a:t>Web Reporting interface</a:t>
-            </a:r>
-          </a:p>
-          <a:p>
-            <a:pPr lvl="1"/>
-            <a:r>
-              <a:rPr lang="en-GB" dirty="0" smtClean="0"/>
-              <a:t>Graphing</a:t>
-            </a:r>
-          </a:p>
-          <a:p>
-            <a:r>
-              <a:rPr lang="en-GB" dirty="0" smtClean="0"/>
-              <a:t>Compile sample data for report</a:t>
-            </a:r>
-          </a:p>
-          <a:p>
-            <a:r>
-              <a:rPr lang="en-GB" dirty="0" smtClean="0"/>
-              <a:t>Produce Report</a:t>
-            </a:r>
-          </a:p>
-          <a:p>
-            <a:pPr lvl="1"/>
-            <a:r>
-              <a:rPr lang="en-GB" dirty="0" smtClean="0"/>
-              <a:t>Latex template already produce</a:t>
-            </a:r>
-          </a:p>
-          <a:p>
-            <a:pPr lvl="1"/>
-            <a:r>
-              <a:rPr lang="en-GB" dirty="0" smtClean="0"/>
-              <a:t>Including productivity tools??!</a:t>
-            </a:r>
+              <a:t>Celery on top of </a:t>
+            </a:r>
+            <a:r>
+              <a:rPr lang="en-GB" dirty="0" err="1" smtClean="0"/>
+              <a:t>RabbitMQ</a:t>
+            </a:r>
+            <a:endParaRPr lang="en-GB" dirty="0" smtClean="0"/>
+          </a:p>
+          <a:p>
+            <a:r>
+              <a:rPr lang="en-GB" dirty="0" err="1" smtClean="0"/>
+              <a:t>Celerybeat</a:t>
+            </a:r>
+            <a:r>
+              <a:rPr lang="en-GB" dirty="0" smtClean="0"/>
+              <a:t> for daily trend scan/URL list updates</a:t>
+            </a:r>
+          </a:p>
+          <a:p>
+            <a:r>
+              <a:rPr lang="en-GB" dirty="0" smtClean="0"/>
+              <a:t>Calls each task with the result of </a:t>
+            </a:r>
+            <a:r>
+              <a:rPr lang="en-GB" smtClean="0"/>
+              <a:t>the previous</a:t>
+            </a:r>
+          </a:p>
+          <a:p>
+            <a:endParaRPr lang="en-GB" dirty="0" smtClean="0"/>
+          </a:p>
+          <a:p>
+            <a:endParaRPr lang="en-GB" dirty="0"/>
           </a:p>
         </p:txBody>
       </p:sp>
@@ -4218,13 +4368,6 @@
   <p:clrMapOvr>
     <a:masterClrMapping/>
   </p:clrMapOvr>
-  <p:timing>
-    <p:tnLst>
-      <p:par>
-        <p:cTn id="1" dur="indefinite" restart="never" nodeType="tmRoot"/>
-      </p:par>
-    </p:tnLst>
-  </p:timing>
 </p:sld>
 </file>
 
@@ -4252,7 +4395,7 @@
             <a:spLocks noGrp="1"/>
           </p:cNvSpPr>
           <p:nvPr>
-            <p:ph type="ctrTitle"/>
+            <p:ph type="title"/>
           </p:nvPr>
         </p:nvSpPr>
         <p:spPr/>
@@ -4262,7 +4405,7 @@
           <a:p>
             <a:r>
               <a:rPr lang="en-GB" dirty="0" smtClean="0"/>
-              <a:t>Any Questions?</a:t>
+              <a:t>Storage of Analysis Results</a:t>
             </a:r>
             <a:endParaRPr lang="en-GB" dirty="0"/>
           </a:p>
@@ -4270,12 +4413,12 @@
       </p:sp>
       <p:sp>
         <p:nvSpPr>
-          <p:cNvPr id="3" name="Subtitle 2"/>
-          <p:cNvSpPr>
-            <a:spLocks noGrp="1"/>
-          </p:cNvSpPr>
-          <p:nvPr>
-            <p:ph type="subTitle" idx="1"/>
+          <p:cNvPr id="3" name="Content Placeholder 2"/>
+          <p:cNvSpPr>
+            <a:spLocks noGrp="1"/>
+          </p:cNvSpPr>
+          <p:nvPr>
+            <p:ph idx="1"/>
           </p:nvPr>
         </p:nvSpPr>
         <p:spPr/>
@@ -4283,7 +4426,140 @@
           <a:bodyPr/>
           <a:lstStyle/>
           <a:p>
-            <a:endParaRPr lang="en-GB"/>
+            <a:r>
+              <a:rPr lang="en-GB" dirty="0" smtClean="0"/>
+              <a:t>Want to use </a:t>
+            </a:r>
+            <a:r>
+              <a:rPr lang="en-GB" dirty="0" err="1" smtClean="0"/>
+              <a:t>Django</a:t>
+            </a:r>
+            <a:r>
+              <a:rPr lang="en-GB" dirty="0" smtClean="0"/>
+              <a:t> ORM for easy Analysis of Results</a:t>
+            </a:r>
+          </a:p>
+          <a:p>
+            <a:r>
+              <a:rPr lang="en-GB" dirty="0" smtClean="0"/>
+              <a:t>Bulk Insert, and strict database schema</a:t>
+            </a:r>
+          </a:p>
+          <a:p>
+            <a:pPr lvl="1"/>
+            <a:r>
+              <a:rPr lang="en-GB" dirty="0" smtClean="0"/>
+              <a:t>Any error will result in the entire transaction being thrown out </a:t>
+            </a:r>
+          </a:p>
+          <a:p>
+            <a:r>
+              <a:rPr lang="en-GB" dirty="0" smtClean="0"/>
+              <a:t>Use JSON schema to validate data to be stored </a:t>
+            </a:r>
+          </a:p>
+        </p:txBody>
+      </p:sp>
+    </p:spTree>
+  </p:cSld>
+  <p:clrMapOvr>
+    <a:masterClrMapping/>
+  </p:clrMapOvr>
+</p:sld>
+</file>
+
+<file path=ppt/slides/slide17.xml><?xml version="1.0" encoding="utf-8"?>
+<p:sld xmlns:a="http://schemas.openxmlformats.org/drawingml/2006/main" xmlns:r="http://schemas.openxmlformats.org/officeDocument/2006/relationships" xmlns:mc="http://schemas.openxmlformats.org/markup-compatibility/2006" xmlns:mv="urn:schemas-microsoft-com:mac:vml" xmlns:p="http://schemas.openxmlformats.org/presentationml/2006/main" mc:Ignorable="mv" mc:PreserveAttributes="mv:*">
+  <p:cSld>
+    <p:spTree>
+      <p:nvGrpSpPr>
+        <p:cNvPr id="1" name=""/>
+        <p:cNvGrpSpPr/>
+        <p:nvPr/>
+      </p:nvGrpSpPr>
+      <p:grpSpPr>
+        <a:xfrm>
+          <a:off x="0" y="0"/>
+          <a:ext cx="0" cy="0"/>
+          <a:chOff x="0" y="0"/>
+          <a:chExt cx="0" cy="0"/>
+        </a:xfrm>
+      </p:grpSpPr>
+      <p:sp>
+        <p:nvSpPr>
+          <p:cNvPr id="2" name="Title 1"/>
+          <p:cNvSpPr>
+            <a:spLocks noGrp="1"/>
+          </p:cNvSpPr>
+          <p:nvPr>
+            <p:ph type="title"/>
+          </p:nvPr>
+        </p:nvSpPr>
+        <p:spPr/>
+        <p:txBody>
+          <a:bodyPr/>
+          <a:lstStyle/>
+          <a:p>
+            <a:r>
+              <a:rPr lang="en-GB" dirty="0" smtClean="0"/>
+              <a:t>Remaining Work</a:t>
+            </a:r>
+            <a:endParaRPr lang="en-GB" dirty="0"/>
+          </a:p>
+        </p:txBody>
+      </p:sp>
+      <p:sp>
+        <p:nvSpPr>
+          <p:cNvPr id="3" name="Content Placeholder 2"/>
+          <p:cNvSpPr>
+            <a:spLocks noGrp="1"/>
+          </p:cNvSpPr>
+          <p:nvPr>
+            <p:ph idx="1"/>
+          </p:nvPr>
+        </p:nvSpPr>
+        <p:spPr/>
+        <p:txBody>
+          <a:bodyPr/>
+          <a:lstStyle/>
+          <a:p>
+            <a:r>
+              <a:rPr lang="en-GB" dirty="0" smtClean="0"/>
+              <a:t>Web Reporting interface</a:t>
+            </a:r>
+          </a:p>
+          <a:p>
+            <a:pPr lvl="1"/>
+            <a:r>
+              <a:rPr lang="en-GB" dirty="0" smtClean="0"/>
+              <a:t>Graphing</a:t>
+            </a:r>
+          </a:p>
+          <a:p>
+            <a:r>
+              <a:rPr lang="en-GB" dirty="0" smtClean="0"/>
+              <a:t>Compile sample data for report</a:t>
+            </a:r>
+          </a:p>
+          <a:p>
+            <a:r>
+              <a:rPr lang="en-GB" dirty="0" smtClean="0"/>
+              <a:t>Produce Report</a:t>
+            </a:r>
+          </a:p>
+          <a:p>
+            <a:pPr lvl="1"/>
+            <a:r>
+              <a:rPr lang="en-GB" dirty="0" smtClean="0"/>
+              <a:t>Latex template already produce</a:t>
+            </a:r>
+          </a:p>
+          <a:p>
+            <a:pPr lvl="1"/>
+            <a:r>
+              <a:rPr lang="en-GB" dirty="0" smtClean="0"/>
+              <a:t>Including productivity tools??!</a:t>
+            </a:r>
           </a:p>
         </p:txBody>
       </p:sp>
@@ -4302,7 +4578,81 @@
 </p:sld>
 </file>
 
-<file path=ppt/slides/slide17.xml><?xml version="1.0" encoding="utf-8"?>
+<file path=ppt/slides/slide18.xml><?xml version="1.0" encoding="utf-8"?>
+<p:sld xmlns:a="http://schemas.openxmlformats.org/drawingml/2006/main" xmlns:r="http://schemas.openxmlformats.org/officeDocument/2006/relationships" xmlns:mc="http://schemas.openxmlformats.org/markup-compatibility/2006" xmlns:mv="urn:schemas-microsoft-com:mac:vml" xmlns:p="http://schemas.openxmlformats.org/presentationml/2006/main" mc:Ignorable="mv" mc:PreserveAttributes="mv:*">
+  <p:cSld>
+    <p:spTree>
+      <p:nvGrpSpPr>
+        <p:cNvPr id="1" name=""/>
+        <p:cNvGrpSpPr/>
+        <p:nvPr/>
+      </p:nvGrpSpPr>
+      <p:grpSpPr>
+        <a:xfrm>
+          <a:off x="0" y="0"/>
+          <a:ext cx="0" cy="0"/>
+          <a:chOff x="0" y="0"/>
+          <a:chExt cx="0" cy="0"/>
+        </a:xfrm>
+      </p:grpSpPr>
+      <p:sp>
+        <p:nvSpPr>
+          <p:cNvPr id="2" name="Title 1"/>
+          <p:cNvSpPr>
+            <a:spLocks noGrp="1"/>
+          </p:cNvSpPr>
+          <p:nvPr>
+            <p:ph type="ctrTitle"/>
+          </p:nvPr>
+        </p:nvSpPr>
+        <p:spPr/>
+        <p:txBody>
+          <a:bodyPr/>
+          <a:lstStyle/>
+          <a:p>
+            <a:r>
+              <a:rPr lang="en-GB" dirty="0" smtClean="0"/>
+              <a:t>Any Questions?</a:t>
+            </a:r>
+            <a:endParaRPr lang="en-GB" dirty="0"/>
+          </a:p>
+        </p:txBody>
+      </p:sp>
+      <p:sp>
+        <p:nvSpPr>
+          <p:cNvPr id="3" name="Subtitle 2"/>
+          <p:cNvSpPr>
+            <a:spLocks noGrp="1"/>
+          </p:cNvSpPr>
+          <p:nvPr>
+            <p:ph type="subTitle" idx="1"/>
+          </p:nvPr>
+        </p:nvSpPr>
+        <p:spPr/>
+        <p:txBody>
+          <a:bodyPr/>
+          <a:lstStyle/>
+          <a:p>
+            <a:endParaRPr lang="en-GB"/>
+          </a:p>
+        </p:txBody>
+      </p:sp>
+    </p:spTree>
+  </p:cSld>
+  <p:clrMapOvr>
+    <a:masterClrMapping/>
+  </p:clrMapOvr>
+  <p:timing>
+    <p:tnLst>
+      <p:par>
+        <p:cTn id="1" dur="indefinite" restart="never" nodeType="tmRoot"/>
+      </p:par>
+    </p:tnLst>
+  </p:timing>
+</p:sld>
+</file>
+
+<file path=ppt/slides/slide19.xml><?xml version="1.0" encoding="utf-8"?>
 <p:sld xmlns:a="http://schemas.openxmlformats.org/drawingml/2006/main" xmlns:r="http://schemas.openxmlformats.org/officeDocument/2006/relationships" xmlns:mc="http://schemas.openxmlformats.org/markup-compatibility/2006" xmlns:mv="urn:schemas-microsoft-com:mac:vml" xmlns:p="http://schemas.openxmlformats.org/presentationml/2006/main" mc:Ignorable="mv" mc:PreserveAttributes="mv:*">
   <p:cSld>
     <p:spTree>
@@ -4453,11 +4803,7 @@
           <a:p>
             <a:r>
               <a:rPr lang="en-GB" dirty="0" smtClean="0"/>
-              <a:t>Implementation of Malware </a:t>
-            </a:r>
-            <a:r>
-              <a:rPr lang="en-GB" dirty="0" smtClean="0"/>
-              <a:t>Analysis</a:t>
+              <a:t>Implementation of Malware Analysis</a:t>
             </a:r>
           </a:p>
           <a:p>
@@ -4482,39 +4828,22 @@
             </a:r>
             <a:r>
               <a:rPr lang="en-GB" dirty="0" smtClean="0"/>
-              <a:t> HTML </a:t>
-            </a:r>
-            <a:r>
-              <a:rPr lang="en-GB" dirty="0" smtClean="0"/>
-              <a:t>scan</a:t>
+              <a:t> HTML scan</a:t>
             </a:r>
           </a:p>
           <a:p>
             <a:pPr lvl="1"/>
             <a:r>
               <a:rPr lang="en-GB" dirty="0" smtClean="0"/>
-              <a:t>Capture</a:t>
-            </a:r>
-            <a:r>
-              <a:rPr lang="en-GB" dirty="0" smtClean="0"/>
-              <a:t>-</a:t>
-            </a:r>
-            <a:r>
-              <a:rPr lang="en-GB" dirty="0" smtClean="0"/>
-              <a:t>HPC</a:t>
+              <a:t>Capture-HPC</a:t>
             </a:r>
           </a:p>
           <a:p>
             <a:pPr lvl="1"/>
             <a:r>
               <a:rPr lang="en-GB" dirty="0" smtClean="0"/>
-              <a:t>Good/Bad URL </a:t>
-            </a:r>
-            <a:r>
-              <a:rPr lang="en-GB" dirty="0" smtClean="0"/>
-              <a:t>Lists</a:t>
-            </a:r>
-            <a:endParaRPr lang="en-GB" dirty="0" smtClean="0"/>
+              <a:t>Good/Bad URL Lists</a:t>
+            </a:r>
           </a:p>
           <a:p>
             <a:r>
@@ -5399,6 +5728,13 @@
   <p:clrMapOvr>
     <a:masterClrMapping/>
   </p:clrMapOvr>
+  <p:timing>
+    <p:tnLst>
+      <p:par>
+        <p:cTn id="1" dur="indefinite" restart="never" nodeType="tmRoot"/>
+      </p:par>
+    </p:tnLst>
+  </p:timing>
 </p:sld>
 </file>
 
@@ -5435,10 +5771,10 @@
           <a:lstStyle/>
           <a:p>
             <a:r>
-              <a:rPr lang="en-GB" dirty="0" smtClean="0"/>
-              <a:t>URL Classification</a:t>
-            </a:r>
-            <a:endParaRPr lang="en-GB" dirty="0"/>
+              <a:rPr lang="en-US" dirty="0" smtClean="0"/>
+              <a:t>Malware Detection Methods</a:t>
+            </a:r>
+            <a:endParaRPr lang="en-US" dirty="0"/>
           </a:p>
         </p:txBody>
       </p:sp>
@@ -5455,78 +5791,79 @@
         <p:spPr/>
         <p:txBody>
           <a:bodyPr>
-            <a:normAutofit/>
+            <a:normAutofit lnSpcReduction="10000"/>
           </a:bodyPr>
           <a:lstStyle/>
           <a:p>
             <a:r>
-              <a:rPr lang="en-GB" dirty="0"/>
-              <a:t>Malware detection based on repetition of the trendy keyword</a:t>
-            </a:r>
-            <a:r>
-              <a:rPr lang="en-GB" dirty="0" smtClean="0"/>
-              <a:t>:</a:t>
-            </a:r>
-            <a:endParaRPr lang="en-GB" dirty="0"/>
+              <a:rPr lang="en-US" dirty="0" smtClean="0"/>
+              <a:t>No interaction malware </a:t>
+            </a:r>
+            <a:r>
+              <a:rPr lang="en-US" dirty="0" smtClean="0"/>
+              <a:t>detection</a:t>
+            </a:r>
+          </a:p>
+          <a:p>
+            <a:pPr lvl="1">
+              <a:buNone/>
+            </a:pPr>
+            <a:endParaRPr lang="en-US" dirty="0" smtClean="0"/>
+          </a:p>
+          <a:p>
+            <a:r>
+              <a:rPr lang="en-US" dirty="0" smtClean="0"/>
+              <a:t>Low interaction malware </a:t>
+            </a:r>
+            <a:r>
+              <a:rPr lang="en-US" dirty="0" smtClean="0"/>
+              <a:t>detection</a:t>
+            </a:r>
           </a:p>
           <a:p>
             <a:pPr lvl="1"/>
             <a:r>
-              <a:rPr lang="en-GB" dirty="0" smtClean="0"/>
-              <a:t>Analyse </a:t>
-            </a:r>
-            <a:r>
-              <a:rPr lang="en-GB" dirty="0"/>
-              <a:t>the content of the given URL (Crawling</a:t>
-            </a:r>
-            <a:r>
-              <a:rPr lang="en-GB" dirty="0" smtClean="0"/>
-              <a:t>)</a:t>
-            </a:r>
-            <a:endParaRPr lang="en-GB" dirty="0"/>
+              <a:rPr lang="en-US" dirty="0" smtClean="0"/>
+              <a:t>use lightweight or simulated clients to interact with the </a:t>
+            </a:r>
+            <a:r>
+              <a:rPr lang="en-US" dirty="0" smtClean="0"/>
+              <a:t>server.</a:t>
+            </a:r>
+          </a:p>
+          <a:p>
+            <a:r>
+              <a:rPr lang="en-US" dirty="0" smtClean="0"/>
+              <a:t>High interaction  malware </a:t>
+            </a:r>
+            <a:r>
+              <a:rPr lang="en-US" dirty="0" smtClean="0"/>
+              <a:t>detection</a:t>
+            </a:r>
           </a:p>
           <a:p>
             <a:pPr lvl="1"/>
             <a:r>
-              <a:rPr lang="en-GB" dirty="0" smtClean="0"/>
-              <a:t>Check </a:t>
-            </a:r>
-            <a:r>
-              <a:rPr lang="en-GB" dirty="0"/>
-              <a:t>content of each hyperlink on the </a:t>
-            </a:r>
-            <a:r>
-              <a:rPr lang="en-GB" dirty="0" smtClean="0"/>
-              <a:t>webpage</a:t>
-            </a:r>
-            <a:endParaRPr lang="en-GB" dirty="0"/>
+              <a:rPr lang="en-US" dirty="0" smtClean="0"/>
+              <a:t>Attacks</a:t>
+            </a:r>
+            <a:r>
+              <a:rPr lang="en-US" dirty="0" smtClean="0"/>
+              <a:t> are </a:t>
+            </a:r>
+            <a:r>
+              <a:rPr lang="en-US" dirty="0" smtClean="0"/>
+              <a:t>detected via inspection of the state of the system after a server has been interacted with</a:t>
+            </a:r>
+            <a:endParaRPr lang="en-US" dirty="0" smtClean="0"/>
           </a:p>
           <a:p>
             <a:pPr lvl="1"/>
             <a:r>
-              <a:rPr lang="en-GB" dirty="0" smtClean="0"/>
-              <a:t>Consider </a:t>
-            </a:r>
-            <a:r>
-              <a:rPr lang="en-GB" dirty="0"/>
-              <a:t>frequently of reappearances of trendy </a:t>
-            </a:r>
-            <a:r>
-              <a:rPr lang="en-GB" dirty="0" smtClean="0"/>
-              <a:t>keyword</a:t>
-            </a:r>
-            <a:endParaRPr lang="en-GB" dirty="0"/>
-          </a:p>
-          <a:p>
-            <a:pPr lvl="1"/>
-            <a:r>
-              <a:rPr lang="en-GB" dirty="0" smtClean="0"/>
-              <a:t>Used </a:t>
-            </a:r>
-            <a:r>
-              <a:rPr lang="en-GB" dirty="0"/>
-              <a:t>the result of this algorithm for URL classification</a:t>
-            </a:r>
+              <a:rPr lang="en-US" dirty="0" smtClean="0"/>
+              <a:t>effective at detecting unknown attacks on clients</a:t>
+            </a:r>
+            <a:endParaRPr lang="en-US" dirty="0"/>
           </a:p>
         </p:txBody>
       </p:sp>
@@ -5535,6 +5872,13 @@
   <p:clrMapOvr>
     <a:masterClrMapping/>
   </p:clrMapOvr>
+  <p:timing>
+    <p:tnLst>
+      <p:par>
+        <p:cTn id="1" dur="indefinite" restart="never" nodeType="tmRoot"/>
+      </p:par>
+    </p:tnLst>
+  </p:timing>
 </p:sld>
 </file>
 
@@ -5578,45 +5922,106 @@
           </a:p>
         </p:txBody>
       </p:sp>
-      <p:pic>
-        <p:nvPicPr>
-          <p:cNvPr id="4" name="Content Placeholder 3"/>
-          <p:cNvPicPr>
-            <a:picLocks noGrp="1" noChangeAspect="1"/>
-          </p:cNvPicPr>
+      <p:sp>
+        <p:nvSpPr>
+          <p:cNvPr id="3" name="Content Placeholder 2"/>
+          <p:cNvSpPr>
+            <a:spLocks noGrp="1"/>
+          </p:cNvSpPr>
           <p:nvPr>
             <p:ph idx="1"/>
           </p:nvPr>
-        </p:nvPicPr>
-        <p:blipFill>
-          <a:blip r:embed="rId2">
-            <a:extLst>
-              <a:ext uri="{28A0092B-C50C-407E-A947-70E740481C1C}">
-                <a14:useLocalDpi xmlns:a14="http://schemas.microsoft.com/office/drawing/2010/main" xmlns:p="http://schemas.openxmlformats.org/presentationml/2006/main" xmlns:r="http://schemas.openxmlformats.org/officeDocument/2006/relationships" xmlns:a="http://schemas.openxmlformats.org/drawingml/2006/main" xmlns="" val="0"/>
-              </a:ext>
-            </a:extLst>
-          </a:blip>
-          <a:stretch>
-            <a:fillRect/>
-          </a:stretch>
-        </p:blipFill>
-        <p:spPr>
-          <a:xfrm>
-            <a:off x="1547664" y="1292996"/>
-            <a:ext cx="6048672" cy="5140372"/>
-          </a:xfrm>
-        </p:spPr>
-      </p:pic>
+        </p:nvSpPr>
+        <p:spPr/>
+        <p:txBody>
+          <a:bodyPr>
+            <a:normAutofit/>
+          </a:bodyPr>
+          <a:lstStyle/>
+          <a:p>
+            <a:r>
+              <a:rPr lang="en-GB" dirty="0"/>
+              <a:t>Malware detection based on repetition of the trendy keyword</a:t>
+            </a:r>
+            <a:r>
+              <a:rPr lang="en-GB" dirty="0" smtClean="0"/>
+              <a:t>:</a:t>
+            </a:r>
+            <a:endParaRPr lang="en-GB" dirty="0"/>
+          </a:p>
+          <a:p>
+            <a:pPr lvl="1"/>
+            <a:r>
+              <a:rPr lang="en-GB" dirty="0" smtClean="0"/>
+              <a:t>Analyse </a:t>
+            </a:r>
+            <a:r>
+              <a:rPr lang="en-GB" dirty="0"/>
+              <a:t>the content of the given URL (Crawling</a:t>
+            </a:r>
+            <a:r>
+              <a:rPr lang="en-GB" dirty="0" smtClean="0"/>
+              <a:t>)</a:t>
+            </a:r>
+            <a:endParaRPr lang="en-GB" dirty="0"/>
+          </a:p>
+          <a:p>
+            <a:pPr lvl="1"/>
+            <a:r>
+              <a:rPr lang="en-GB" dirty="0" smtClean="0"/>
+              <a:t>Check </a:t>
+            </a:r>
+            <a:r>
+              <a:rPr lang="en-GB" dirty="0"/>
+              <a:t>content of each hyperlink on the </a:t>
+            </a:r>
+            <a:r>
+              <a:rPr lang="en-GB" dirty="0" smtClean="0"/>
+              <a:t>webpage</a:t>
+            </a:r>
+            <a:endParaRPr lang="en-GB" dirty="0"/>
+          </a:p>
+          <a:p>
+            <a:pPr lvl="1"/>
+            <a:r>
+              <a:rPr lang="en-GB" dirty="0" smtClean="0"/>
+              <a:t>Consider </a:t>
+            </a:r>
+            <a:r>
+              <a:rPr lang="en-GB" dirty="0"/>
+              <a:t>frequently of reappearances of trendy </a:t>
+            </a:r>
+            <a:r>
+              <a:rPr lang="en-GB" dirty="0" smtClean="0"/>
+              <a:t>keyword</a:t>
+            </a:r>
+            <a:endParaRPr lang="en-GB" dirty="0"/>
+          </a:p>
+          <a:p>
+            <a:pPr lvl="1"/>
+            <a:r>
+              <a:rPr lang="en-GB" dirty="0" smtClean="0"/>
+              <a:t>Used </a:t>
+            </a:r>
+            <a:r>
+              <a:rPr lang="en-GB" dirty="0"/>
+              <a:t>the result of this algorithm for URL classification</a:t>
+            </a:r>
+          </a:p>
+        </p:txBody>
+      </p:sp>
     </p:spTree>
-    <p:extLst>
-      <p:ext uri="{BB962C8B-B14F-4D97-AF65-F5344CB8AC3E}">
-        <p14:creationId xmlns:p14="http://schemas.microsoft.com/office/powerpoint/2010/main" xmlns:p="http://schemas.openxmlformats.org/presentationml/2006/main" xmlns:r="http://schemas.openxmlformats.org/officeDocument/2006/relationships" xmlns:a="http://schemas.openxmlformats.org/drawingml/2006/main" xmlns="" val="1770833103"/>
-      </p:ext>
-    </p:extLst>
   </p:cSld>
   <p:clrMapOvr>
     <a:masterClrMapping/>
   </p:clrMapOvr>
+  <p:timing>
+    <p:tnLst>
+      <p:par>
+        <p:cTn id="1" dur="indefinite" restart="never" nodeType="tmRoot"/>
+      </p:par>
+    </p:tnLst>
+  </p:timing>
 </p:sld>
 </file>
 
@@ -5653,117 +6058,677 @@
           <a:lstStyle/>
           <a:p>
             <a:r>
-              <a:rPr lang="en-GB" dirty="0" smtClean="0"/>
-              <a:t>URL Classification</a:t>
-            </a:r>
-            <a:endParaRPr lang="en-GB" dirty="0"/>
-          </a:p>
-        </p:txBody>
-      </p:sp>
-      <p:sp>
-        <p:nvSpPr>
-          <p:cNvPr id="3" name="Content Placeholder 2"/>
-          <p:cNvSpPr>
-            <a:spLocks noGrp="1"/>
-          </p:cNvSpPr>
-          <p:nvPr>
-            <p:ph idx="1"/>
-          </p:nvPr>
-        </p:nvSpPr>
-        <p:spPr/>
-        <p:txBody>
-          <a:bodyPr>
-            <a:normAutofit fontScale="92500" lnSpcReduction="20000"/>
+              <a:rPr lang="en-US" dirty="0" smtClean="0"/>
+              <a:t>URL Classification Algorithm</a:t>
+            </a:r>
+            <a:endParaRPr lang="en-US" dirty="0"/>
+          </a:p>
+        </p:txBody>
+      </p:sp>
+      <p:sp>
+        <p:nvSpPr>
+          <p:cNvPr id="5" name="Data 4"/>
+          <p:cNvSpPr/>
+          <p:nvPr/>
+        </p:nvSpPr>
+        <p:spPr>
+          <a:xfrm>
+            <a:off x="3733800" y="1600200"/>
+            <a:ext cx="1447800" cy="762000"/>
+          </a:xfrm>
+          <a:prstGeom prst="flowChartInputOutput">
+            <a:avLst/>
+          </a:prstGeom>
+          <a:solidFill>
+            <a:schemeClr val="accent5">
+              <a:lumMod val="50000"/>
+            </a:schemeClr>
+          </a:solidFill>
+          <a:effectLst>
+            <a:glow rad="101600">
+              <a:schemeClr val="tx1">
+                <a:alpha val="75000"/>
+              </a:schemeClr>
+            </a:glow>
+            <a:outerShdw blurRad="40000" dist="23000" dir="5400000" rotWithShape="0">
+              <a:srgbClr val="000000">
+                <a:alpha val="35000"/>
+              </a:srgbClr>
+            </a:outerShdw>
+          </a:effectLst>
+        </p:spPr>
+        <p:style>
+          <a:lnRef idx="1">
+            <a:schemeClr val="accent1"/>
+          </a:lnRef>
+          <a:fillRef idx="3">
+            <a:schemeClr val="accent1"/>
+          </a:fillRef>
+          <a:effectRef idx="2">
+            <a:schemeClr val="accent1"/>
+          </a:effectRef>
+          <a:fontRef idx="minor">
+            <a:schemeClr val="lt1"/>
+          </a:fontRef>
+        </p:style>
+        <p:txBody>
+          <a:bodyPr rtlCol="0" anchor="ctr">
+            <a:scene3d>
+              <a:camera prst="perspectiveFront"/>
+              <a:lightRig rig="threePt" dir="t"/>
+            </a:scene3d>
           </a:bodyPr>
           <a:lstStyle/>
           <a:p>
-            <a:r>
-              <a:rPr lang="en-GB" dirty="0"/>
-              <a:t>Two machine-learning methods applied in classification algorithm:</a:t>
-            </a:r>
-          </a:p>
-          <a:p>
-            <a:pPr lvl="0"/>
-            <a:r>
-              <a:rPr lang="en-GB" dirty="0" err="1"/>
-              <a:t>Levenshtein</a:t>
-            </a:r>
-            <a:r>
-              <a:rPr lang="en-GB" dirty="0"/>
-              <a:t> distance</a:t>
-            </a:r>
-          </a:p>
-          <a:p>
-            <a:pPr lvl="1"/>
-            <a:r>
-              <a:rPr lang="en-GB" dirty="0"/>
-              <a:t>String metric for measuring the difference between two sequences</a:t>
-            </a:r>
-          </a:p>
-          <a:p>
-            <a:pPr lvl="1"/>
-            <a:r>
-              <a:rPr lang="en-GB" dirty="0"/>
-              <a:t>Minimum number of edits needed to transform one string into the other</a:t>
-            </a:r>
-          </a:p>
-          <a:p>
-            <a:pPr lvl="0"/>
-            <a:r>
-              <a:rPr lang="en-GB" dirty="0"/>
-              <a:t>K-mean Clustering </a:t>
-            </a:r>
-          </a:p>
-          <a:p>
-            <a:pPr lvl="1"/>
-            <a:r>
-              <a:rPr lang="en-GB" dirty="0"/>
-              <a:t>Data mining</a:t>
-            </a:r>
-          </a:p>
-          <a:p>
-            <a:pPr lvl="1"/>
-            <a:r>
-              <a:rPr lang="en-GB" dirty="0"/>
-              <a:t>Partition </a:t>
-            </a:r>
-            <a:r>
-              <a:rPr lang="en-GB" i="1" dirty="0"/>
-              <a:t>n</a:t>
-            </a:r>
-            <a:r>
-              <a:rPr lang="en-GB" dirty="0"/>
-              <a:t> observations into </a:t>
-            </a:r>
-            <a:r>
-              <a:rPr lang="en-GB" i="1" dirty="0"/>
-              <a:t>k</a:t>
-            </a:r>
-            <a:r>
-              <a:rPr lang="en-GB" dirty="0"/>
-              <a:t> clusters</a:t>
-            </a:r>
-          </a:p>
-          <a:p>
-            <a:pPr lvl="1"/>
-            <a:r>
-              <a:rPr lang="en-GB" dirty="0"/>
-              <a:t>Applicable on large amount of </a:t>
-            </a:r>
-            <a:r>
-              <a:rPr lang="en-GB" dirty="0" smtClean="0"/>
-              <a:t>data</a:t>
-            </a:r>
-            <a:endParaRPr lang="en-GB" dirty="0"/>
+            <a:pPr algn="ctr"/>
+            <a:r>
+              <a:rPr lang="en-US" dirty="0" smtClean="0"/>
+              <a:t>URL</a:t>
+            </a:r>
+            <a:endParaRPr lang="en-US" dirty="0"/>
+          </a:p>
+        </p:txBody>
+      </p:sp>
+      <p:sp>
+        <p:nvSpPr>
+          <p:cNvPr id="6" name="Process 5"/>
+          <p:cNvSpPr/>
+          <p:nvPr/>
+        </p:nvSpPr>
+        <p:spPr>
+          <a:xfrm>
+            <a:off x="3505200" y="2895600"/>
+            <a:ext cx="1752600" cy="685800"/>
+          </a:xfrm>
+          <a:prstGeom prst="flowChartProcess">
+            <a:avLst/>
+          </a:prstGeom>
+          <a:solidFill>
+            <a:schemeClr val="accent5">
+              <a:lumMod val="50000"/>
+            </a:schemeClr>
+          </a:solidFill>
+          <a:effectLst>
+            <a:glow rad="101600">
+              <a:schemeClr val="tx1">
+                <a:alpha val="75000"/>
+              </a:schemeClr>
+            </a:glow>
+            <a:outerShdw blurRad="40000" dist="23000" dir="5400000" rotWithShape="0">
+              <a:srgbClr val="000000">
+                <a:alpha val="35000"/>
+              </a:srgbClr>
+            </a:outerShdw>
+          </a:effectLst>
+        </p:spPr>
+        <p:style>
+          <a:lnRef idx="1">
+            <a:schemeClr val="accent1"/>
+          </a:lnRef>
+          <a:fillRef idx="3">
+            <a:schemeClr val="accent1"/>
+          </a:fillRef>
+          <a:effectRef idx="2">
+            <a:schemeClr val="accent1"/>
+          </a:effectRef>
+          <a:fontRef idx="minor">
+            <a:schemeClr val="lt1"/>
+          </a:fontRef>
+        </p:style>
+        <p:txBody>
+          <a:bodyPr rtlCol="0" anchor="ctr"/>
+          <a:lstStyle/>
+          <a:p>
+            <a:pPr algn="ctr"/>
+            <a:r>
+              <a:rPr lang="en-US" dirty="0" smtClean="0"/>
+              <a:t>Classification</a:t>
+            </a:r>
+          </a:p>
+          <a:p>
+            <a:pPr algn="ctr"/>
+            <a:endParaRPr lang="en-US" dirty="0"/>
+          </a:p>
+        </p:txBody>
+      </p:sp>
+      <p:sp>
+        <p:nvSpPr>
+          <p:cNvPr id="7" name="Internal Storage 6"/>
+          <p:cNvSpPr/>
+          <p:nvPr/>
+        </p:nvSpPr>
+        <p:spPr>
+          <a:xfrm>
+            <a:off x="6172200" y="2895600"/>
+            <a:ext cx="1524000" cy="685800"/>
+          </a:xfrm>
+          <a:prstGeom prst="flowChartInternalStorage">
+            <a:avLst/>
+          </a:prstGeom>
+          <a:solidFill>
+            <a:schemeClr val="accent5">
+              <a:lumMod val="50000"/>
+            </a:schemeClr>
+          </a:solidFill>
+          <a:effectLst>
+            <a:glow rad="101600">
+              <a:schemeClr val="tx1">
+                <a:alpha val="75000"/>
+              </a:schemeClr>
+            </a:glow>
+            <a:outerShdw blurRad="40000" dist="23000" dir="5400000" rotWithShape="0">
+              <a:srgbClr val="000000">
+                <a:alpha val="35000"/>
+              </a:srgbClr>
+            </a:outerShdw>
+          </a:effectLst>
+        </p:spPr>
+        <p:style>
+          <a:lnRef idx="1">
+            <a:schemeClr val="accent1"/>
+          </a:lnRef>
+          <a:fillRef idx="3">
+            <a:schemeClr val="accent1"/>
+          </a:fillRef>
+          <a:effectRef idx="2">
+            <a:schemeClr val="accent1"/>
+          </a:effectRef>
+          <a:fontRef idx="minor">
+            <a:schemeClr val="lt1"/>
+          </a:fontRef>
+        </p:style>
+        <p:txBody>
+          <a:bodyPr rtlCol="0" anchor="ctr"/>
+          <a:lstStyle/>
+          <a:p>
+            <a:pPr algn="ctr"/>
+            <a:r>
+              <a:rPr lang="en-US" dirty="0" smtClean="0"/>
+              <a:t>URLs Database</a:t>
+            </a:r>
+            <a:endParaRPr lang="en-US" dirty="0"/>
+          </a:p>
+        </p:txBody>
+      </p:sp>
+      <p:sp>
+        <p:nvSpPr>
+          <p:cNvPr id="8" name="Decision 7"/>
+          <p:cNvSpPr/>
+          <p:nvPr/>
+        </p:nvSpPr>
+        <p:spPr>
+          <a:xfrm>
+            <a:off x="3429000" y="4038600"/>
+            <a:ext cx="1828800" cy="914400"/>
+          </a:xfrm>
+          <a:prstGeom prst="flowChartDecision">
+            <a:avLst/>
+          </a:prstGeom>
+          <a:solidFill>
+            <a:schemeClr val="accent5">
+              <a:lumMod val="50000"/>
+            </a:schemeClr>
+          </a:solidFill>
+          <a:effectLst>
+            <a:glow rad="101600">
+              <a:schemeClr val="tx1">
+                <a:alpha val="75000"/>
+              </a:schemeClr>
+            </a:glow>
+            <a:outerShdw blurRad="40000" dist="23000" dir="5400000" rotWithShape="0">
+              <a:srgbClr val="000000">
+                <a:alpha val="35000"/>
+              </a:srgbClr>
+            </a:outerShdw>
+          </a:effectLst>
+        </p:spPr>
+        <p:style>
+          <a:lnRef idx="1">
+            <a:schemeClr val="accent1"/>
+          </a:lnRef>
+          <a:fillRef idx="3">
+            <a:schemeClr val="accent1"/>
+          </a:fillRef>
+          <a:effectRef idx="2">
+            <a:schemeClr val="accent1"/>
+          </a:effectRef>
+          <a:fontRef idx="minor">
+            <a:schemeClr val="lt1"/>
+          </a:fontRef>
+        </p:style>
+        <p:txBody>
+          <a:bodyPr rtlCol="0" anchor="ctr"/>
+          <a:lstStyle/>
+          <a:p>
+            <a:pPr algn="ctr"/>
+            <a:r>
+              <a:rPr lang="en-US" dirty="0" smtClean="0"/>
+              <a:t>URL rating</a:t>
+            </a:r>
+            <a:endParaRPr lang="en-US" dirty="0"/>
+          </a:p>
+        </p:txBody>
+      </p:sp>
+      <p:sp>
+        <p:nvSpPr>
+          <p:cNvPr id="9" name="TextBox 8"/>
+          <p:cNvSpPr txBox="1"/>
+          <p:nvPr/>
+        </p:nvSpPr>
+        <p:spPr>
+          <a:xfrm>
+            <a:off x="704110" y="1194609"/>
+            <a:ext cx="184666" cy="369332"/>
+          </a:xfrm>
+          <a:prstGeom prst="rect">
+            <a:avLst/>
+          </a:prstGeom>
+          <a:noFill/>
+        </p:spPr>
+        <p:txBody>
+          <a:bodyPr wrap="none" rtlCol="0">
+            <a:spAutoFit/>
+          </a:bodyPr>
+          <a:lstStyle/>
+          <a:p>
+            <a:endParaRPr lang="en-US" dirty="0"/>
+          </a:p>
+        </p:txBody>
+      </p:sp>
+      <p:sp>
+        <p:nvSpPr>
+          <p:cNvPr id="11" name="Terminator 10"/>
+          <p:cNvSpPr/>
+          <p:nvPr/>
+        </p:nvSpPr>
+        <p:spPr>
+          <a:xfrm>
+            <a:off x="990600" y="4114800"/>
+            <a:ext cx="1828800" cy="762000"/>
+          </a:xfrm>
+          <a:prstGeom prst="flowChartTerminator">
+            <a:avLst/>
+          </a:prstGeom>
+          <a:solidFill>
+            <a:schemeClr val="accent5">
+              <a:lumMod val="50000"/>
+            </a:schemeClr>
+          </a:solidFill>
+          <a:effectLst>
+            <a:glow rad="101600">
+              <a:schemeClr val="tx1">
+                <a:alpha val="75000"/>
+              </a:schemeClr>
+            </a:glow>
+            <a:outerShdw blurRad="40000" dist="23000" dir="5400000" rotWithShape="0">
+              <a:srgbClr val="000000">
+                <a:alpha val="35000"/>
+              </a:srgbClr>
+            </a:outerShdw>
+          </a:effectLst>
+        </p:spPr>
+        <p:style>
+          <a:lnRef idx="1">
+            <a:schemeClr val="accent1"/>
+          </a:lnRef>
+          <a:fillRef idx="3">
+            <a:schemeClr val="accent1"/>
+          </a:fillRef>
+          <a:effectRef idx="2">
+            <a:schemeClr val="accent1"/>
+          </a:effectRef>
+          <a:fontRef idx="minor">
+            <a:schemeClr val="lt1"/>
+          </a:fontRef>
+        </p:style>
+        <p:txBody>
+          <a:bodyPr rtlCol="0" anchor="ctr"/>
+          <a:lstStyle/>
+          <a:p>
+            <a:pPr algn="ctr"/>
+            <a:r>
+              <a:rPr lang="en-US" dirty="0" smtClean="0"/>
+              <a:t>Lightweight scanning</a:t>
+            </a:r>
+            <a:endParaRPr lang="en-US" dirty="0"/>
+          </a:p>
+        </p:txBody>
+      </p:sp>
+      <p:sp>
+        <p:nvSpPr>
+          <p:cNvPr id="12" name="Terminator 11"/>
+          <p:cNvSpPr/>
+          <p:nvPr/>
+        </p:nvSpPr>
+        <p:spPr>
+          <a:xfrm>
+            <a:off x="3505200" y="5489448"/>
+            <a:ext cx="1828800" cy="758952"/>
+          </a:xfrm>
+          <a:prstGeom prst="flowChartTerminator">
+            <a:avLst/>
+          </a:prstGeom>
+          <a:solidFill>
+            <a:schemeClr val="accent5">
+              <a:lumMod val="50000"/>
+            </a:schemeClr>
+          </a:solidFill>
+          <a:effectLst>
+            <a:glow rad="101600">
+              <a:schemeClr val="tx1">
+                <a:alpha val="75000"/>
+              </a:schemeClr>
+            </a:glow>
+            <a:outerShdw blurRad="40000" dist="23000" dir="5400000" rotWithShape="0">
+              <a:srgbClr val="000000">
+                <a:alpha val="35000"/>
+              </a:srgbClr>
+            </a:outerShdw>
+          </a:effectLst>
+        </p:spPr>
+        <p:style>
+          <a:lnRef idx="1">
+            <a:schemeClr val="accent1"/>
+          </a:lnRef>
+          <a:fillRef idx="3">
+            <a:schemeClr val="accent1"/>
+          </a:fillRef>
+          <a:effectRef idx="2">
+            <a:schemeClr val="accent1"/>
+          </a:effectRef>
+          <a:fontRef idx="minor">
+            <a:schemeClr val="lt1"/>
+          </a:fontRef>
+        </p:style>
+        <p:txBody>
+          <a:bodyPr rtlCol="0" anchor="ctr"/>
+          <a:lstStyle/>
+          <a:p>
+            <a:pPr algn="ctr"/>
+            <a:r>
+              <a:rPr lang="en-US" dirty="0" smtClean="0"/>
+              <a:t>Heavyweight scanning</a:t>
+            </a:r>
+            <a:endParaRPr lang="en-US" dirty="0"/>
+          </a:p>
+        </p:txBody>
+      </p:sp>
+      <p:sp>
+        <p:nvSpPr>
+          <p:cNvPr id="13" name="Left-Right Arrow 12"/>
+          <p:cNvSpPr/>
+          <p:nvPr/>
+        </p:nvSpPr>
+        <p:spPr>
+          <a:xfrm>
+            <a:off x="5334000" y="3048000"/>
+            <a:ext cx="762000" cy="304800"/>
+          </a:xfrm>
+          <a:prstGeom prst="leftRightArrow">
+            <a:avLst/>
+          </a:prstGeom>
+          <a:solidFill>
+            <a:schemeClr val="accent5">
+              <a:lumMod val="50000"/>
+            </a:schemeClr>
+          </a:solidFill>
+          <a:effectLst>
+            <a:glow rad="101600">
+              <a:schemeClr val="tx1">
+                <a:alpha val="75000"/>
+              </a:schemeClr>
+            </a:glow>
+            <a:outerShdw blurRad="40000" dist="23000" dir="5400000" rotWithShape="0">
+              <a:srgbClr val="000000">
+                <a:alpha val="35000"/>
+              </a:srgbClr>
+            </a:outerShdw>
+          </a:effectLst>
+        </p:spPr>
+        <p:style>
+          <a:lnRef idx="1">
+            <a:schemeClr val="accent1"/>
+          </a:lnRef>
+          <a:fillRef idx="3">
+            <a:schemeClr val="accent1"/>
+          </a:fillRef>
+          <a:effectRef idx="2">
+            <a:schemeClr val="accent1"/>
+          </a:effectRef>
+          <a:fontRef idx="minor">
+            <a:schemeClr val="lt1"/>
+          </a:fontRef>
+        </p:style>
+        <p:txBody>
+          <a:bodyPr rtlCol="0" anchor="ctr"/>
+          <a:lstStyle/>
+          <a:p>
+            <a:pPr algn="ctr"/>
+            <a:endParaRPr lang="en-US"/>
+          </a:p>
+        </p:txBody>
+      </p:sp>
+      <p:sp>
+        <p:nvSpPr>
+          <p:cNvPr id="14" name="Down Arrow 13"/>
+          <p:cNvSpPr/>
+          <p:nvPr/>
+        </p:nvSpPr>
+        <p:spPr>
+          <a:xfrm>
+            <a:off x="4267200" y="2438400"/>
+            <a:ext cx="304800" cy="381000"/>
+          </a:xfrm>
+          <a:prstGeom prst="downArrow">
+            <a:avLst/>
+          </a:prstGeom>
+          <a:solidFill>
+            <a:schemeClr val="accent5">
+              <a:lumMod val="50000"/>
+            </a:schemeClr>
+          </a:solidFill>
+          <a:effectLst>
+            <a:glow rad="101600">
+              <a:schemeClr val="tx1">
+                <a:alpha val="75000"/>
+              </a:schemeClr>
+            </a:glow>
+            <a:outerShdw blurRad="40000" dist="23000" dir="5400000" rotWithShape="0">
+              <a:srgbClr val="000000">
+                <a:alpha val="35000"/>
+              </a:srgbClr>
+            </a:outerShdw>
+          </a:effectLst>
+        </p:spPr>
+        <p:style>
+          <a:lnRef idx="1">
+            <a:schemeClr val="accent1"/>
+          </a:lnRef>
+          <a:fillRef idx="3">
+            <a:schemeClr val="accent1"/>
+          </a:fillRef>
+          <a:effectRef idx="2">
+            <a:schemeClr val="accent1"/>
+          </a:effectRef>
+          <a:fontRef idx="minor">
+            <a:schemeClr val="lt1"/>
+          </a:fontRef>
+        </p:style>
+        <p:txBody>
+          <a:bodyPr rtlCol="0" anchor="ctr"/>
+          <a:lstStyle/>
+          <a:p>
+            <a:pPr algn="ctr"/>
+            <a:endParaRPr lang="en-US"/>
+          </a:p>
+        </p:txBody>
+      </p:sp>
+      <p:sp>
+        <p:nvSpPr>
+          <p:cNvPr id="15" name="Down Arrow 14"/>
+          <p:cNvSpPr/>
+          <p:nvPr/>
+        </p:nvSpPr>
+        <p:spPr>
+          <a:xfrm>
+            <a:off x="4267200" y="3657600"/>
+            <a:ext cx="228600" cy="304800"/>
+          </a:xfrm>
+          <a:prstGeom prst="downArrow">
+            <a:avLst/>
+          </a:prstGeom>
+          <a:solidFill>
+            <a:schemeClr val="accent5">
+              <a:lumMod val="50000"/>
+            </a:schemeClr>
+          </a:solidFill>
+          <a:effectLst>
+            <a:glow rad="101600">
+              <a:schemeClr val="tx1">
+                <a:alpha val="75000"/>
+              </a:schemeClr>
+            </a:glow>
+            <a:outerShdw blurRad="40000" dist="23000" dir="5400000" rotWithShape="0">
+              <a:srgbClr val="000000">
+                <a:alpha val="35000"/>
+              </a:srgbClr>
+            </a:outerShdw>
+          </a:effectLst>
+        </p:spPr>
+        <p:style>
+          <a:lnRef idx="1">
+            <a:schemeClr val="accent1"/>
+          </a:lnRef>
+          <a:fillRef idx="3">
+            <a:schemeClr val="accent1"/>
+          </a:fillRef>
+          <a:effectRef idx="2">
+            <a:schemeClr val="accent1"/>
+          </a:effectRef>
+          <a:fontRef idx="minor">
+            <a:schemeClr val="lt1"/>
+          </a:fontRef>
+        </p:style>
+        <p:txBody>
+          <a:bodyPr rtlCol="0" anchor="ctr"/>
+          <a:lstStyle/>
+          <a:p>
+            <a:pPr algn="ctr"/>
+            <a:endParaRPr lang="en-US"/>
+          </a:p>
+        </p:txBody>
+      </p:sp>
+      <p:sp>
+        <p:nvSpPr>
+          <p:cNvPr id="16" name="Down Arrow 15"/>
+          <p:cNvSpPr/>
+          <p:nvPr/>
+        </p:nvSpPr>
+        <p:spPr>
+          <a:xfrm>
+            <a:off x="4267200" y="5029200"/>
+            <a:ext cx="304800" cy="381000"/>
+          </a:xfrm>
+          <a:prstGeom prst="downArrow">
+            <a:avLst/>
+          </a:prstGeom>
+          <a:solidFill>
+            <a:schemeClr val="accent5">
+              <a:lumMod val="50000"/>
+            </a:schemeClr>
+          </a:solidFill>
+          <a:effectLst>
+            <a:glow rad="101600">
+              <a:schemeClr val="tx1">
+                <a:alpha val="75000"/>
+              </a:schemeClr>
+            </a:glow>
+            <a:outerShdw blurRad="40000" dist="23000" dir="5400000" rotWithShape="0">
+              <a:srgbClr val="000000">
+                <a:alpha val="35000"/>
+              </a:srgbClr>
+            </a:outerShdw>
+          </a:effectLst>
+        </p:spPr>
+        <p:style>
+          <a:lnRef idx="1">
+            <a:schemeClr val="accent1"/>
+          </a:lnRef>
+          <a:fillRef idx="3">
+            <a:schemeClr val="accent1"/>
+          </a:fillRef>
+          <a:effectRef idx="2">
+            <a:schemeClr val="accent1"/>
+          </a:effectRef>
+          <a:fontRef idx="minor">
+            <a:schemeClr val="lt1"/>
+          </a:fontRef>
+        </p:style>
+        <p:txBody>
+          <a:bodyPr rtlCol="0" anchor="ctr"/>
+          <a:lstStyle/>
+          <a:p>
+            <a:pPr algn="ctr"/>
+            <a:endParaRPr lang="en-US"/>
+          </a:p>
+        </p:txBody>
+      </p:sp>
+      <p:sp>
+        <p:nvSpPr>
+          <p:cNvPr id="17" name="Left Arrow 16"/>
+          <p:cNvSpPr/>
+          <p:nvPr/>
+        </p:nvSpPr>
+        <p:spPr>
+          <a:xfrm>
+            <a:off x="2895600" y="4343400"/>
+            <a:ext cx="457200" cy="304800"/>
+          </a:xfrm>
+          <a:prstGeom prst="leftArrow">
+            <a:avLst/>
+          </a:prstGeom>
+          <a:solidFill>
+            <a:schemeClr val="accent5">
+              <a:lumMod val="50000"/>
+            </a:schemeClr>
+          </a:solidFill>
+          <a:effectLst>
+            <a:glow rad="101600">
+              <a:schemeClr val="tx1">
+                <a:alpha val="75000"/>
+              </a:schemeClr>
+            </a:glow>
+            <a:outerShdw blurRad="40000" dist="23000" dir="5400000" rotWithShape="0">
+              <a:srgbClr val="000000">
+                <a:alpha val="35000"/>
+              </a:srgbClr>
+            </a:outerShdw>
+          </a:effectLst>
+        </p:spPr>
+        <p:style>
+          <a:lnRef idx="1">
+            <a:schemeClr val="accent1"/>
+          </a:lnRef>
+          <a:fillRef idx="3">
+            <a:schemeClr val="accent1"/>
+          </a:fillRef>
+          <a:effectRef idx="2">
+            <a:schemeClr val="accent1"/>
+          </a:effectRef>
+          <a:fontRef idx="minor">
+            <a:schemeClr val="lt1"/>
+          </a:fontRef>
+        </p:style>
+        <p:txBody>
+          <a:bodyPr rtlCol="0" anchor="ctr"/>
+          <a:lstStyle/>
+          <a:p>
+            <a:pPr algn="ctr"/>
+            <a:endParaRPr lang="en-US"/>
           </a:p>
         </p:txBody>
       </p:sp>
     </p:spTree>
-    <p:extLst>
-      <p:ext uri="{BB962C8B-B14F-4D97-AF65-F5344CB8AC3E}">
-        <p14:creationId xmlns:p14="http://schemas.microsoft.com/office/powerpoint/2010/main" xmlns:p="http://schemas.openxmlformats.org/presentationml/2006/main" xmlns:r="http://schemas.openxmlformats.org/officeDocument/2006/relationships" xmlns:a="http://schemas.openxmlformats.org/drawingml/2006/main" xmlns="" val="372575986"/>
-      </p:ext>
-    </p:extLst>
   </p:cSld>
   <p:clrMapOvr>
     <a:masterClrMapping/>
@@ -5805,7 +6770,7 @@
           <a:p>
             <a:r>
               <a:rPr lang="en-GB" dirty="0" smtClean="0"/>
-              <a:t>Internet Explorer under Wine</a:t>
+              <a:t>URL Classification</a:t>
             </a:r>
             <a:endParaRPr lang="en-GB" dirty="0"/>
           </a:p>
@@ -5824,75 +6789,97 @@
         <p:spPr/>
         <p:txBody>
           <a:bodyPr>
-            <a:normAutofit lnSpcReduction="10000"/>
+            <a:normAutofit fontScale="92500" lnSpcReduction="20000"/>
           </a:bodyPr>
           <a:lstStyle/>
           <a:p>
             <a:r>
               <a:rPr lang="en-GB" dirty="0"/>
-              <a:t>High </a:t>
-            </a:r>
-            <a:r>
-              <a:rPr lang="en-GB" dirty="0" smtClean="0"/>
-              <a:t>interaction </a:t>
+              <a:t>Two machine-learning methods applied in classification algorithm:</a:t>
+            </a:r>
+          </a:p>
+          <a:p>
+            <a:pPr lvl="0"/>
+            <a:r>
+              <a:rPr lang="en-GB" dirty="0" err="1"/>
+              <a:t>Levenshtein</a:t>
             </a:r>
             <a:r>
               <a:rPr lang="en-GB" dirty="0"/>
-              <a:t>malware detection. </a:t>
-            </a:r>
-          </a:p>
-          <a:p>
+              <a:t> distance</a:t>
+            </a:r>
+          </a:p>
+          <a:p>
+            <a:pPr lvl="1"/>
             <a:r>
               <a:rPr lang="en-GB" dirty="0"/>
-              <a:t>Open suspicious URLs with Internet Explorer 6</a:t>
-            </a:r>
-            <a:r>
-              <a:rPr lang="en-GB" dirty="0" smtClean="0"/>
-              <a:t> </a:t>
-            </a:r>
-            <a:r>
-              <a:rPr lang="en-GB" dirty="0" smtClean="0"/>
-              <a:t>under</a:t>
-            </a:r>
-            <a:r>
-              <a:rPr lang="en-GB" dirty="0" smtClean="0"/>
-              <a:t> Wine.</a:t>
+              <a:t>String metric for measuring the difference between two sequences</a:t>
+            </a:r>
+          </a:p>
+          <a:p>
+            <a:pPr lvl="1"/>
+            <a:r>
+              <a:rPr lang="en-GB" dirty="0"/>
+              <a:t>Minimum number of edits needed to transform one string into the other</a:t>
+            </a:r>
+          </a:p>
+          <a:p>
+            <a:pPr lvl="0"/>
+            <a:r>
+              <a:rPr lang="en-GB" dirty="0"/>
+              <a:t>K-mean Clustering </a:t>
+            </a:r>
+          </a:p>
+          <a:p>
+            <a:pPr lvl="1"/>
+            <a:r>
+              <a:rPr lang="en-GB" dirty="0"/>
+              <a:t>Data mining</a:t>
+            </a:r>
+          </a:p>
+          <a:p>
+            <a:pPr lvl="1"/>
+            <a:r>
+              <a:rPr lang="en-GB" dirty="0"/>
+              <a:t>Partition </a:t>
+            </a:r>
+            <a:r>
+              <a:rPr lang="en-GB" i="1" dirty="0"/>
+              <a:t>n</a:t>
+            </a:r>
+            <a:r>
+              <a:rPr lang="en-GB" dirty="0"/>
+              <a:t> observations into </a:t>
+            </a:r>
+            <a:r>
+              <a:rPr lang="en-GB" i="1" dirty="0"/>
+              <a:t>k</a:t>
+            </a:r>
+            <a:r>
+              <a:rPr lang="en-GB" dirty="0"/>
+              <a:t> clusters</a:t>
+            </a:r>
+          </a:p>
+          <a:p>
+            <a:pPr lvl="1"/>
+            <a:r>
+              <a:rPr lang="en-GB" dirty="0"/>
+              <a:t>Applicable on large amount of </a:t>
+            </a:r>
+            <a:r>
+              <a:rPr lang="en-GB" dirty="0" smtClean="0"/>
+              <a:t>data</a:t>
             </a:r>
             <a:endParaRPr lang="en-GB" dirty="0"/>
           </a:p>
-          <a:p>
-            <a:r>
-              <a:rPr lang="en-GB" dirty="0" smtClean="0"/>
-              <a:t>Wine is not </a:t>
-            </a:r>
-            <a:r>
-              <a:rPr lang="en-GB" dirty="0"/>
-              <a:t>a Windows emulator for non-Windows OS.</a:t>
-            </a:r>
-          </a:p>
-          <a:p>
-            <a:r>
-              <a:rPr lang="en-GB" dirty="0"/>
-              <a:t>Each IE instance is </a:t>
-            </a:r>
-            <a:r>
-              <a:rPr lang="en-GB" dirty="0" smtClean="0"/>
-              <a:t>run </a:t>
-            </a:r>
-            <a:r>
-              <a:rPr lang="en-GB" dirty="0"/>
-              <a:t>in a separate Wine-prefix, i.e. an isolated temp virtual Windows environment. </a:t>
-            </a:r>
-          </a:p>
-          <a:p>
-            <a:r>
-              <a:rPr lang="en-GB" dirty="0"/>
-              <a:t>Check for file system activities after that. </a:t>
-            </a:r>
-          </a:p>
         </p:txBody>
       </p:sp>
     </p:spTree>
+    <p:extLst>
+      <p:ext uri="{BB962C8B-B14F-4D97-AF65-F5344CB8AC3E}">
+        <p14:creationId xmlns:mc="http://schemas.openxmlformats.org/markup-compatibility/2006" xmlns:mv="urn:schemas-microsoft-com:mac:vml" xmlns:p14="http://schemas.microsoft.com/office/powerpoint/2010/main" xmlns:p="http://schemas.openxmlformats.org/presentationml/2006/main" xmlns:r="http://schemas.openxmlformats.org/officeDocument/2006/relationships" xmlns:a="http://schemas.openxmlformats.org/drawingml/2006/main" xmlns="" val="372575986"/>
+      </p:ext>
+    </p:extLst>
   </p:cSld>
   <p:clrMapOvr>
     <a:masterClrMapping/>

</xml_diff>

<commit_message>
Updated Weike's slides from external ppt
</commit_message>
<xml_diff>
--- a/doc/pres2/wk8-progress.pptx
+++ b/doc/pres2/wk8-progress.pptx
@@ -1,25 +1,25 @@
 
 <file path=ppt/presentation.xml><?xml version="1.0" encoding="utf-8"?>
-<p:presentation xmlns:a="http://schemas.openxmlformats.org/drawingml/2006/main" xmlns:r="http://schemas.openxmlformats.org/officeDocument/2006/relationships" xmlns:mc="http://schemas.openxmlformats.org/markup-compatibility/2006" xmlns:mv="urn:schemas-microsoft-com:mac:vml" xmlns:p="http://schemas.openxmlformats.org/presentationml/2006/main" mc:Ignorable="mv" mc:PreserveAttributes="mv:*" saveSubsetFonts="1">
+<p:presentation xmlns:a="http://schemas.openxmlformats.org/drawingml/2006/main" xmlns:r="http://schemas.openxmlformats.org/officeDocument/2006/relationships" xmlns:p="http://schemas.openxmlformats.org/presentationml/2006/main" saveSubsetFonts="1">
   <p:sldMasterIdLst>
     <p:sldMasterId id="2147483648" r:id="rId1"/>
   </p:sldMasterIdLst>
   <p:notesMasterIdLst>
-    <p:notesMasterId r:id="rId21"/>
+    <p:notesMasterId r:id="rId20"/>
   </p:notesMasterIdLst>
   <p:handoutMasterIdLst>
-    <p:handoutMasterId r:id="rId22"/>
+    <p:handoutMasterId r:id="rId21"/>
   </p:handoutMasterIdLst>
   <p:sldIdLst>
     <p:sldId id="256" r:id="rId2"/>
     <p:sldId id="278" r:id="rId3"/>
     <p:sldId id="257" r:id="rId4"/>
     <p:sldId id="264" r:id="rId5"/>
-    <p:sldId id="288" r:id="rId6"/>
-    <p:sldId id="289" r:id="rId7"/>
-    <p:sldId id="279" r:id="rId8"/>
-    <p:sldId id="290" r:id="rId9"/>
-    <p:sldId id="287" r:id="rId10"/>
+    <p:sldId id="289" r:id="rId6"/>
+    <p:sldId id="279" r:id="rId7"/>
+    <p:sldId id="290" r:id="rId8"/>
+    <p:sldId id="287" r:id="rId9"/>
+    <p:sldId id="292" r:id="rId10"/>
     <p:sldId id="280" r:id="rId11"/>
     <p:sldId id="281" r:id="rId12"/>
     <p:sldId id="285" r:id="rId13"/>
@@ -29,7 +29,6 @@
     <p:sldId id="284" r:id="rId17"/>
     <p:sldId id="270" r:id="rId18"/>
     <p:sldId id="272" r:id="rId19"/>
-    <p:sldId id="273" r:id="rId20"/>
   </p:sldIdLst>
   <p:sldSz cx="9144000" cy="6858000" type="screen4x3"/>
   <p:notesSz cx="6858000" cy="9144000"/>
@@ -132,13 +131,13 @@
 </file>
 
 <file path=ppt/commentAuthors.xml><?xml version="1.0" encoding="utf-8"?>
-<p:cmAuthorLst xmlns:a="http://schemas.openxmlformats.org/drawingml/2006/main" xmlns:r="http://schemas.openxmlformats.org/officeDocument/2006/relationships" xmlns:mc="http://schemas.openxmlformats.org/markup-compatibility/2006" xmlns:mv="urn:schemas-microsoft-com:mac:vml" xmlns:p="http://schemas.openxmlformats.org/presentationml/2006/main" mc:Ignorable="mv" mc:PreserveAttributes="mv:*">
+<p:cmAuthorLst xmlns:a="http://schemas.openxmlformats.org/drawingml/2006/main" xmlns:r="http://schemas.openxmlformats.org/officeDocument/2006/relationships" xmlns:p="http://schemas.openxmlformats.org/presentationml/2006/main">
   <p:cmAuthor id="0" name="tag1g09" initials="t" lastIdx="4" clrIdx="0"/>
 </p:cmAuthorLst>
 </file>
 
 <file path=ppt/comments/comment1.xml><?xml version="1.0" encoding="utf-8"?>
-<p:cmLst xmlns:a="http://schemas.openxmlformats.org/drawingml/2006/main" xmlns:r="http://schemas.openxmlformats.org/officeDocument/2006/relationships" xmlns:mc="http://schemas.openxmlformats.org/markup-compatibility/2006" xmlns:mv="urn:schemas-microsoft-com:mac:vml" xmlns:p="http://schemas.openxmlformats.org/presentationml/2006/main" mc:Ignorable="mv" mc:PreserveAttributes="mv:*">
+<p:cmLst xmlns:a="http://schemas.openxmlformats.org/drawingml/2006/main" xmlns:r="http://schemas.openxmlformats.org/officeDocument/2006/relationships" xmlns:p="http://schemas.openxmlformats.org/presentationml/2006/main">
   <p:cm authorId="0" dt="2012-10-23T13:15:13.711" idx="4">
     <p:pos x="10" y="10"/>
     <p:text>This digram does seem to work, It needs finishing.</p:text>
@@ -147,7 +146,7 @@
 </file>
 
 <file path=ppt/handoutMasters/handoutMaster1.xml><?xml version="1.0" encoding="utf-8"?>
-<p:handoutMaster xmlns:a="http://schemas.openxmlformats.org/drawingml/2006/main" xmlns:r="http://schemas.openxmlformats.org/officeDocument/2006/relationships" xmlns:mc="http://schemas.openxmlformats.org/markup-compatibility/2006" xmlns:mv="urn:schemas-microsoft-com:mac:vml" xmlns:p="http://schemas.openxmlformats.org/presentationml/2006/main" mc:Ignorable="mv" mc:PreserveAttributes="mv:*">
+<p:handoutMaster xmlns:a="http://schemas.openxmlformats.org/drawingml/2006/main" xmlns:r="http://schemas.openxmlformats.org/officeDocument/2006/relationships" xmlns:p="http://schemas.openxmlformats.org/presentationml/2006/main">
   <p:cSld>
     <p:bg>
       <p:bgRef idx="1001">
@@ -229,7 +228,7 @@
             <a:fld id="{18F98EB7-082C-9949-BFCA-B4BAD2D6FDBD}" type="datetimeFigureOut">
               <a:rPr lang="en-US" smtClean="0"/>
               <a:pPr/>
-              <a:t>11/20/12</a:t>
+              <a:t>11/20/2012</a:t>
             </a:fld>
             <a:endParaRPr lang="en-US"/>
           </a:p>
@@ -305,7 +304,7 @@
     </p:spTree>
     <p:extLst>
       <p:ext uri="{BB962C8B-B14F-4D97-AF65-F5344CB8AC3E}">
-        <p14:creationId xmlns:mc="http://schemas.openxmlformats.org/markup-compatibility/2006" xmlns:mv="urn:schemas-microsoft-com:mac:vml" xmlns:p14="http://schemas.microsoft.com/office/powerpoint/2010/main" xmlns:p="http://schemas.openxmlformats.org/presentationml/2006/main" xmlns:r="http://schemas.openxmlformats.org/officeDocument/2006/relationships" xmlns:a="http://schemas.openxmlformats.org/drawingml/2006/main" xmlns="" val="1901348598"/>
+        <p14:creationId xmlns:p14="http://schemas.microsoft.com/office/powerpoint/2010/main" val="1901348598"/>
       </p:ext>
     </p:extLst>
   </p:cSld>
@@ -314,7 +313,7 @@
 </file>
 
 <file path=ppt/notesMasters/notesMaster1.xml><?xml version="1.0" encoding="utf-8"?>
-<p:notesMaster xmlns:a="http://schemas.openxmlformats.org/drawingml/2006/main" xmlns:r="http://schemas.openxmlformats.org/officeDocument/2006/relationships" xmlns:mc="http://schemas.openxmlformats.org/markup-compatibility/2006" xmlns:mv="urn:schemas-microsoft-com:mac:vml" xmlns:p="http://schemas.openxmlformats.org/presentationml/2006/main" mc:Ignorable="mv" mc:PreserveAttributes="mv:*">
+<p:notesMaster xmlns:a="http://schemas.openxmlformats.org/drawingml/2006/main" xmlns:r="http://schemas.openxmlformats.org/officeDocument/2006/relationships" xmlns:p="http://schemas.openxmlformats.org/presentationml/2006/main">
   <p:cSld>
     <p:bg>
       <p:bgRef idx="1001">
@@ -396,7 +395,7 @@
             <a:fld id="{5C465251-34BA-484B-BD29-7371F8FBFAE2}" type="datetimeFigureOut">
               <a:rPr lang="en-GB" smtClean="0"/>
               <a:pPr/>
-              <a:t>11/20/12</a:t>
+              <a:t>20/11/2012</a:t>
             </a:fld>
             <a:endParaRPr lang="en-GB"/>
           </a:p>
@@ -567,7 +566,7 @@
     </p:spTree>
     <p:extLst>
       <p:ext uri="{BB962C8B-B14F-4D97-AF65-F5344CB8AC3E}">
-        <p14:creationId xmlns:mc="http://schemas.openxmlformats.org/markup-compatibility/2006" xmlns:mv="urn:schemas-microsoft-com:mac:vml" xmlns:p14="http://schemas.microsoft.com/office/powerpoint/2010/main" xmlns:p="http://schemas.openxmlformats.org/presentationml/2006/main" xmlns:r="http://schemas.openxmlformats.org/officeDocument/2006/relationships" xmlns:a="http://schemas.openxmlformats.org/drawingml/2006/main" xmlns="" val="1219798393"/>
+        <p14:creationId xmlns:p14="http://schemas.microsoft.com/office/powerpoint/2010/main" val="1219798393"/>
       </p:ext>
     </p:extLst>
   </p:cSld>
@@ -668,7 +667,7 @@
 </file>
 
 <file path=ppt/slideLayouts/slideLayout1.xml><?xml version="1.0" encoding="utf-8"?>
-<p:sldLayout xmlns:a="http://schemas.openxmlformats.org/drawingml/2006/main" xmlns:r="http://schemas.openxmlformats.org/officeDocument/2006/relationships" xmlns:mc="http://schemas.openxmlformats.org/markup-compatibility/2006" xmlns:mv="urn:schemas-microsoft-com:mac:vml" xmlns:p="http://schemas.openxmlformats.org/presentationml/2006/main" mc:Ignorable="mv" mc:PreserveAttributes="mv:*" type="title" preserve="1">
+<p:sldLayout xmlns:a="http://schemas.openxmlformats.org/drawingml/2006/main" xmlns:r="http://schemas.openxmlformats.org/officeDocument/2006/relationships" xmlns:p="http://schemas.openxmlformats.org/presentationml/2006/main" type="title" preserve="1">
   <p:cSld name="Title Slide">
     <p:spTree>
       <p:nvGrpSpPr>
@@ -849,7 +848,7 @@
             <a:fld id="{9B2BCD74-F7F5-4BD6-83D7-1EBC56D75222}" type="datetimeFigureOut">
               <a:rPr lang="en-GB" smtClean="0"/>
               <a:pPr/>
-              <a:t>11/20/12</a:t>
+              <a:t>20/11/2012</a:t>
             </a:fld>
             <a:endParaRPr lang="en-GB"/>
           </a:p>
@@ -914,7 +913,7 @@
 </file>
 
 <file path=ppt/slideLayouts/slideLayout10.xml><?xml version="1.0" encoding="utf-8"?>
-<p:sldLayout xmlns:a="http://schemas.openxmlformats.org/drawingml/2006/main" xmlns:r="http://schemas.openxmlformats.org/officeDocument/2006/relationships" xmlns:mc="http://schemas.openxmlformats.org/markup-compatibility/2006" xmlns:mv="urn:schemas-microsoft-com:mac:vml" xmlns:p="http://schemas.openxmlformats.org/presentationml/2006/main" mc:Ignorable="mv" mc:PreserveAttributes="mv:*" type="vertTx" preserve="1">
+<p:sldLayout xmlns:a="http://schemas.openxmlformats.org/drawingml/2006/main" xmlns:r="http://schemas.openxmlformats.org/officeDocument/2006/relationships" xmlns:p="http://schemas.openxmlformats.org/presentationml/2006/main" type="vertTx" preserve="1">
   <p:cSld name="Title and Vertical Text">
     <p:spTree>
       <p:nvGrpSpPr>
@@ -1023,7 +1022,7 @@
             <a:fld id="{9B2BCD74-F7F5-4BD6-83D7-1EBC56D75222}" type="datetimeFigureOut">
               <a:rPr lang="en-GB" smtClean="0"/>
               <a:pPr/>
-              <a:t>11/20/12</a:t>
+              <a:t>20/11/2012</a:t>
             </a:fld>
             <a:endParaRPr lang="en-GB"/>
           </a:p>
@@ -1081,7 +1080,7 @@
 </file>
 
 <file path=ppt/slideLayouts/slideLayout11.xml><?xml version="1.0" encoding="utf-8"?>
-<p:sldLayout xmlns:a="http://schemas.openxmlformats.org/drawingml/2006/main" xmlns:r="http://schemas.openxmlformats.org/officeDocument/2006/relationships" xmlns:mc="http://schemas.openxmlformats.org/markup-compatibility/2006" xmlns:mv="urn:schemas-microsoft-com:mac:vml" xmlns:p="http://schemas.openxmlformats.org/presentationml/2006/main" mc:Ignorable="mv" mc:PreserveAttributes="mv:*" type="vertTitleAndTx" preserve="1">
+<p:sldLayout xmlns:a="http://schemas.openxmlformats.org/drawingml/2006/main" xmlns:r="http://schemas.openxmlformats.org/officeDocument/2006/relationships" xmlns:p="http://schemas.openxmlformats.org/presentationml/2006/main" type="vertTitleAndTx" preserve="1">
   <p:cSld name="Vertical Title and Text">
     <p:spTree>
       <p:nvGrpSpPr>
@@ -1200,7 +1199,7 @@
             <a:fld id="{9B2BCD74-F7F5-4BD6-83D7-1EBC56D75222}" type="datetimeFigureOut">
               <a:rPr lang="en-GB" smtClean="0"/>
               <a:pPr/>
-              <a:t>11/20/12</a:t>
+              <a:t>20/11/2012</a:t>
             </a:fld>
             <a:endParaRPr lang="en-GB"/>
           </a:p>
@@ -1258,7 +1257,7 @@
 </file>
 
 <file path=ppt/slideLayouts/slideLayout2.xml><?xml version="1.0" encoding="utf-8"?>
-<p:sldLayout xmlns:a="http://schemas.openxmlformats.org/drawingml/2006/main" xmlns:r="http://schemas.openxmlformats.org/officeDocument/2006/relationships" xmlns:mc="http://schemas.openxmlformats.org/markup-compatibility/2006" xmlns:mv="urn:schemas-microsoft-com:mac:vml" xmlns:p="http://schemas.openxmlformats.org/presentationml/2006/main" mc:Ignorable="mv" mc:PreserveAttributes="mv:*" type="obj" preserve="1">
+<p:sldLayout xmlns:a="http://schemas.openxmlformats.org/drawingml/2006/main" xmlns:r="http://schemas.openxmlformats.org/officeDocument/2006/relationships" xmlns:p="http://schemas.openxmlformats.org/presentationml/2006/main" type="obj" preserve="1">
   <p:cSld name="Title and Content">
     <p:spTree>
       <p:nvGrpSpPr>
@@ -1367,7 +1366,7 @@
             <a:fld id="{9B2BCD74-F7F5-4BD6-83D7-1EBC56D75222}" type="datetimeFigureOut">
               <a:rPr lang="en-GB" smtClean="0"/>
               <a:pPr/>
-              <a:t>11/20/12</a:t>
+              <a:t>20/11/2012</a:t>
             </a:fld>
             <a:endParaRPr lang="en-GB"/>
           </a:p>
@@ -1425,7 +1424,7 @@
 </file>
 
 <file path=ppt/slideLayouts/slideLayout3.xml><?xml version="1.0" encoding="utf-8"?>
-<p:sldLayout xmlns:a="http://schemas.openxmlformats.org/drawingml/2006/main" xmlns:r="http://schemas.openxmlformats.org/officeDocument/2006/relationships" xmlns:mc="http://schemas.openxmlformats.org/markup-compatibility/2006" xmlns:mv="urn:schemas-microsoft-com:mac:vml" xmlns:p="http://schemas.openxmlformats.org/presentationml/2006/main" mc:Ignorable="mv" mc:PreserveAttributes="mv:*" type="secHead" preserve="1">
+<p:sldLayout xmlns:a="http://schemas.openxmlformats.org/drawingml/2006/main" xmlns:r="http://schemas.openxmlformats.org/officeDocument/2006/relationships" xmlns:p="http://schemas.openxmlformats.org/presentationml/2006/main" type="secHead" preserve="1">
   <p:cSld name="Section Header">
     <p:spTree>
       <p:nvGrpSpPr>
@@ -1610,7 +1609,7 @@
             <a:fld id="{9B2BCD74-F7F5-4BD6-83D7-1EBC56D75222}" type="datetimeFigureOut">
               <a:rPr lang="en-GB" smtClean="0"/>
               <a:pPr/>
-              <a:t>11/20/12</a:t>
+              <a:t>20/11/2012</a:t>
             </a:fld>
             <a:endParaRPr lang="en-GB"/>
           </a:p>
@@ -1668,7 +1667,7 @@
 </file>
 
 <file path=ppt/slideLayouts/slideLayout4.xml><?xml version="1.0" encoding="utf-8"?>
-<p:sldLayout xmlns:a="http://schemas.openxmlformats.org/drawingml/2006/main" xmlns:r="http://schemas.openxmlformats.org/officeDocument/2006/relationships" xmlns:mc="http://schemas.openxmlformats.org/markup-compatibility/2006" xmlns:mv="urn:schemas-microsoft-com:mac:vml" xmlns:p="http://schemas.openxmlformats.org/presentationml/2006/main" mc:Ignorable="mv" mc:PreserveAttributes="mv:*" type="twoObj" preserve="1">
+<p:sldLayout xmlns:a="http://schemas.openxmlformats.org/drawingml/2006/main" xmlns:r="http://schemas.openxmlformats.org/officeDocument/2006/relationships" xmlns:p="http://schemas.openxmlformats.org/presentationml/2006/main" type="twoObj" preserve="1">
   <p:cSld name="Two Content">
     <p:spTree>
       <p:nvGrpSpPr>
@@ -1895,7 +1894,7 @@
             <a:fld id="{9B2BCD74-F7F5-4BD6-83D7-1EBC56D75222}" type="datetimeFigureOut">
               <a:rPr lang="en-GB" smtClean="0"/>
               <a:pPr/>
-              <a:t>11/20/12</a:t>
+              <a:t>20/11/2012</a:t>
             </a:fld>
             <a:endParaRPr lang="en-GB"/>
           </a:p>
@@ -1953,7 +1952,7 @@
 </file>
 
 <file path=ppt/slideLayouts/slideLayout5.xml><?xml version="1.0" encoding="utf-8"?>
-<p:sldLayout xmlns:a="http://schemas.openxmlformats.org/drawingml/2006/main" xmlns:r="http://schemas.openxmlformats.org/officeDocument/2006/relationships" xmlns:mc="http://schemas.openxmlformats.org/markup-compatibility/2006" xmlns:mv="urn:schemas-microsoft-com:mac:vml" xmlns:p="http://schemas.openxmlformats.org/presentationml/2006/main" mc:Ignorable="mv" mc:PreserveAttributes="mv:*" type="twoTxTwoObj" preserve="1">
+<p:sldLayout xmlns:a="http://schemas.openxmlformats.org/drawingml/2006/main" xmlns:r="http://schemas.openxmlformats.org/officeDocument/2006/relationships" xmlns:p="http://schemas.openxmlformats.org/presentationml/2006/main" type="twoTxTwoObj" preserve="1">
   <p:cSld name="Comparison">
     <p:spTree>
       <p:nvGrpSpPr>
@@ -2314,7 +2313,7 @@
             <a:fld id="{9B2BCD74-F7F5-4BD6-83D7-1EBC56D75222}" type="datetimeFigureOut">
               <a:rPr lang="en-GB" smtClean="0"/>
               <a:pPr/>
-              <a:t>11/20/12</a:t>
+              <a:t>20/11/2012</a:t>
             </a:fld>
             <a:endParaRPr lang="en-GB"/>
           </a:p>
@@ -2372,7 +2371,7 @@
 </file>
 
 <file path=ppt/slideLayouts/slideLayout6.xml><?xml version="1.0" encoding="utf-8"?>
-<p:sldLayout xmlns:a="http://schemas.openxmlformats.org/drawingml/2006/main" xmlns:r="http://schemas.openxmlformats.org/officeDocument/2006/relationships" xmlns:mc="http://schemas.openxmlformats.org/markup-compatibility/2006" xmlns:mv="urn:schemas-microsoft-com:mac:vml" xmlns:p="http://schemas.openxmlformats.org/presentationml/2006/main" mc:Ignorable="mv" mc:PreserveAttributes="mv:*" type="titleOnly" preserve="1">
+<p:sldLayout xmlns:a="http://schemas.openxmlformats.org/drawingml/2006/main" xmlns:r="http://schemas.openxmlformats.org/officeDocument/2006/relationships" xmlns:p="http://schemas.openxmlformats.org/presentationml/2006/main" type="titleOnly" preserve="1">
   <p:cSld name="Title Only">
     <p:spTree>
       <p:nvGrpSpPr>
@@ -2429,7 +2428,7 @@
             <a:fld id="{9B2BCD74-F7F5-4BD6-83D7-1EBC56D75222}" type="datetimeFigureOut">
               <a:rPr lang="en-GB" smtClean="0"/>
               <a:pPr/>
-              <a:t>11/20/12</a:t>
+              <a:t>20/11/2012</a:t>
             </a:fld>
             <a:endParaRPr lang="en-GB"/>
           </a:p>
@@ -2487,7 +2486,7 @@
 </file>
 
 <file path=ppt/slideLayouts/slideLayout7.xml><?xml version="1.0" encoding="utf-8"?>
-<p:sldLayout xmlns:a="http://schemas.openxmlformats.org/drawingml/2006/main" xmlns:r="http://schemas.openxmlformats.org/officeDocument/2006/relationships" xmlns:mc="http://schemas.openxmlformats.org/markup-compatibility/2006" xmlns:mv="urn:schemas-microsoft-com:mac:vml" xmlns:p="http://schemas.openxmlformats.org/presentationml/2006/main" mc:Ignorable="mv" mc:PreserveAttributes="mv:*" type="blank" preserve="1">
+<p:sldLayout xmlns:a="http://schemas.openxmlformats.org/drawingml/2006/main" xmlns:r="http://schemas.openxmlformats.org/officeDocument/2006/relationships" xmlns:p="http://schemas.openxmlformats.org/presentationml/2006/main" type="blank" preserve="1">
   <p:cSld name="Blank">
     <p:spTree>
       <p:nvGrpSpPr>
@@ -2521,7 +2520,7 @@
             <a:fld id="{9B2BCD74-F7F5-4BD6-83D7-1EBC56D75222}" type="datetimeFigureOut">
               <a:rPr lang="en-GB" smtClean="0"/>
               <a:pPr/>
-              <a:t>11/20/12</a:t>
+              <a:t>20/11/2012</a:t>
             </a:fld>
             <a:endParaRPr lang="en-GB"/>
           </a:p>
@@ -2579,7 +2578,7 @@
 </file>
 
 <file path=ppt/slideLayouts/slideLayout8.xml><?xml version="1.0" encoding="utf-8"?>
-<p:sldLayout xmlns:a="http://schemas.openxmlformats.org/drawingml/2006/main" xmlns:r="http://schemas.openxmlformats.org/officeDocument/2006/relationships" xmlns:mc="http://schemas.openxmlformats.org/markup-compatibility/2006" xmlns:mv="urn:schemas-microsoft-com:mac:vml" xmlns:p="http://schemas.openxmlformats.org/presentationml/2006/main" mc:Ignorable="mv" mc:PreserveAttributes="mv:*" type="objTx" preserve="1">
+<p:sldLayout xmlns:a="http://schemas.openxmlformats.org/drawingml/2006/main" xmlns:r="http://schemas.openxmlformats.org/officeDocument/2006/relationships" xmlns:p="http://schemas.openxmlformats.org/presentationml/2006/main" type="objTx" preserve="1">
   <p:cSld name="Content with Caption">
     <p:spTree>
       <p:nvGrpSpPr>
@@ -2795,7 +2794,7 @@
             <a:fld id="{9B2BCD74-F7F5-4BD6-83D7-1EBC56D75222}" type="datetimeFigureOut">
               <a:rPr lang="en-GB" smtClean="0"/>
               <a:pPr/>
-              <a:t>11/20/12</a:t>
+              <a:t>20/11/2012</a:t>
             </a:fld>
             <a:endParaRPr lang="en-GB"/>
           </a:p>
@@ -2853,7 +2852,7 @@
 </file>
 
 <file path=ppt/slideLayouts/slideLayout9.xml><?xml version="1.0" encoding="utf-8"?>
-<p:sldLayout xmlns:a="http://schemas.openxmlformats.org/drawingml/2006/main" xmlns:r="http://schemas.openxmlformats.org/officeDocument/2006/relationships" xmlns:mc="http://schemas.openxmlformats.org/markup-compatibility/2006" xmlns:mv="urn:schemas-microsoft-com:mac:vml" xmlns:p="http://schemas.openxmlformats.org/presentationml/2006/main" mc:Ignorable="mv" mc:PreserveAttributes="mv:*" type="picTx" preserve="1">
+<p:sldLayout xmlns:a="http://schemas.openxmlformats.org/drawingml/2006/main" xmlns:r="http://schemas.openxmlformats.org/officeDocument/2006/relationships" xmlns:p="http://schemas.openxmlformats.org/presentationml/2006/main" type="picTx" preserve="1">
   <p:cSld name="Picture with Caption">
     <p:spTree>
       <p:nvGrpSpPr>
@@ -3045,7 +3044,7 @@
             <a:fld id="{9B2BCD74-F7F5-4BD6-83D7-1EBC56D75222}" type="datetimeFigureOut">
               <a:rPr lang="en-GB" smtClean="0"/>
               <a:pPr/>
-              <a:t>11/20/12</a:t>
+              <a:t>20/11/2012</a:t>
             </a:fld>
             <a:endParaRPr lang="en-GB"/>
           </a:p>
@@ -3103,7 +3102,7 @@
 </file>
 
 <file path=ppt/slideMasters/slideMaster1.xml><?xml version="1.0" encoding="utf-8"?>
-<p:sldMaster xmlns:a="http://schemas.openxmlformats.org/drawingml/2006/main" xmlns:r="http://schemas.openxmlformats.org/officeDocument/2006/relationships" xmlns:mc="http://schemas.openxmlformats.org/markup-compatibility/2006" xmlns:mv="urn:schemas-microsoft-com:mac:vml" xmlns:p="http://schemas.openxmlformats.org/presentationml/2006/main" mc:Ignorable="mv" mc:PreserveAttributes="mv:*">
+<p:sldMaster xmlns:a="http://schemas.openxmlformats.org/drawingml/2006/main" xmlns:r="http://schemas.openxmlformats.org/officeDocument/2006/relationships" xmlns:p="http://schemas.openxmlformats.org/presentationml/2006/main">
   <p:cSld>
     <p:bg>
       <p:bgPr>
@@ -3270,7 +3269,7 @@
             <a:fld id="{9B2BCD74-F7F5-4BD6-83D7-1EBC56D75222}" type="datetimeFigureOut">
               <a:rPr lang="en-GB" smtClean="0"/>
               <a:pPr/>
-              <a:t>11/20/12</a:t>
+              <a:t>20/11/2012</a:t>
             </a:fld>
             <a:endParaRPr lang="en-GB"/>
           </a:p>
@@ -3632,7 +3631,7 @@
 </file>
 
 <file path=ppt/slides/slide1.xml><?xml version="1.0" encoding="utf-8"?>
-<p:sld xmlns:a="http://schemas.openxmlformats.org/drawingml/2006/main" xmlns:r="http://schemas.openxmlformats.org/officeDocument/2006/relationships" xmlns:mc="http://schemas.openxmlformats.org/markup-compatibility/2006" xmlns:mv="urn:schemas-microsoft-com:mac:vml" xmlns:p="http://schemas.openxmlformats.org/presentationml/2006/main" mc:Ignorable="mv" mc:PreserveAttributes="mv:*">
+<p:sld xmlns:a="http://schemas.openxmlformats.org/drawingml/2006/main" xmlns:r="http://schemas.openxmlformats.org/officeDocument/2006/relationships" xmlns:p="http://schemas.openxmlformats.org/presentationml/2006/main">
   <p:cSld>
     <p:spTree>
       <p:nvGrpSpPr>
@@ -3719,7 +3718,7 @@
 </file>
 
 <file path=ppt/slides/slide10.xml><?xml version="1.0" encoding="utf-8"?>
-<p:sld xmlns:a="http://schemas.openxmlformats.org/drawingml/2006/main" xmlns:r="http://schemas.openxmlformats.org/officeDocument/2006/relationships" xmlns:mc="http://schemas.openxmlformats.org/markup-compatibility/2006" xmlns:mv="urn:schemas-microsoft-com:mac:vml" xmlns:p="http://schemas.openxmlformats.org/presentationml/2006/main" mc:Ignorable="mv" mc:PreserveAttributes="mv:*">
+<p:sld xmlns:a="http://schemas.openxmlformats.org/drawingml/2006/main" xmlns:r="http://schemas.openxmlformats.org/officeDocument/2006/relationships" xmlns:p="http://schemas.openxmlformats.org/presentationml/2006/main">
   <p:cSld>
     <p:spTree>
       <p:nvGrpSpPr>
@@ -3777,57 +3776,31 @@
           <a:p>
             <a:r>
               <a:rPr lang="en-GB" dirty="0"/>
-              <a:t>High </a:t>
-            </a:r>
-            <a:r>
-              <a:rPr lang="en-GB" dirty="0" smtClean="0"/>
-              <a:t>interaction </a:t>
-            </a:r>
+              <a:t>Wait for some time after opening URL then check for file system activities. </a:t>
+            </a:r>
+          </a:p>
+          <a:p>
             <a:r>
               <a:rPr lang="en-GB" dirty="0"/>
-              <a:t>malware detection. </a:t>
+              <a:t>File system changes are measured by running recursive diff, compared to the original copy before testing.</a:t>
             </a:r>
           </a:p>
           <a:p>
             <a:r>
               <a:rPr lang="en-GB" dirty="0"/>
-              <a:t>Open suspicious URLs with Internet Explorer 6</a:t>
-            </a:r>
-            <a:r>
-              <a:rPr lang="en-GB" dirty="0" smtClean="0"/>
-              <a:t> under Wine.</a:t>
+              <a:t>White list is used to filter out normal system operations. </a:t>
+            </a:r>
+          </a:p>
+          <a:p>
+            <a:r>
+              <a:rPr lang="en-GB" dirty="0"/>
+              <a:t>The temp Wine-prefix is removed after giving results</a:t>
+            </a:r>
+            <a:r>
+              <a:rPr lang="en-GB" dirty="0" smtClean="0"/>
+              <a:t>.</a:t>
             </a:r>
             <a:endParaRPr lang="en-GB" dirty="0"/>
-          </a:p>
-          <a:p>
-            <a:r>
-              <a:rPr lang="en-GB" dirty="0" smtClean="0"/>
-              <a:t>Wine is not </a:t>
-            </a:r>
-            <a:r>
-              <a:rPr lang="en-GB" dirty="0"/>
-              <a:t>a Windows emulator for non-Windows OS.</a:t>
-            </a:r>
-          </a:p>
-          <a:p>
-            <a:r>
-              <a:rPr lang="en-GB" dirty="0"/>
-              <a:t>Each IE instance is </a:t>
-            </a:r>
-            <a:r>
-              <a:rPr lang="en-GB" dirty="0" smtClean="0"/>
-              <a:t>run </a:t>
-            </a:r>
-            <a:r>
-              <a:rPr lang="en-GB" dirty="0"/>
-              <a:t>in a separate Wine-prefix, i.e. an isolated temp virtual Windows environment. </a:t>
-            </a:r>
-          </a:p>
-          <a:p>
-            <a:r>
-              <a:rPr lang="en-GB" dirty="0"/>
-              <a:t>Check for file system activities after that. </a:t>
-            </a:r>
           </a:p>
         </p:txBody>
       </p:sp>
@@ -3836,11 +3809,18 @@
   <p:clrMapOvr>
     <a:masterClrMapping/>
   </p:clrMapOvr>
+  <p:timing>
+    <p:tnLst>
+      <p:par>
+        <p:cTn id="1" dur="indefinite" restart="never" nodeType="tmRoot"/>
+      </p:par>
+    </p:tnLst>
+  </p:timing>
 </p:sld>
 </file>
 
 <file path=ppt/slides/slide11.xml><?xml version="1.0" encoding="utf-8"?>
-<p:sld xmlns:a="http://schemas.openxmlformats.org/drawingml/2006/main" xmlns:r="http://schemas.openxmlformats.org/officeDocument/2006/relationships" xmlns:mc="http://schemas.openxmlformats.org/markup-compatibility/2006" xmlns:mv="urn:schemas-microsoft-com:mac:vml" xmlns:p="http://schemas.openxmlformats.org/presentationml/2006/main" mc:Ignorable="mv" mc:PreserveAttributes="mv:*">
+<p:sld xmlns:a="http://schemas.openxmlformats.org/drawingml/2006/main" xmlns:r="http://schemas.openxmlformats.org/officeDocument/2006/relationships" xmlns:p="http://schemas.openxmlformats.org/presentationml/2006/main">
   <p:cSld>
     <p:spTree>
       <p:nvGrpSpPr>
@@ -3896,21 +3876,13 @@
           <a:p>
             <a:r>
               <a:rPr lang="en-GB" dirty="0"/>
-              <a:t>Low </a:t>
-            </a:r>
-            <a:r>
-              <a:rPr lang="en-GB" dirty="0" smtClean="0"/>
-              <a:t>interaction </a:t>
-            </a:r>
+              <a:t>Low interaction malware detection.</a:t>
+            </a:r>
+          </a:p>
+          <a:p>
             <a:r>
               <a:rPr lang="en-GB" dirty="0"/>
-              <a:t>malware detection.</a:t>
-            </a:r>
-          </a:p>
-          <a:p>
-            <a:r>
-              <a:rPr lang="en-GB" dirty="0"/>
-              <a:t>Download the content of a suspicious URL then scan with </a:t>
+              <a:t>With given URL we download the HTML then scan it with </a:t>
             </a:r>
             <a:r>
               <a:rPr lang="en-GB" dirty="0" err="1"/>
@@ -3922,19 +3894,20 @@
             </a:r>
           </a:p>
           <a:p>
+            <a:r>
+              <a:rPr lang="en-GB" dirty="0"/>
+              <a:t>Then the webpage is crawled and all links in it are scanned.  </a:t>
+            </a:r>
+          </a:p>
+          <a:p>
             <a:endParaRPr lang="en-GB" dirty="0"/>
           </a:p>
           <a:p>
             <a:r>
               <a:rPr lang="en-GB" dirty="0"/>
-              <a:t>Both high interactive and low interactive approaches are achieved with Python. </a:t>
-            </a:r>
-          </a:p>
-          <a:p>
-            <a:r>
-              <a:rPr lang="en-GB" dirty="0"/>
-              <a:t>Concurrent processing via threading. </a:t>
-            </a:r>
+              <a:t>Concurrent execution is achieved with Celery. </a:t>
+            </a:r>
+            <a:endParaRPr lang="en-GB" dirty="0"/>
           </a:p>
         </p:txBody>
       </p:sp>
@@ -3943,11 +3916,18 @@
   <p:clrMapOvr>
     <a:masterClrMapping/>
   </p:clrMapOvr>
+  <p:timing>
+    <p:tnLst>
+      <p:par>
+        <p:cTn id="1" dur="indefinite" restart="never" nodeType="tmRoot"/>
+      </p:par>
+    </p:tnLst>
+  </p:timing>
 </p:sld>
 </file>
 
 <file path=ppt/slides/slide12.xml><?xml version="1.0" encoding="utf-8"?>
-<p:sld xmlns:a="http://schemas.openxmlformats.org/drawingml/2006/main" xmlns:r="http://schemas.openxmlformats.org/officeDocument/2006/relationships" xmlns:mc="http://schemas.openxmlformats.org/markup-compatibility/2006" xmlns:mv="urn:schemas-microsoft-com:mac:vml" xmlns:p="http://schemas.openxmlformats.org/presentationml/2006/main" mc:Ignorable="mv" mc:PreserveAttributes="mv:*">
+<p:sld xmlns:a="http://schemas.openxmlformats.org/drawingml/2006/main" xmlns:r="http://schemas.openxmlformats.org/officeDocument/2006/relationships" xmlns:p="http://schemas.openxmlformats.org/presentationml/2006/main">
   <p:cSld>
     <p:spTree>
       <p:nvGrpSpPr>
@@ -4041,7 +4021,7 @@
 </file>
 
 <file path=ppt/slides/slide13.xml><?xml version="1.0" encoding="utf-8"?>
-<p:sld xmlns:a="http://schemas.openxmlformats.org/drawingml/2006/main" xmlns:r="http://schemas.openxmlformats.org/officeDocument/2006/relationships" xmlns:mc="http://schemas.openxmlformats.org/markup-compatibility/2006" xmlns:mv="urn:schemas-microsoft-com:mac:vml" xmlns:p="http://schemas.openxmlformats.org/presentationml/2006/main" mc:Ignorable="mv" mc:PreserveAttributes="mv:*">
+<p:sld xmlns:a="http://schemas.openxmlformats.org/drawingml/2006/main" xmlns:r="http://schemas.openxmlformats.org/officeDocument/2006/relationships" xmlns:p="http://schemas.openxmlformats.org/presentationml/2006/main">
   <p:cSld>
     <p:spTree>
       <p:nvGrpSpPr>
@@ -4101,11 +4081,7 @@
             </a:r>
             <a:r>
               <a:rPr lang="en-GB" dirty="0" smtClean="0"/>
-              <a:t>, Google “Safe Browsing Lookup API”, Web </a:t>
-            </a:r>
-            <a:r>
-              <a:rPr lang="en-GB" dirty="0" smtClean="0"/>
-              <a:t>Of Trust “WOT” API</a:t>
+              <a:t>, Google “Safe Browsing Lookup API”, Web Of Trust “WOT” API</a:t>
             </a:r>
           </a:p>
           <a:p>
@@ -4121,15 +4097,7 @@
             </a:r>
             <a:r>
               <a:rPr lang="en-GB" dirty="0" smtClean="0"/>
-              <a:t> </a:t>
-            </a:r>
-            <a:r>
-              <a:rPr lang="en-GB" dirty="0" smtClean="0"/>
-              <a:t>provides daily ZIP of top million results…</a:t>
-            </a:r>
-            <a:r>
-              <a:rPr lang="en-GB" dirty="0" smtClean="0"/>
-              <a:t> </a:t>
+              <a:t> provides daily ZIP of top million results… </a:t>
             </a:r>
             <a:endParaRPr lang="en-GB" dirty="0"/>
           </a:p>
@@ -4144,7 +4112,7 @@
 </file>
 
 <file path=ppt/slides/slide14.xml><?xml version="1.0" encoding="utf-8"?>
-<p:sld xmlns:a="http://schemas.openxmlformats.org/drawingml/2006/main" xmlns:r="http://schemas.openxmlformats.org/officeDocument/2006/relationships" xmlns:mc="http://schemas.openxmlformats.org/markup-compatibility/2006" xmlns:mv="urn:schemas-microsoft-com:mac:vml" xmlns:p="http://schemas.openxmlformats.org/presentationml/2006/main" mc:Ignorable="mv" mc:PreserveAttributes="mv:*">
+<p:sld xmlns:a="http://schemas.openxmlformats.org/drawingml/2006/main" xmlns:r="http://schemas.openxmlformats.org/officeDocument/2006/relationships" xmlns:p="http://schemas.openxmlformats.org/presentationml/2006/main">
   <p:cSld>
     <p:spTree>
       <p:nvGrpSpPr>
@@ -4271,7 +4239,7 @@
 </file>
 
 <file path=ppt/slides/slide15.xml><?xml version="1.0" encoding="utf-8"?>
-<p:sld xmlns:a="http://schemas.openxmlformats.org/drawingml/2006/main" xmlns:r="http://schemas.openxmlformats.org/officeDocument/2006/relationships" xmlns:mc="http://schemas.openxmlformats.org/markup-compatibility/2006" xmlns:mv="urn:schemas-microsoft-com:mac:vml" xmlns:p="http://schemas.openxmlformats.org/presentationml/2006/main" mc:Ignorable="mv" mc:PreserveAttributes="mv:*">
+<p:sld xmlns:a="http://schemas.openxmlformats.org/drawingml/2006/main" xmlns:r="http://schemas.openxmlformats.org/officeDocument/2006/relationships" xmlns:p="http://schemas.openxmlformats.org/presentationml/2006/main">
   <p:cSld>
     <p:spTree>
       <p:nvGrpSpPr>
@@ -4368,11 +4336,18 @@
   <p:clrMapOvr>
     <a:masterClrMapping/>
   </p:clrMapOvr>
+  <p:timing>
+    <p:tnLst>
+      <p:par>
+        <p:cTn id="1" dur="indefinite" restart="never" nodeType="tmRoot"/>
+      </p:par>
+    </p:tnLst>
+  </p:timing>
 </p:sld>
 </file>
 
 <file path=ppt/slides/slide16.xml><?xml version="1.0" encoding="utf-8"?>
-<p:sld xmlns:a="http://schemas.openxmlformats.org/drawingml/2006/main" xmlns:r="http://schemas.openxmlformats.org/officeDocument/2006/relationships" xmlns:mc="http://schemas.openxmlformats.org/markup-compatibility/2006" xmlns:mv="urn:schemas-microsoft-com:mac:vml" xmlns:p="http://schemas.openxmlformats.org/presentationml/2006/main" mc:Ignorable="mv" mc:PreserveAttributes="mv:*">
+<p:sld xmlns:a="http://schemas.openxmlformats.org/drawingml/2006/main" xmlns:r="http://schemas.openxmlformats.org/officeDocument/2006/relationships" xmlns:p="http://schemas.openxmlformats.org/presentationml/2006/main">
   <p:cSld>
     <p:spTree>
       <p:nvGrpSpPr>
@@ -4465,11 +4440,18 @@
   <p:clrMapOvr>
     <a:masterClrMapping/>
   </p:clrMapOvr>
+  <p:timing>
+    <p:tnLst>
+      <p:par>
+        <p:cTn id="1" dur="indefinite" restart="never" nodeType="tmRoot"/>
+      </p:par>
+    </p:tnLst>
+  </p:timing>
 </p:sld>
 </file>
 
 <file path=ppt/slides/slide17.xml><?xml version="1.0" encoding="utf-8"?>
-<p:sld xmlns:a="http://schemas.openxmlformats.org/drawingml/2006/main" xmlns:r="http://schemas.openxmlformats.org/officeDocument/2006/relationships" xmlns:mc="http://schemas.openxmlformats.org/markup-compatibility/2006" xmlns:mv="urn:schemas-microsoft-com:mac:vml" xmlns:p="http://schemas.openxmlformats.org/presentationml/2006/main" mc:Ignorable="mv" mc:PreserveAttributes="mv:*">
+<p:sld xmlns:a="http://schemas.openxmlformats.org/drawingml/2006/main" xmlns:r="http://schemas.openxmlformats.org/officeDocument/2006/relationships" xmlns:p="http://schemas.openxmlformats.org/presentationml/2006/main">
   <p:cSld>
     <p:spTree>
       <p:nvGrpSpPr>
@@ -4579,7 +4561,7 @@
 </file>
 
 <file path=ppt/slides/slide18.xml><?xml version="1.0" encoding="utf-8"?>
-<p:sld xmlns:a="http://schemas.openxmlformats.org/drawingml/2006/main" xmlns:r="http://schemas.openxmlformats.org/officeDocument/2006/relationships" xmlns:mc="http://schemas.openxmlformats.org/markup-compatibility/2006" xmlns:mv="urn:schemas-microsoft-com:mac:vml" xmlns:p="http://schemas.openxmlformats.org/presentationml/2006/main" mc:Ignorable="mv" mc:PreserveAttributes="mv:*">
+<p:sld xmlns:a="http://schemas.openxmlformats.org/drawingml/2006/main" xmlns:r="http://schemas.openxmlformats.org/officeDocument/2006/relationships" xmlns:p="http://schemas.openxmlformats.org/presentationml/2006/main">
   <p:cSld>
     <p:spTree>
       <p:nvGrpSpPr>
@@ -4634,86 +4616,6 @@
           <a:lstStyle/>
           <a:p>
             <a:endParaRPr lang="en-GB"/>
-          </a:p>
-        </p:txBody>
-      </p:sp>
-    </p:spTree>
-  </p:cSld>
-  <p:clrMapOvr>
-    <a:masterClrMapping/>
-  </p:clrMapOvr>
-  <p:timing>
-    <p:tnLst>
-      <p:par>
-        <p:cTn id="1" dur="indefinite" restart="never" nodeType="tmRoot"/>
-      </p:par>
-    </p:tnLst>
-  </p:timing>
-</p:sld>
-</file>
-
-<file path=ppt/slides/slide19.xml><?xml version="1.0" encoding="utf-8"?>
-<p:sld xmlns:a="http://schemas.openxmlformats.org/drawingml/2006/main" xmlns:r="http://schemas.openxmlformats.org/officeDocument/2006/relationships" xmlns:mc="http://schemas.openxmlformats.org/markup-compatibility/2006" xmlns:mv="urn:schemas-microsoft-com:mac:vml" xmlns:p="http://schemas.openxmlformats.org/presentationml/2006/main" mc:Ignorable="mv" mc:PreserveAttributes="mv:*">
-  <p:cSld>
-    <p:spTree>
-      <p:nvGrpSpPr>
-        <p:cNvPr id="1" name=""/>
-        <p:cNvGrpSpPr/>
-        <p:nvPr/>
-      </p:nvGrpSpPr>
-      <p:grpSpPr>
-        <a:xfrm>
-          <a:off x="0" y="0"/>
-          <a:ext cx="0" cy="0"/>
-          <a:chOff x="0" y="0"/>
-          <a:chExt cx="0" cy="0"/>
-        </a:xfrm>
-      </p:grpSpPr>
-      <p:sp>
-        <p:nvSpPr>
-          <p:cNvPr id="2" name="Title 1"/>
-          <p:cNvSpPr>
-            <a:spLocks noGrp="1"/>
-          </p:cNvSpPr>
-          <p:nvPr>
-            <p:ph type="title"/>
-          </p:nvPr>
-        </p:nvSpPr>
-        <p:spPr/>
-        <p:txBody>
-          <a:bodyPr/>
-          <a:lstStyle/>
-          <a:p>
-            <a:r>
-              <a:rPr lang="en-GB" dirty="0" smtClean="0"/>
-              <a:t>References</a:t>
-            </a:r>
-            <a:endParaRPr lang="en-GB" dirty="0"/>
-          </a:p>
-        </p:txBody>
-      </p:sp>
-      <p:sp>
-        <p:nvSpPr>
-          <p:cNvPr id="3" name="Content Placeholder 2"/>
-          <p:cNvSpPr>
-            <a:spLocks noGrp="1"/>
-          </p:cNvSpPr>
-          <p:nvPr>
-            <p:ph idx="1"/>
-          </p:nvPr>
-        </p:nvSpPr>
-        <p:spPr/>
-        <p:txBody>
-          <a:bodyPr>
-            <a:normAutofit/>
-          </a:bodyPr>
-          <a:lstStyle/>
-          <a:p>
-            <a:pPr marL="971550" lvl="1" indent="-514350">
-              <a:buFont typeface="+mj-lt"/>
-              <a:buAutoNum type="arabicPeriod"/>
-            </a:pPr>
-            <a:endParaRPr lang="en-GB" dirty="0"/>
           </a:p>
         </p:txBody>
       </p:sp>
@@ -4733,7 +4635,7 @@
 </file>
 
 <file path=ppt/slides/slide2.xml><?xml version="1.0" encoding="utf-8"?>
-<p:sld xmlns:a="http://schemas.openxmlformats.org/drawingml/2006/main" xmlns:r="http://schemas.openxmlformats.org/officeDocument/2006/relationships" xmlns:mc="http://schemas.openxmlformats.org/markup-compatibility/2006" xmlns:mv="urn:schemas-microsoft-com:mac:vml" xmlns:p="http://schemas.openxmlformats.org/presentationml/2006/main" mc:Ignorable="mv" mc:PreserveAttributes="mv:*">
+<p:sld xmlns:a="http://schemas.openxmlformats.org/drawingml/2006/main" xmlns:r="http://schemas.openxmlformats.org/officeDocument/2006/relationships" xmlns:p="http://schemas.openxmlformats.org/presentationml/2006/main">
   <p:cSld>
     <p:spTree>
       <p:nvGrpSpPr>
@@ -4890,7 +4792,7 @@
 </file>
 
 <file path=ppt/slides/slide3.xml><?xml version="1.0" encoding="utf-8"?>
-<p:sld xmlns:a="http://schemas.openxmlformats.org/drawingml/2006/main" xmlns:r="http://schemas.openxmlformats.org/officeDocument/2006/relationships" xmlns:mc="http://schemas.openxmlformats.org/markup-compatibility/2006" xmlns:mv="urn:schemas-microsoft-com:mac:vml" xmlns:p="http://schemas.openxmlformats.org/presentationml/2006/main" mc:Ignorable="mv" mc:PreserveAttributes="mv:*">
+<p:sld xmlns:a="http://schemas.openxmlformats.org/drawingml/2006/main" xmlns:r="http://schemas.openxmlformats.org/officeDocument/2006/relationships" xmlns:p="http://schemas.openxmlformats.org/presentationml/2006/main">
   <p:cSld>
     <p:spTree>
       <p:nvGrpSpPr>
@@ -5008,7 +4910,7 @@
 </file>
 
 <file path=ppt/slides/slide4.xml><?xml version="1.0" encoding="utf-8"?>
-<p:sld xmlns:a="http://schemas.openxmlformats.org/drawingml/2006/main" xmlns:r="http://schemas.openxmlformats.org/officeDocument/2006/relationships" xmlns:mc="http://schemas.openxmlformats.org/markup-compatibility/2006" xmlns:mv="urn:schemas-microsoft-com:mac:vml" xmlns:p="http://schemas.openxmlformats.org/presentationml/2006/main" mc:Ignorable="mv" mc:PreserveAttributes="mv:*">
+<p:sld xmlns:a="http://schemas.openxmlformats.org/drawingml/2006/main" xmlns:r="http://schemas.openxmlformats.org/officeDocument/2006/relationships" xmlns:p="http://schemas.openxmlformats.org/presentationml/2006/main">
   <p:cSld>
     <p:spTree>
       <p:nvGrpSpPr>
@@ -5665,7 +5567,7 @@
 </file>
 
 <file path=ppt/slides/slide5.xml><?xml version="1.0" encoding="utf-8"?>
-<p:sld xmlns:a="http://schemas.openxmlformats.org/drawingml/2006/main" xmlns:r="http://schemas.openxmlformats.org/officeDocument/2006/relationships" xmlns:mc="http://schemas.openxmlformats.org/markup-compatibility/2006" xmlns:mv="urn:schemas-microsoft-com:mac:vml" xmlns:p="http://schemas.openxmlformats.org/presentationml/2006/main" mc:Ignorable="mv" mc:PreserveAttributes="mv:*">
+<p:sld xmlns:a="http://schemas.openxmlformats.org/drawingml/2006/main" xmlns:r="http://schemas.openxmlformats.org/officeDocument/2006/relationships" xmlns:p="http://schemas.openxmlformats.org/presentationml/2006/main">
   <p:cSld>
     <p:spTree>
       <p:nvGrpSpPr>
@@ -5698,7 +5600,7 @@
           <a:p>
             <a:r>
               <a:rPr lang="en-US" dirty="0" smtClean="0"/>
-              <a:t>Malware Analysis Implementation</a:t>
+              <a:t>Malware Detection Methods</a:t>
             </a:r>
             <a:endParaRPr lang="en-US" dirty="0"/>
           </a:p>
@@ -5716,10 +5618,55 @@
         </p:nvSpPr>
         <p:spPr/>
         <p:txBody>
-          <a:bodyPr/>
-          <a:lstStyle/>
-          <a:p>
-            <a:endParaRPr lang="en-US"/>
+          <a:bodyPr>
+            <a:normAutofit lnSpcReduction="10000"/>
+          </a:bodyPr>
+          <a:lstStyle/>
+          <a:p>
+            <a:r>
+              <a:rPr lang="en-US" dirty="0" smtClean="0"/>
+              <a:t>No interaction malware detection</a:t>
+            </a:r>
+          </a:p>
+          <a:p>
+            <a:pPr lvl="1">
+              <a:buNone/>
+            </a:pPr>
+            <a:endParaRPr lang="en-US" dirty="0" smtClean="0"/>
+          </a:p>
+          <a:p>
+            <a:r>
+              <a:rPr lang="en-US" dirty="0" smtClean="0"/>
+              <a:t>Low interaction malware detection</a:t>
+            </a:r>
+          </a:p>
+          <a:p>
+            <a:pPr lvl="1"/>
+            <a:r>
+              <a:rPr lang="en-US" dirty="0" smtClean="0"/>
+              <a:t>use lightweight or simulated clients to interact with the server.</a:t>
+            </a:r>
+          </a:p>
+          <a:p>
+            <a:r>
+              <a:rPr lang="en-US" dirty="0" smtClean="0"/>
+              <a:t>High interaction  malware detection</a:t>
+            </a:r>
+          </a:p>
+          <a:p>
+            <a:pPr lvl="1"/>
+            <a:r>
+              <a:rPr lang="en-US" dirty="0" smtClean="0"/>
+              <a:t>Attacks are detected via inspection of the state of the system after a server has been interacted with</a:t>
+            </a:r>
+          </a:p>
+          <a:p>
+            <a:pPr lvl="1"/>
+            <a:r>
+              <a:rPr lang="en-US" dirty="0" smtClean="0"/>
+              <a:t>effective at detecting unknown attacks on clients</a:t>
+            </a:r>
+            <a:endParaRPr lang="en-US" dirty="0"/>
           </a:p>
         </p:txBody>
       </p:sp>
@@ -5739,7 +5686,7 @@
 </file>
 
 <file path=ppt/slides/slide6.xml><?xml version="1.0" encoding="utf-8"?>
-<p:sld xmlns:a="http://schemas.openxmlformats.org/drawingml/2006/main" xmlns:r="http://schemas.openxmlformats.org/officeDocument/2006/relationships" xmlns:mc="http://schemas.openxmlformats.org/markup-compatibility/2006" xmlns:mv="urn:schemas-microsoft-com:mac:vml" xmlns:p="http://schemas.openxmlformats.org/presentationml/2006/main" mc:Ignorable="mv" mc:PreserveAttributes="mv:*">
+<p:sld xmlns:a="http://schemas.openxmlformats.org/drawingml/2006/main" xmlns:r="http://schemas.openxmlformats.org/officeDocument/2006/relationships" xmlns:p="http://schemas.openxmlformats.org/presentationml/2006/main">
   <p:cSld>
     <p:spTree>
       <p:nvGrpSpPr>
@@ -5771,10 +5718,10 @@
           <a:lstStyle/>
           <a:p>
             <a:r>
-              <a:rPr lang="en-US" dirty="0" smtClean="0"/>
-              <a:t>Malware Detection Methods</a:t>
-            </a:r>
-            <a:endParaRPr lang="en-US" dirty="0"/>
+              <a:rPr lang="en-GB" dirty="0" smtClean="0"/>
+              <a:t>URL Classification</a:t>
+            </a:r>
+            <a:endParaRPr lang="en-GB" dirty="0"/>
           </a:p>
         </p:txBody>
       </p:sp>
@@ -5791,79 +5738,78 @@
         <p:spPr/>
         <p:txBody>
           <a:bodyPr>
-            <a:normAutofit lnSpcReduction="10000"/>
+            <a:normAutofit/>
           </a:bodyPr>
           <a:lstStyle/>
           <a:p>
             <a:r>
-              <a:rPr lang="en-US" dirty="0" smtClean="0"/>
-              <a:t>No interaction malware </a:t>
-            </a:r>
-            <a:r>
-              <a:rPr lang="en-US" dirty="0" smtClean="0"/>
-              <a:t>detection</a:t>
-            </a:r>
-          </a:p>
-          <a:p>
-            <a:pPr lvl="1">
-              <a:buNone/>
-            </a:pPr>
-            <a:endParaRPr lang="en-US" dirty="0" smtClean="0"/>
-          </a:p>
-          <a:p>
-            <a:r>
-              <a:rPr lang="en-US" dirty="0" smtClean="0"/>
-              <a:t>Low interaction malware </a:t>
-            </a:r>
-            <a:r>
-              <a:rPr lang="en-US" dirty="0" smtClean="0"/>
-              <a:t>detection</a:t>
-            </a:r>
+              <a:rPr lang="en-GB" dirty="0"/>
+              <a:t>Malware detection based on repetition of the trendy keyword</a:t>
+            </a:r>
+            <a:r>
+              <a:rPr lang="en-GB" dirty="0" smtClean="0"/>
+              <a:t>:</a:t>
+            </a:r>
+            <a:endParaRPr lang="en-GB" dirty="0"/>
           </a:p>
           <a:p>
             <a:pPr lvl="1"/>
             <a:r>
-              <a:rPr lang="en-US" dirty="0" smtClean="0"/>
-              <a:t>use lightweight or simulated clients to interact with the </a:t>
-            </a:r>
-            <a:r>
-              <a:rPr lang="en-US" dirty="0" smtClean="0"/>
-              <a:t>server.</a:t>
-            </a:r>
-          </a:p>
-          <a:p>
-            <a:r>
-              <a:rPr lang="en-US" dirty="0" smtClean="0"/>
-              <a:t>High interaction  malware </a:t>
-            </a:r>
-            <a:r>
-              <a:rPr lang="en-US" dirty="0" smtClean="0"/>
-              <a:t>detection</a:t>
-            </a:r>
+              <a:rPr lang="en-GB" dirty="0" smtClean="0"/>
+              <a:t>Analyse </a:t>
+            </a:r>
+            <a:r>
+              <a:rPr lang="en-GB" dirty="0"/>
+              <a:t>the content of the given URL (Crawling</a:t>
+            </a:r>
+            <a:r>
+              <a:rPr lang="en-GB" dirty="0" smtClean="0"/>
+              <a:t>)</a:t>
+            </a:r>
+            <a:endParaRPr lang="en-GB" dirty="0"/>
           </a:p>
           <a:p>
             <a:pPr lvl="1"/>
             <a:r>
-              <a:rPr lang="en-US" dirty="0" smtClean="0"/>
-              <a:t>Attacks</a:t>
-            </a:r>
-            <a:r>
-              <a:rPr lang="en-US" dirty="0" smtClean="0"/>
-              <a:t> are </a:t>
-            </a:r>
-            <a:r>
-              <a:rPr lang="en-US" dirty="0" smtClean="0"/>
-              <a:t>detected via inspection of the state of the system after a server has been interacted with</a:t>
-            </a:r>
-            <a:endParaRPr lang="en-US" dirty="0" smtClean="0"/>
+              <a:rPr lang="en-GB" dirty="0" smtClean="0"/>
+              <a:t>Check </a:t>
+            </a:r>
+            <a:r>
+              <a:rPr lang="en-GB" dirty="0"/>
+              <a:t>content of each hyperlink on the </a:t>
+            </a:r>
+            <a:r>
+              <a:rPr lang="en-GB" dirty="0" smtClean="0"/>
+              <a:t>webpage</a:t>
+            </a:r>
+            <a:endParaRPr lang="en-GB" dirty="0"/>
           </a:p>
           <a:p>
             <a:pPr lvl="1"/>
             <a:r>
-              <a:rPr lang="en-US" dirty="0" smtClean="0"/>
-              <a:t>effective at detecting unknown attacks on clients</a:t>
-            </a:r>
-            <a:endParaRPr lang="en-US" dirty="0"/>
+              <a:rPr lang="en-GB" dirty="0" smtClean="0"/>
+              <a:t>Consider </a:t>
+            </a:r>
+            <a:r>
+              <a:rPr lang="en-GB" dirty="0"/>
+              <a:t>frequently of reappearances of trendy </a:t>
+            </a:r>
+            <a:r>
+              <a:rPr lang="en-GB" dirty="0" smtClean="0"/>
+              <a:t>keyword</a:t>
+            </a:r>
+            <a:endParaRPr lang="en-GB" dirty="0"/>
+          </a:p>
+          <a:p>
+            <a:pPr lvl="1"/>
+            <a:r>
+              <a:rPr lang="en-GB" dirty="0" smtClean="0"/>
+              <a:t>Used </a:t>
+            </a:r>
+            <a:r>
+              <a:rPr lang="en-GB" dirty="0"/>
+              <a:t>the result of this algorithm for URL classification</a:t>
+            </a:r>
           </a:p>
         </p:txBody>
       </p:sp>
@@ -5883,150 +5829,7 @@
 </file>
 
 <file path=ppt/slides/slide7.xml><?xml version="1.0" encoding="utf-8"?>
-<p:sld xmlns:a="http://schemas.openxmlformats.org/drawingml/2006/main" xmlns:r="http://schemas.openxmlformats.org/officeDocument/2006/relationships" xmlns:mc="http://schemas.openxmlformats.org/markup-compatibility/2006" xmlns:mv="urn:schemas-microsoft-com:mac:vml" xmlns:p="http://schemas.openxmlformats.org/presentationml/2006/main" mc:Ignorable="mv" mc:PreserveAttributes="mv:*">
-  <p:cSld>
-    <p:spTree>
-      <p:nvGrpSpPr>
-        <p:cNvPr id="1" name=""/>
-        <p:cNvGrpSpPr/>
-        <p:nvPr/>
-      </p:nvGrpSpPr>
-      <p:grpSpPr>
-        <a:xfrm>
-          <a:off x="0" y="0"/>
-          <a:ext cx="0" cy="0"/>
-          <a:chOff x="0" y="0"/>
-          <a:chExt cx="0" cy="0"/>
-        </a:xfrm>
-      </p:grpSpPr>
-      <p:sp>
-        <p:nvSpPr>
-          <p:cNvPr id="2" name="Title 1"/>
-          <p:cNvSpPr>
-            <a:spLocks noGrp="1"/>
-          </p:cNvSpPr>
-          <p:nvPr>
-            <p:ph type="title"/>
-          </p:nvPr>
-        </p:nvSpPr>
-        <p:spPr/>
-        <p:txBody>
-          <a:bodyPr/>
-          <a:lstStyle/>
-          <a:p>
-            <a:r>
-              <a:rPr lang="en-GB" dirty="0" smtClean="0"/>
-              <a:t>URL Classification</a:t>
-            </a:r>
-            <a:endParaRPr lang="en-GB" dirty="0"/>
-          </a:p>
-        </p:txBody>
-      </p:sp>
-      <p:sp>
-        <p:nvSpPr>
-          <p:cNvPr id="3" name="Content Placeholder 2"/>
-          <p:cNvSpPr>
-            <a:spLocks noGrp="1"/>
-          </p:cNvSpPr>
-          <p:nvPr>
-            <p:ph idx="1"/>
-          </p:nvPr>
-        </p:nvSpPr>
-        <p:spPr/>
-        <p:txBody>
-          <a:bodyPr>
-            <a:normAutofit/>
-          </a:bodyPr>
-          <a:lstStyle/>
-          <a:p>
-            <a:r>
-              <a:rPr lang="en-GB" dirty="0"/>
-              <a:t>Malware detection based on repetition of the trendy keyword</a:t>
-            </a:r>
-            <a:r>
-              <a:rPr lang="en-GB" dirty="0" smtClean="0"/>
-              <a:t>:</a:t>
-            </a:r>
-            <a:endParaRPr lang="en-GB" dirty="0"/>
-          </a:p>
-          <a:p>
-            <a:pPr lvl="1"/>
-            <a:r>
-              <a:rPr lang="en-GB" dirty="0" smtClean="0"/>
-              <a:t>Analyse </a:t>
-            </a:r>
-            <a:r>
-              <a:rPr lang="en-GB" dirty="0"/>
-              <a:t>the content of the given URL (Crawling</a:t>
-            </a:r>
-            <a:r>
-              <a:rPr lang="en-GB" dirty="0" smtClean="0"/>
-              <a:t>)</a:t>
-            </a:r>
-            <a:endParaRPr lang="en-GB" dirty="0"/>
-          </a:p>
-          <a:p>
-            <a:pPr lvl="1"/>
-            <a:r>
-              <a:rPr lang="en-GB" dirty="0" smtClean="0"/>
-              <a:t>Check </a:t>
-            </a:r>
-            <a:r>
-              <a:rPr lang="en-GB" dirty="0"/>
-              <a:t>content of each hyperlink on the </a:t>
-            </a:r>
-            <a:r>
-              <a:rPr lang="en-GB" dirty="0" smtClean="0"/>
-              <a:t>webpage</a:t>
-            </a:r>
-            <a:endParaRPr lang="en-GB" dirty="0"/>
-          </a:p>
-          <a:p>
-            <a:pPr lvl="1"/>
-            <a:r>
-              <a:rPr lang="en-GB" dirty="0" smtClean="0"/>
-              <a:t>Consider </a:t>
-            </a:r>
-            <a:r>
-              <a:rPr lang="en-GB" dirty="0"/>
-              <a:t>frequently of reappearances of trendy </a:t>
-            </a:r>
-            <a:r>
-              <a:rPr lang="en-GB" dirty="0" smtClean="0"/>
-              <a:t>keyword</a:t>
-            </a:r>
-            <a:endParaRPr lang="en-GB" dirty="0"/>
-          </a:p>
-          <a:p>
-            <a:pPr lvl="1"/>
-            <a:r>
-              <a:rPr lang="en-GB" dirty="0" smtClean="0"/>
-              <a:t>Used </a:t>
-            </a:r>
-            <a:r>
-              <a:rPr lang="en-GB" dirty="0"/>
-              <a:t>the result of this algorithm for URL classification</a:t>
-            </a:r>
-          </a:p>
-        </p:txBody>
-      </p:sp>
-    </p:spTree>
-  </p:cSld>
-  <p:clrMapOvr>
-    <a:masterClrMapping/>
-  </p:clrMapOvr>
-  <p:timing>
-    <p:tnLst>
-      <p:par>
-        <p:cTn id="1" dur="indefinite" restart="never" nodeType="tmRoot"/>
-      </p:par>
-    </p:tnLst>
-  </p:timing>
-</p:sld>
-</file>
-
-<file path=ppt/slides/slide8.xml><?xml version="1.0" encoding="utf-8"?>
-<p:sld xmlns:a="http://schemas.openxmlformats.org/drawingml/2006/main" xmlns:r="http://schemas.openxmlformats.org/officeDocument/2006/relationships" xmlns:mc="http://schemas.openxmlformats.org/markup-compatibility/2006" xmlns:mv="urn:schemas-microsoft-com:mac:vml" xmlns:p="http://schemas.openxmlformats.org/presentationml/2006/main" mc:Ignorable="mv" mc:PreserveAttributes="mv:*">
+<p:sld xmlns:a="http://schemas.openxmlformats.org/drawingml/2006/main" xmlns:r="http://schemas.openxmlformats.org/officeDocument/2006/relationships" xmlns:p="http://schemas.openxmlformats.org/presentationml/2006/main">
   <p:cSld>
     <p:spTree>
       <p:nvGrpSpPr>
@@ -6733,11 +6536,18 @@
   <p:clrMapOvr>
     <a:masterClrMapping/>
   </p:clrMapOvr>
+  <p:timing>
+    <p:tnLst>
+      <p:par>
+        <p:cTn id="1" dur="indefinite" restart="never" nodeType="tmRoot"/>
+      </p:par>
+    </p:tnLst>
+  </p:timing>
 </p:sld>
 </file>
 
-<file path=ppt/slides/slide9.xml><?xml version="1.0" encoding="utf-8"?>
-<p:sld xmlns:a="http://schemas.openxmlformats.org/drawingml/2006/main" xmlns:r="http://schemas.openxmlformats.org/officeDocument/2006/relationships" xmlns:mc="http://schemas.openxmlformats.org/markup-compatibility/2006" xmlns:mv="urn:schemas-microsoft-com:mac:vml" xmlns:p="http://schemas.openxmlformats.org/presentationml/2006/main" mc:Ignorable="mv" mc:PreserveAttributes="mv:*">
+<file path=ppt/slides/slide8.xml><?xml version="1.0" encoding="utf-8"?>
+<p:sld xmlns:a="http://schemas.openxmlformats.org/drawingml/2006/main" xmlns:r="http://schemas.openxmlformats.org/officeDocument/2006/relationships" xmlns:p="http://schemas.openxmlformats.org/presentationml/2006/main">
   <p:cSld>
     <p:spTree>
       <p:nvGrpSpPr>
@@ -6877,13 +6687,131 @@
     </p:spTree>
     <p:extLst>
       <p:ext uri="{BB962C8B-B14F-4D97-AF65-F5344CB8AC3E}">
-        <p14:creationId xmlns:mc="http://schemas.openxmlformats.org/markup-compatibility/2006" xmlns:mv="urn:schemas-microsoft-com:mac:vml" xmlns:p14="http://schemas.microsoft.com/office/powerpoint/2010/main" xmlns:p="http://schemas.openxmlformats.org/presentationml/2006/main" xmlns:r="http://schemas.openxmlformats.org/officeDocument/2006/relationships" xmlns:a="http://schemas.openxmlformats.org/drawingml/2006/main" xmlns="" val="372575986"/>
+        <p14:creationId xmlns:p14="http://schemas.microsoft.com/office/powerpoint/2010/main" val="372575986"/>
       </p:ext>
     </p:extLst>
   </p:cSld>
   <p:clrMapOvr>
     <a:masterClrMapping/>
   </p:clrMapOvr>
+</p:sld>
+</file>
+
+<file path=ppt/slides/slide9.xml><?xml version="1.0" encoding="utf-8"?>
+<p:sld xmlns:a="http://schemas.openxmlformats.org/drawingml/2006/main" xmlns:r="http://schemas.openxmlformats.org/officeDocument/2006/relationships" xmlns:p="http://schemas.openxmlformats.org/presentationml/2006/main">
+  <p:cSld>
+    <p:spTree>
+      <p:nvGrpSpPr>
+        <p:cNvPr id="1" name=""/>
+        <p:cNvGrpSpPr/>
+        <p:nvPr/>
+      </p:nvGrpSpPr>
+      <p:grpSpPr>
+        <a:xfrm>
+          <a:off x="0" y="0"/>
+          <a:ext cx="0" cy="0"/>
+          <a:chOff x="0" y="0"/>
+          <a:chExt cx="0" cy="0"/>
+        </a:xfrm>
+      </p:grpSpPr>
+      <p:sp>
+        <p:nvSpPr>
+          <p:cNvPr id="2" name="Title 1"/>
+          <p:cNvSpPr>
+            <a:spLocks noGrp="1"/>
+          </p:cNvSpPr>
+          <p:nvPr>
+            <p:ph type="title"/>
+          </p:nvPr>
+        </p:nvSpPr>
+        <p:spPr/>
+        <p:txBody>
+          <a:bodyPr/>
+          <a:lstStyle/>
+          <a:p>
+            <a:r>
+              <a:rPr lang="en-GB" dirty="0"/>
+              <a:t>Internet Explorer under Wine</a:t>
+            </a:r>
+          </a:p>
+        </p:txBody>
+      </p:sp>
+      <p:sp>
+        <p:nvSpPr>
+          <p:cNvPr id="3" name="Content Placeholder 2"/>
+          <p:cNvSpPr>
+            <a:spLocks noGrp="1"/>
+          </p:cNvSpPr>
+          <p:nvPr>
+            <p:ph idx="1"/>
+          </p:nvPr>
+        </p:nvSpPr>
+        <p:spPr/>
+        <p:txBody>
+          <a:bodyPr>
+            <a:normAutofit fontScale="85000" lnSpcReduction="10000"/>
+          </a:bodyPr>
+          <a:lstStyle/>
+          <a:p>
+            <a:r>
+              <a:rPr lang="en-GB" dirty="0"/>
+              <a:t>High interaction malware detection. </a:t>
+            </a:r>
+          </a:p>
+          <a:p>
+            <a:r>
+              <a:rPr lang="en-GB" dirty="0"/>
+              <a:t>Open suspicious URLs with Internet Explorer 6 under Wine.</a:t>
+            </a:r>
+          </a:p>
+          <a:p>
+            <a:r>
+              <a:rPr lang="en-GB" dirty="0"/>
+              <a:t>Wine is a compatibility layer for running Windows applications on non-Windows </a:t>
+            </a:r>
+            <a:r>
+              <a:rPr lang="en-GB" dirty="0" err="1"/>
+              <a:t>OSes</a:t>
+            </a:r>
+            <a:r>
+              <a:rPr lang="en-GB" dirty="0"/>
+              <a:t>.</a:t>
+            </a:r>
+          </a:p>
+          <a:p>
+            <a:r>
+              <a:rPr lang="en-GB" dirty="0"/>
+              <a:t>For each suspicious URL we create an isolated temp Wine environment then execute with the IE instance in it. </a:t>
+            </a:r>
+          </a:p>
+          <a:p>
+            <a:r>
+              <a:rPr lang="en-GB" dirty="0"/>
+              <a:t>With each environment an original copy of Wine-prefix is downloaded and unpacked(or checked via hash if local copy exists) to ensure consistency of results. </a:t>
+            </a:r>
+          </a:p>
+          <a:p>
+            <a:endParaRPr lang="en-GB" dirty="0"/>
+          </a:p>
+        </p:txBody>
+      </p:sp>
+    </p:spTree>
+    <p:extLst>
+      <p:ext uri="{BB962C8B-B14F-4D97-AF65-F5344CB8AC3E}">
+        <p14:creationId xmlns:p14="http://schemas.microsoft.com/office/powerpoint/2010/main" val="352985116"/>
+      </p:ext>
+    </p:extLst>
+  </p:cSld>
+  <p:clrMapOvr>
+    <a:masterClrMapping/>
+  </p:clrMapOvr>
+  <p:timing>
+    <p:tnLst>
+      <p:par>
+        <p:cTn id="1" dur="indefinite" restart="never" nodeType="tmRoot"/>
+      </p:par>
+    </p:tnLst>
+  </p:timing>
 </p:sld>
 </file>
 

</xml_diff>

<commit_message>
Updated slides with format polishing
Added Interatcion indicators
Clarified Slides
Removed some abbreviations
</commit_message>
<xml_diff>
--- a/doc/pres2/wk8-progress.pptx
+++ b/doc/pres2/wk8-progress.pptx
@@ -5,10 +5,10 @@
     <p:sldMasterId id="2147483648" r:id="rId1"/>
   </p:sldMasterIdLst>
   <p:notesMasterIdLst>
-    <p:notesMasterId r:id="rId20"/>
+    <p:notesMasterId r:id="rId21"/>
   </p:notesMasterIdLst>
   <p:handoutMasterIdLst>
-    <p:handoutMasterId r:id="rId21"/>
+    <p:handoutMasterId r:id="rId22"/>
   </p:handoutMasterIdLst>
   <p:sldIdLst>
     <p:sldId id="256" r:id="rId2"/>
@@ -23,12 +23,13 @@
     <p:sldId id="280" r:id="rId11"/>
     <p:sldId id="281" r:id="rId12"/>
     <p:sldId id="285" r:id="rId13"/>
-    <p:sldId id="282" r:id="rId14"/>
-    <p:sldId id="291" r:id="rId15"/>
-    <p:sldId id="283" r:id="rId16"/>
-    <p:sldId id="284" r:id="rId17"/>
-    <p:sldId id="270" r:id="rId18"/>
-    <p:sldId id="272" r:id="rId19"/>
+    <p:sldId id="293" r:id="rId14"/>
+    <p:sldId id="282" r:id="rId15"/>
+    <p:sldId id="291" r:id="rId16"/>
+    <p:sldId id="283" r:id="rId17"/>
+    <p:sldId id="284" r:id="rId18"/>
+    <p:sldId id="270" r:id="rId19"/>
+    <p:sldId id="272" r:id="rId20"/>
   </p:sldIdLst>
   <p:sldSz cx="9144000" cy="6858000" type="screen4x3"/>
   <p:notesSz cx="6858000" cy="9144000"/>
@@ -228,7 +229,7 @@
             <a:fld id="{18F98EB7-082C-9949-BFCA-B4BAD2D6FDBD}" type="datetimeFigureOut">
               <a:rPr lang="en-US" smtClean="0"/>
               <a:pPr/>
-              <a:t>11/20/2012</a:t>
+              <a:t>11/21/2012</a:t>
             </a:fld>
             <a:endParaRPr lang="en-US"/>
           </a:p>
@@ -304,7 +305,7 @@
     </p:spTree>
     <p:extLst>
       <p:ext uri="{BB962C8B-B14F-4D97-AF65-F5344CB8AC3E}">
-        <p14:creationId xmlns:p14="http://schemas.microsoft.com/office/powerpoint/2010/main" val="1901348598"/>
+        <p14:creationId xmlns:p14="http://schemas.microsoft.com/office/powerpoint/2010/main" xmlns="" val="1901348598"/>
       </p:ext>
     </p:extLst>
   </p:cSld>
@@ -395,7 +396,7 @@
             <a:fld id="{5C465251-34BA-484B-BD29-7371F8FBFAE2}" type="datetimeFigureOut">
               <a:rPr lang="en-GB" smtClean="0"/>
               <a:pPr/>
-              <a:t>20/11/2012</a:t>
+              <a:t>21/11/2012</a:t>
             </a:fld>
             <a:endParaRPr lang="en-GB"/>
           </a:p>
@@ -566,7 +567,7 @@
     </p:spTree>
     <p:extLst>
       <p:ext uri="{BB962C8B-B14F-4D97-AF65-F5344CB8AC3E}">
-        <p14:creationId xmlns:p14="http://schemas.microsoft.com/office/powerpoint/2010/main" val="1219798393"/>
+        <p14:creationId xmlns:p14="http://schemas.microsoft.com/office/powerpoint/2010/main" xmlns="" val="1219798393"/>
       </p:ext>
     </p:extLst>
   </p:cSld>
@@ -848,7 +849,7 @@
             <a:fld id="{9B2BCD74-F7F5-4BD6-83D7-1EBC56D75222}" type="datetimeFigureOut">
               <a:rPr lang="en-GB" smtClean="0"/>
               <a:pPr/>
-              <a:t>20/11/2012</a:t>
+              <a:t>21/11/2012</a:t>
             </a:fld>
             <a:endParaRPr lang="en-GB"/>
           </a:p>
@@ -1022,7 +1023,7 @@
             <a:fld id="{9B2BCD74-F7F5-4BD6-83D7-1EBC56D75222}" type="datetimeFigureOut">
               <a:rPr lang="en-GB" smtClean="0"/>
               <a:pPr/>
-              <a:t>20/11/2012</a:t>
+              <a:t>21/11/2012</a:t>
             </a:fld>
             <a:endParaRPr lang="en-GB"/>
           </a:p>
@@ -1199,7 +1200,7 @@
             <a:fld id="{9B2BCD74-F7F5-4BD6-83D7-1EBC56D75222}" type="datetimeFigureOut">
               <a:rPr lang="en-GB" smtClean="0"/>
               <a:pPr/>
-              <a:t>20/11/2012</a:t>
+              <a:t>21/11/2012</a:t>
             </a:fld>
             <a:endParaRPr lang="en-GB"/>
           </a:p>
@@ -1366,7 +1367,7 @@
             <a:fld id="{9B2BCD74-F7F5-4BD6-83D7-1EBC56D75222}" type="datetimeFigureOut">
               <a:rPr lang="en-GB" smtClean="0"/>
               <a:pPr/>
-              <a:t>20/11/2012</a:t>
+              <a:t>21/11/2012</a:t>
             </a:fld>
             <a:endParaRPr lang="en-GB"/>
           </a:p>
@@ -1609,7 +1610,7 @@
             <a:fld id="{9B2BCD74-F7F5-4BD6-83D7-1EBC56D75222}" type="datetimeFigureOut">
               <a:rPr lang="en-GB" smtClean="0"/>
               <a:pPr/>
-              <a:t>20/11/2012</a:t>
+              <a:t>21/11/2012</a:t>
             </a:fld>
             <a:endParaRPr lang="en-GB"/>
           </a:p>
@@ -1894,7 +1895,7 @@
             <a:fld id="{9B2BCD74-F7F5-4BD6-83D7-1EBC56D75222}" type="datetimeFigureOut">
               <a:rPr lang="en-GB" smtClean="0"/>
               <a:pPr/>
-              <a:t>20/11/2012</a:t>
+              <a:t>21/11/2012</a:t>
             </a:fld>
             <a:endParaRPr lang="en-GB"/>
           </a:p>
@@ -2313,7 +2314,7 @@
             <a:fld id="{9B2BCD74-F7F5-4BD6-83D7-1EBC56D75222}" type="datetimeFigureOut">
               <a:rPr lang="en-GB" smtClean="0"/>
               <a:pPr/>
-              <a:t>20/11/2012</a:t>
+              <a:t>21/11/2012</a:t>
             </a:fld>
             <a:endParaRPr lang="en-GB"/>
           </a:p>
@@ -2428,7 +2429,7 @@
             <a:fld id="{9B2BCD74-F7F5-4BD6-83D7-1EBC56D75222}" type="datetimeFigureOut">
               <a:rPr lang="en-GB" smtClean="0"/>
               <a:pPr/>
-              <a:t>20/11/2012</a:t>
+              <a:t>21/11/2012</a:t>
             </a:fld>
             <a:endParaRPr lang="en-GB"/>
           </a:p>
@@ -2520,7 +2521,7 @@
             <a:fld id="{9B2BCD74-F7F5-4BD6-83D7-1EBC56D75222}" type="datetimeFigureOut">
               <a:rPr lang="en-GB" smtClean="0"/>
               <a:pPr/>
-              <a:t>20/11/2012</a:t>
+              <a:t>21/11/2012</a:t>
             </a:fld>
             <a:endParaRPr lang="en-GB"/>
           </a:p>
@@ -2794,7 +2795,7 @@
             <a:fld id="{9B2BCD74-F7F5-4BD6-83D7-1EBC56D75222}" type="datetimeFigureOut">
               <a:rPr lang="en-GB" smtClean="0"/>
               <a:pPr/>
-              <a:t>20/11/2012</a:t>
+              <a:t>21/11/2012</a:t>
             </a:fld>
             <a:endParaRPr lang="en-GB"/>
           </a:p>
@@ -3044,7 +3045,7 @@
             <a:fld id="{9B2BCD74-F7F5-4BD6-83D7-1EBC56D75222}" type="datetimeFigureOut">
               <a:rPr lang="en-GB" smtClean="0"/>
               <a:pPr/>
-              <a:t>20/11/2012</a:t>
+              <a:t>21/11/2012</a:t>
             </a:fld>
             <a:endParaRPr lang="en-GB"/>
           </a:p>
@@ -3109,11 +3110,11 @@
         <a:blipFill dpi="0" rotWithShape="1">
           <a:blip r:embed="rId13" cstate="print">
             <a:duotone>
-              <a:prstClr val="black"/>
-              <a:schemeClr val="accent5">
-                <a:tint val="45000"/>
-                <a:satMod val="400000"/>
+              <a:schemeClr val="bg2">
+                <a:shade val="45000"/>
+                <a:satMod val="135000"/>
               </a:schemeClr>
+              <a:prstClr val="white"/>
             </a:duotone>
           </a:blip>
           <a:srcRect/>
@@ -3269,7 +3270,7 @@
             <a:fld id="{9B2BCD74-F7F5-4BD6-83D7-1EBC56D75222}" type="datetimeFigureOut">
               <a:rPr lang="en-GB" smtClean="0"/>
               <a:pPr/>
-              <a:t>20/11/2012</a:t>
+              <a:t>21/11/2012</a:t>
             </a:fld>
             <a:endParaRPr lang="en-GB"/>
           </a:p>
@@ -3664,7 +3665,7 @@
           <a:p>
             <a:r>
               <a:rPr lang="en-GB" dirty="0" err="1" smtClean="0"/>
-              <a:t>Trendubad</a:t>
+              <a:t>Malucrawl</a:t>
             </a:r>
             <a:endParaRPr lang="en-GB" dirty="0"/>
           </a:p>
@@ -3794,11 +3795,68 @@
           <a:p>
             <a:r>
               <a:rPr lang="en-GB" dirty="0"/>
-              <a:t>The temp Wine-prefix is removed after giving results</a:t>
+              <a:t>The </a:t>
+            </a:r>
+            <a:r>
+              <a:rPr lang="en-GB" dirty="0" smtClean="0"/>
+              <a:t>temporary </a:t>
+            </a:r>
+            <a:r>
+              <a:rPr lang="en-GB" dirty="0"/>
+              <a:t>Wine-prefix is removed after giving results</a:t>
             </a:r>
             <a:r>
               <a:rPr lang="en-GB" dirty="0" smtClean="0"/>
               <a:t>.</a:t>
+            </a:r>
+            <a:endParaRPr lang="en-GB" dirty="0"/>
+          </a:p>
+        </p:txBody>
+      </p:sp>
+      <p:sp>
+        <p:nvSpPr>
+          <p:cNvPr id="5" name="Dodecagon 4"/>
+          <p:cNvSpPr/>
+          <p:nvPr/>
+        </p:nvSpPr>
+        <p:spPr>
+          <a:xfrm>
+            <a:off x="8028384" y="5805264"/>
+            <a:ext cx="864096" cy="864096"/>
+          </a:xfrm>
+          <a:prstGeom prst="dodecagon">
+            <a:avLst/>
+          </a:prstGeom>
+          <a:solidFill>
+            <a:schemeClr val="accent2">
+              <a:lumMod val="50000"/>
+            </a:schemeClr>
+          </a:solidFill>
+        </p:spPr>
+        <p:style>
+          <a:lnRef idx="2">
+            <a:schemeClr val="accent1">
+              <a:shade val="50000"/>
+            </a:schemeClr>
+          </a:lnRef>
+          <a:fillRef idx="1">
+            <a:schemeClr val="accent1"/>
+          </a:fillRef>
+          <a:effectRef idx="0">
+            <a:schemeClr val="accent1"/>
+          </a:effectRef>
+          <a:fontRef idx="minor">
+            <a:schemeClr val="lt1"/>
+          </a:fontRef>
+        </p:style>
+        <p:txBody>
+          <a:bodyPr rtlCol="0" anchor="ctr"/>
+          <a:lstStyle/>
+          <a:p>
+            <a:pPr algn="ctr"/>
+            <a:r>
+              <a:rPr lang="en-GB" dirty="0" smtClean="0"/>
+              <a:t>High</a:t>
             </a:r>
             <a:endParaRPr lang="en-GB" dirty="0"/>
           </a:p>
@@ -3907,6 +3965,54 @@
               <a:rPr lang="en-GB" dirty="0"/>
               <a:t>Concurrent execution is achieved with Celery. </a:t>
             </a:r>
+          </a:p>
+        </p:txBody>
+      </p:sp>
+      <p:sp>
+        <p:nvSpPr>
+          <p:cNvPr id="5" name="Dodecagon 4"/>
+          <p:cNvSpPr/>
+          <p:nvPr/>
+        </p:nvSpPr>
+        <p:spPr>
+          <a:xfrm>
+            <a:off x="8028384" y="5805264"/>
+            <a:ext cx="864096" cy="864096"/>
+          </a:xfrm>
+          <a:prstGeom prst="dodecagon">
+            <a:avLst/>
+          </a:prstGeom>
+          <a:solidFill>
+            <a:schemeClr val="accent3">
+              <a:lumMod val="50000"/>
+            </a:schemeClr>
+          </a:solidFill>
+        </p:spPr>
+        <p:style>
+          <a:lnRef idx="2">
+            <a:schemeClr val="accent1">
+              <a:shade val="50000"/>
+            </a:schemeClr>
+          </a:lnRef>
+          <a:fillRef idx="1">
+            <a:schemeClr val="accent1"/>
+          </a:fillRef>
+          <a:effectRef idx="0">
+            <a:schemeClr val="accent1"/>
+          </a:effectRef>
+          <a:fontRef idx="minor">
+            <a:schemeClr val="lt1"/>
+          </a:fontRef>
+        </p:style>
+        <p:txBody>
+          <a:bodyPr rtlCol="0" anchor="ctr"/>
+          <a:lstStyle/>
+          <a:p>
+            <a:pPr algn="ctr"/>
+            <a:r>
+              <a:rPr lang="en-GB" dirty="0" smtClean="0"/>
+              <a:t>Low</a:t>
+            </a:r>
             <a:endParaRPr lang="en-GB" dirty="0"/>
           </a:p>
         </p:txBody>
@@ -3998,8 +4104,8 @@
               <a:t>Slow, but provides high quality emulation of a vulnerable </a:t>
             </a:r>
             <a:r>
-              <a:rPr lang="en-GB" dirty="0" err="1" smtClean="0"/>
-              <a:t>envrionment</a:t>
+              <a:rPr lang="en-GB" dirty="0" smtClean="0"/>
+              <a:t>environment</a:t>
             </a:r>
             <a:endParaRPr lang="en-GB" dirty="0" smtClean="0"/>
           </a:p>
@@ -4007,6 +4113,55 @@
             <a:r>
               <a:rPr lang="en-GB" dirty="0" smtClean="0"/>
               <a:t>Required customisation for ECS infrastructure.</a:t>
+            </a:r>
+            <a:endParaRPr lang="en-GB" dirty="0"/>
+          </a:p>
+        </p:txBody>
+      </p:sp>
+      <p:sp>
+        <p:nvSpPr>
+          <p:cNvPr id="4" name="Dodecagon 3"/>
+          <p:cNvSpPr/>
+          <p:nvPr/>
+        </p:nvSpPr>
+        <p:spPr>
+          <a:xfrm>
+            <a:off x="8028384" y="5805264"/>
+            <a:ext cx="864096" cy="864096"/>
+          </a:xfrm>
+          <a:prstGeom prst="dodecagon">
+            <a:avLst/>
+          </a:prstGeom>
+          <a:solidFill>
+            <a:schemeClr val="accent2">
+              <a:lumMod val="50000"/>
+            </a:schemeClr>
+          </a:solidFill>
+        </p:spPr>
+        <p:style>
+          <a:lnRef idx="2">
+            <a:schemeClr val="accent1">
+              <a:shade val="50000"/>
+            </a:schemeClr>
+          </a:lnRef>
+          <a:fillRef idx="1">
+            <a:schemeClr val="accent1"/>
+          </a:fillRef>
+          <a:effectRef idx="0">
+            <a:schemeClr val="accent1"/>
+          </a:effectRef>
+          <a:fontRef idx="minor">
+            <a:schemeClr val="lt1"/>
+          </a:fontRef>
+        </p:style>
+        <p:txBody>
+          <a:bodyPr rtlCol="0" anchor="ctr"/>
+          <a:lstStyle/>
+          <a:p>
+            <a:pPr algn="ctr"/>
+            <a:r>
+              <a:rPr lang="en-GB" dirty="0" smtClean="0"/>
+              <a:t>High</a:t>
             </a:r>
             <a:endParaRPr lang="en-GB" dirty="0"/>
           </a:p>
@@ -4054,7 +4209,7 @@
           <a:p>
             <a:r>
               <a:rPr lang="en-GB" dirty="0" smtClean="0"/>
-              <a:t>Good/Bad URL Lists</a:t>
+              <a:t>Capture-HPC</a:t>
             </a:r>
             <a:endParaRPr lang="en-GB" dirty="0"/>
           </a:p>
@@ -4075,29 +4230,54 @@
           <a:bodyPr/>
           <a:lstStyle/>
           <a:p>
-            <a:r>
-              <a:rPr lang="en-GB" dirty="0" err="1" smtClean="0"/>
-              <a:t>Alexa</a:t>
-            </a:r>
-            <a:r>
-              <a:rPr lang="en-GB" dirty="0" smtClean="0"/>
-              <a:t>, Google “Safe Browsing Lookup API”, Web Of Trust “WOT” API</a:t>
-            </a:r>
-          </a:p>
-          <a:p>
-            <a:r>
-              <a:rPr lang="en-GB" dirty="0" smtClean="0"/>
-              <a:t>Make request to Google or WOT, return reformatted result</a:t>
-            </a:r>
-          </a:p>
-          <a:p>
-            <a:r>
-              <a:rPr lang="en-GB" dirty="0" err="1" smtClean="0"/>
-              <a:t>Alexa</a:t>
-            </a:r>
-            <a:r>
-              <a:rPr lang="en-GB" dirty="0" smtClean="0"/>
-              <a:t> provides daily ZIP of top million results… </a:t>
+            <a:endParaRPr lang="en-GB" dirty="0"/>
+          </a:p>
+        </p:txBody>
+      </p:sp>
+      <p:sp>
+        <p:nvSpPr>
+          <p:cNvPr id="4" name="Dodecagon 3"/>
+          <p:cNvSpPr/>
+          <p:nvPr/>
+        </p:nvSpPr>
+        <p:spPr>
+          <a:xfrm>
+            <a:off x="8028384" y="5805264"/>
+            <a:ext cx="864096" cy="864096"/>
+          </a:xfrm>
+          <a:prstGeom prst="dodecagon">
+            <a:avLst/>
+          </a:prstGeom>
+          <a:solidFill>
+            <a:schemeClr val="accent2">
+              <a:lumMod val="50000"/>
+            </a:schemeClr>
+          </a:solidFill>
+        </p:spPr>
+        <p:style>
+          <a:lnRef idx="2">
+            <a:schemeClr val="accent1">
+              <a:shade val="50000"/>
+            </a:schemeClr>
+          </a:lnRef>
+          <a:fillRef idx="1">
+            <a:schemeClr val="accent1"/>
+          </a:fillRef>
+          <a:effectRef idx="0">
+            <a:schemeClr val="accent1"/>
+          </a:effectRef>
+          <a:fontRef idx="minor">
+            <a:schemeClr val="lt1"/>
+          </a:fontRef>
+        </p:style>
+        <p:txBody>
+          <a:bodyPr rtlCol="0" anchor="ctr"/>
+          <a:lstStyle/>
+          <a:p>
+            <a:pPr algn="ctr"/>
+            <a:r>
+              <a:rPr lang="en-GB" dirty="0" smtClean="0"/>
+              <a:t>High</a:t>
             </a:r>
             <a:endParaRPr lang="en-GB" dirty="0"/>
           </a:p>
@@ -4167,64 +4347,78 @@
           <a:lstStyle/>
           <a:p>
             <a:r>
-              <a:rPr lang="en-GB" dirty="0" smtClean="0"/>
-              <a:t>Daily </a:t>
-            </a:r>
-            <a:r>
-              <a:rPr lang="en-GB" dirty="0" err="1" smtClean="0"/>
-              <a:t>Celerybeat</a:t>
-            </a:r>
-            <a:r>
-              <a:rPr lang="en-GB" dirty="0" smtClean="0"/>
-              <a:t> Task</a:t>
-            </a:r>
-          </a:p>
-          <a:p>
-            <a:pPr lvl="1"/>
-            <a:r>
-              <a:rPr lang="en-GB" dirty="0" smtClean="0"/>
-              <a:t>Download, extract and store </a:t>
-            </a:r>
-            <a:r>
               <a:rPr lang="en-GB" dirty="0" err="1" smtClean="0"/>
               <a:t>Alexa</a:t>
             </a:r>
             <a:r>
               <a:rPr lang="en-GB" dirty="0" smtClean="0"/>
-              <a:t> Zipped CSV in </a:t>
-            </a:r>
+              <a:t>, Google “Safe Browsing Lookup API”, Web Of Trust “WOT” API</a:t>
+            </a:r>
+          </a:p>
+          <a:p>
+            <a:r>
+              <a:rPr lang="en-GB" dirty="0" smtClean="0"/>
+              <a:t>Make request to Google or WOT, return reformatted result</a:t>
+            </a:r>
+          </a:p>
+          <a:p>
             <a:r>
               <a:rPr lang="en-GB" dirty="0" err="1" smtClean="0"/>
-              <a:t>Redis</a:t>
-            </a:r>
-            <a:r>
-              <a:rPr lang="en-GB" dirty="0" smtClean="0"/>
-              <a:t> write master</a:t>
-            </a:r>
-          </a:p>
-          <a:p>
-            <a:pPr lvl="1"/>
-            <a:r>
-              <a:rPr lang="en-GB" dirty="0" err="1" smtClean="0"/>
-              <a:t>Redis</a:t>
-            </a:r>
-            <a:r>
-              <a:rPr lang="en-GB" dirty="0" smtClean="0"/>
-              <a:t> read slaves on each worker machine mirror write master</a:t>
-            </a:r>
-          </a:p>
-          <a:p>
-            <a:r>
-              <a:rPr lang="en-GB" dirty="0" smtClean="0"/>
-              <a:t>Tasks check </a:t>
-            </a:r>
-            <a:r>
-              <a:rPr lang="en-GB" dirty="0" err="1" smtClean="0"/>
-              <a:t>Redis</a:t>
-            </a:r>
-            <a:r>
-              <a:rPr lang="en-GB" dirty="0" smtClean="0"/>
-              <a:t> read slave</a:t>
+              <a:t>Alexa</a:t>
+            </a:r>
+            <a:r>
+              <a:rPr lang="en-GB" dirty="0" smtClean="0"/>
+              <a:t> provides daily ZIP of top million results… </a:t>
+            </a:r>
+            <a:endParaRPr lang="en-GB" dirty="0"/>
+          </a:p>
+        </p:txBody>
+      </p:sp>
+      <p:sp>
+        <p:nvSpPr>
+          <p:cNvPr id="4" name="Dodecagon 3"/>
+          <p:cNvSpPr/>
+          <p:nvPr/>
+        </p:nvSpPr>
+        <p:spPr>
+          <a:xfrm>
+            <a:off x="8028384" y="5805264"/>
+            <a:ext cx="864096" cy="864096"/>
+          </a:xfrm>
+          <a:prstGeom prst="dodecagon">
+            <a:avLst/>
+          </a:prstGeom>
+          <a:solidFill>
+            <a:schemeClr val="bg1">
+              <a:lumMod val="85000"/>
+              <a:lumOff val="15000"/>
+            </a:schemeClr>
+          </a:solidFill>
+        </p:spPr>
+        <p:style>
+          <a:lnRef idx="2">
+            <a:schemeClr val="accent1">
+              <a:shade val="50000"/>
+            </a:schemeClr>
+          </a:lnRef>
+          <a:fillRef idx="1">
+            <a:schemeClr val="accent1"/>
+          </a:fillRef>
+          <a:effectRef idx="0">
+            <a:schemeClr val="accent1"/>
+          </a:effectRef>
+          <a:fontRef idx="minor">
+            <a:schemeClr val="lt1"/>
+          </a:fontRef>
+        </p:style>
+        <p:txBody>
+          <a:bodyPr rtlCol="0" anchor="ctr"/>
+          <a:lstStyle/>
+          <a:p>
+            <a:pPr algn="ctr"/>
+            <a:r>
+              <a:rPr lang="en-GB" dirty="0" smtClean="0"/>
+              <a:t>No</a:t>
             </a:r>
             <a:endParaRPr lang="en-GB" dirty="0"/>
           </a:p>
@@ -4272,7 +4466,7 @@
           <a:p>
             <a:r>
               <a:rPr lang="en-GB" dirty="0" smtClean="0"/>
-              <a:t>Framework Integration</a:t>
+              <a:t>Good/Bad URL Lists</a:t>
             </a:r>
             <a:endParaRPr lang="en-GB" dirty="0"/>
           </a:p>
@@ -4295,38 +4489,114 @@
           <a:p>
             <a:r>
               <a:rPr lang="en-GB" dirty="0" smtClean="0"/>
-              <a:t>Celery on top of </a:t>
-            </a:r>
-            <a:r>
-              <a:rPr lang="en-GB" dirty="0" err="1" smtClean="0"/>
-              <a:t>RabbitMQ</a:t>
-            </a:r>
-            <a:endParaRPr lang="en-GB" dirty="0" smtClean="0"/>
-          </a:p>
-          <a:p>
+              <a:t>Daily </a:t>
+            </a:r>
             <a:r>
               <a:rPr lang="en-GB" dirty="0" err="1" smtClean="0"/>
               <a:t>Celerybeat</a:t>
             </a:r>
             <a:r>
               <a:rPr lang="en-GB" dirty="0" smtClean="0"/>
-              <a:t> for daily trend scan/URL list updates</a:t>
-            </a:r>
-          </a:p>
-          <a:p>
-            <a:r>
-              <a:rPr lang="en-GB" dirty="0" smtClean="0"/>
-              <a:t>Calls each task with the result of </a:t>
-            </a:r>
-            <a:r>
-              <a:rPr lang="en-GB" smtClean="0"/>
-              <a:t>the previous</a:t>
-            </a:r>
-          </a:p>
-          <a:p>
-            <a:endParaRPr lang="en-GB" dirty="0" smtClean="0"/>
-          </a:p>
-          <a:p>
+              <a:t> Task</a:t>
+            </a:r>
+          </a:p>
+          <a:p>
+            <a:pPr lvl="1"/>
+            <a:r>
+              <a:rPr lang="en-GB" dirty="0" smtClean="0"/>
+              <a:t>Download, extract and store </a:t>
+            </a:r>
+            <a:r>
+              <a:rPr lang="en-GB" dirty="0" err="1" smtClean="0"/>
+              <a:t>Alexa</a:t>
+            </a:r>
+            <a:r>
+              <a:rPr lang="en-GB" dirty="0" smtClean="0"/>
+              <a:t> Zipped CSV in </a:t>
+            </a:r>
+            <a:r>
+              <a:rPr lang="en-GB" dirty="0" err="1" smtClean="0"/>
+              <a:t>Redis</a:t>
+            </a:r>
+            <a:r>
+              <a:rPr lang="en-GB" dirty="0" smtClean="0"/>
+              <a:t> write master</a:t>
+            </a:r>
+          </a:p>
+          <a:p>
+            <a:pPr lvl="1"/>
+            <a:r>
+              <a:rPr lang="en-GB" dirty="0" err="1" smtClean="0"/>
+              <a:t>Redis</a:t>
+            </a:r>
+            <a:r>
+              <a:rPr lang="en-GB" dirty="0" smtClean="0"/>
+              <a:t> read slaves on each worker machine mirror write master</a:t>
+            </a:r>
+          </a:p>
+          <a:p>
+            <a:r>
+              <a:rPr lang="en-GB" dirty="0" smtClean="0"/>
+              <a:t>Tasks check </a:t>
+            </a:r>
+            <a:r>
+              <a:rPr lang="en-GB" dirty="0" err="1" smtClean="0"/>
+              <a:t>Redis</a:t>
+            </a:r>
+            <a:r>
+              <a:rPr lang="en-GB" dirty="0" smtClean="0"/>
+              <a:t> read slave</a:t>
+            </a:r>
+            <a:endParaRPr lang="en-GB" dirty="0"/>
+          </a:p>
+        </p:txBody>
+      </p:sp>
+      <p:sp>
+        <p:nvSpPr>
+          <p:cNvPr id="4" name="Dodecagon 3"/>
+          <p:cNvSpPr/>
+          <p:nvPr/>
+        </p:nvSpPr>
+        <p:spPr>
+          <a:xfrm>
+            <a:off x="8028384" y="5805264"/>
+            <a:ext cx="864096" cy="864096"/>
+          </a:xfrm>
+          <a:prstGeom prst="dodecagon">
+            <a:avLst/>
+          </a:prstGeom>
+          <a:solidFill>
+            <a:schemeClr val="bg1">
+              <a:lumMod val="85000"/>
+              <a:lumOff val="15000"/>
+            </a:schemeClr>
+          </a:solidFill>
+        </p:spPr>
+        <p:style>
+          <a:lnRef idx="2">
+            <a:schemeClr val="accent1">
+              <a:shade val="50000"/>
+            </a:schemeClr>
+          </a:lnRef>
+          <a:fillRef idx="1">
+            <a:schemeClr val="accent1"/>
+          </a:fillRef>
+          <a:effectRef idx="0">
+            <a:schemeClr val="accent1"/>
+          </a:effectRef>
+          <a:fontRef idx="minor">
+            <a:schemeClr val="lt1"/>
+          </a:fontRef>
+        </p:style>
+        <p:txBody>
+          <a:bodyPr rtlCol="0" anchor="ctr"/>
+          <a:lstStyle/>
+          <a:p>
+            <a:pPr algn="ctr"/>
+            <a:r>
+              <a:rPr lang="en-GB" dirty="0" smtClean="0"/>
+              <a:t>No</a:t>
+            </a:r>
             <a:endParaRPr lang="en-GB" dirty="0"/>
           </a:p>
         </p:txBody>
@@ -4336,13 +4606,6 @@
   <p:clrMapOvr>
     <a:masterClrMapping/>
   </p:clrMapOvr>
-  <p:timing>
-    <p:tnLst>
-      <p:par>
-        <p:cTn id="1" dur="indefinite" restart="never" nodeType="tmRoot"/>
-      </p:par>
-    </p:tnLst>
-  </p:timing>
 </p:sld>
 </file>
 
@@ -4380,7 +4643,7 @@
           <a:p>
             <a:r>
               <a:rPr lang="en-GB" dirty="0" smtClean="0"/>
-              <a:t>Storage of Analysis Results</a:t>
+              <a:t>Framework Integration</a:t>
             </a:r>
             <a:endParaRPr lang="en-GB" dirty="0"/>
           </a:p>
@@ -4403,35 +4666,35 @@
           <a:p>
             <a:r>
               <a:rPr lang="en-GB" dirty="0" smtClean="0"/>
-              <a:t>Want to use </a:t>
+              <a:t>Celery on top of </a:t>
             </a:r>
             <a:r>
               <a:rPr lang="en-GB" dirty="0" err="1" smtClean="0"/>
-              <a:t>Django</a:t>
-            </a:r>
-            <a:r>
-              <a:rPr lang="en-GB" dirty="0" smtClean="0"/>
-              <a:t> ORM for easy Analysis of Results</a:t>
-            </a:r>
-          </a:p>
-          <a:p>
-            <a:r>
-              <a:rPr lang="en-GB" dirty="0" smtClean="0"/>
-              <a:t>Bulk Insert, and strict database schema</a:t>
-            </a:r>
-          </a:p>
-          <a:p>
-            <a:pPr lvl="1"/>
-            <a:r>
-              <a:rPr lang="en-GB" dirty="0" smtClean="0"/>
-              <a:t>Any error will result in the entire transaction being thrown out </a:t>
-            </a:r>
-          </a:p>
-          <a:p>
-            <a:r>
-              <a:rPr lang="en-GB" dirty="0" smtClean="0"/>
-              <a:t>Use JSON schema to validate data to be stored </a:t>
-            </a:r>
+              <a:t>RabbitMQ</a:t>
+            </a:r>
+            <a:endParaRPr lang="en-GB" dirty="0" smtClean="0"/>
+          </a:p>
+          <a:p>
+            <a:r>
+              <a:rPr lang="en-GB" dirty="0" err="1" smtClean="0"/>
+              <a:t>Celerybeat</a:t>
+            </a:r>
+            <a:r>
+              <a:rPr lang="en-GB" dirty="0" smtClean="0"/>
+              <a:t> for daily trend scan/URL list updates</a:t>
+            </a:r>
+          </a:p>
+          <a:p>
+            <a:r>
+              <a:rPr lang="en-GB" dirty="0" smtClean="0"/>
+              <a:t>Calls each task with the result of the previous</a:t>
+            </a:r>
+          </a:p>
+          <a:p>
+            <a:endParaRPr lang="en-GB" dirty="0" smtClean="0"/>
+          </a:p>
+          <a:p>
+            <a:endParaRPr lang="en-GB" dirty="0"/>
           </a:p>
         </p:txBody>
       </p:sp>
@@ -4484,7 +4747,7 @@
           <a:p>
             <a:r>
               <a:rPr lang="en-GB" dirty="0" smtClean="0"/>
-              <a:t>Remaining Work</a:t>
+              <a:t>Storage of Analysis Results</a:t>
             </a:r>
             <a:endParaRPr lang="en-GB" dirty="0"/>
           </a:p>
@@ -4507,40 +4770,34 @@
           <a:p>
             <a:r>
               <a:rPr lang="en-GB" dirty="0" smtClean="0"/>
-              <a:t>Web Reporting interface</a:t>
+              <a:t>Want to use </a:t>
+            </a:r>
+            <a:r>
+              <a:rPr lang="en-GB" dirty="0" err="1" smtClean="0"/>
+              <a:t>Django</a:t>
+            </a:r>
+            <a:r>
+              <a:rPr lang="en-GB" dirty="0" smtClean="0"/>
+              <a:t> ORM for easy Analysis of Results</a:t>
+            </a:r>
+          </a:p>
+          <a:p>
+            <a:r>
+              <a:rPr lang="en-GB" dirty="0" smtClean="0"/>
+              <a:t>Bulk Insert, and strict database schema</a:t>
             </a:r>
           </a:p>
           <a:p>
             <a:pPr lvl="1"/>
             <a:r>
               <a:rPr lang="en-GB" dirty="0" smtClean="0"/>
-              <a:t>Graphing</a:t>
-            </a:r>
-          </a:p>
-          <a:p>
-            <a:r>
-              <a:rPr lang="en-GB" dirty="0" smtClean="0"/>
-              <a:t>Compile sample data for report</a:t>
-            </a:r>
-          </a:p>
-          <a:p>
-            <a:r>
-              <a:rPr lang="en-GB" dirty="0" smtClean="0"/>
-              <a:t>Produce Report</a:t>
-            </a:r>
-          </a:p>
-          <a:p>
-            <a:pPr lvl="1"/>
-            <a:r>
-              <a:rPr lang="en-GB" dirty="0" smtClean="0"/>
-              <a:t>Latex template already produce</a:t>
-            </a:r>
-          </a:p>
-          <a:p>
-            <a:pPr lvl="1"/>
-            <a:r>
-              <a:rPr lang="en-GB" dirty="0" smtClean="0"/>
-              <a:t>Including productivity tools??!</a:t>
+              <a:t>Any error will result in the entire transaction being thrown out </a:t>
+            </a:r>
+          </a:p>
+          <a:p>
+            <a:r>
+              <a:rPr lang="en-GB" dirty="0" smtClean="0"/>
+              <a:t>Use JSON schema to validate data to be stored </a:t>
             </a:r>
           </a:p>
         </p:txBody>
@@ -4584,6 +4841,129 @@
             <a:spLocks noGrp="1"/>
           </p:cNvSpPr>
           <p:nvPr>
+            <p:ph type="title"/>
+          </p:nvPr>
+        </p:nvSpPr>
+        <p:spPr/>
+        <p:txBody>
+          <a:bodyPr/>
+          <a:lstStyle/>
+          <a:p>
+            <a:r>
+              <a:rPr lang="en-GB" dirty="0" smtClean="0"/>
+              <a:t>Remaining Work</a:t>
+            </a:r>
+            <a:endParaRPr lang="en-GB" dirty="0"/>
+          </a:p>
+        </p:txBody>
+      </p:sp>
+      <p:sp>
+        <p:nvSpPr>
+          <p:cNvPr id="3" name="Content Placeholder 2"/>
+          <p:cNvSpPr>
+            <a:spLocks noGrp="1"/>
+          </p:cNvSpPr>
+          <p:nvPr>
+            <p:ph idx="1"/>
+          </p:nvPr>
+        </p:nvSpPr>
+        <p:spPr/>
+        <p:txBody>
+          <a:bodyPr/>
+          <a:lstStyle/>
+          <a:p>
+            <a:r>
+              <a:rPr lang="en-GB" dirty="0" smtClean="0"/>
+              <a:t>Web Reporting interface</a:t>
+            </a:r>
+          </a:p>
+          <a:p>
+            <a:pPr lvl="1"/>
+            <a:r>
+              <a:rPr lang="en-GB" dirty="0" smtClean="0"/>
+              <a:t>Graphing</a:t>
+            </a:r>
+          </a:p>
+          <a:p>
+            <a:r>
+              <a:rPr lang="en-GB" dirty="0" smtClean="0"/>
+              <a:t>Compile sample data for report</a:t>
+            </a:r>
+          </a:p>
+          <a:p>
+            <a:r>
+              <a:rPr lang="en-GB" dirty="0" smtClean="0"/>
+              <a:t>Produce Report</a:t>
+            </a:r>
+          </a:p>
+          <a:p>
+            <a:pPr lvl="1"/>
+            <a:r>
+              <a:rPr lang="en-GB" dirty="0" smtClean="0"/>
+              <a:t>Latex template already produce</a:t>
+            </a:r>
+          </a:p>
+          <a:p>
+            <a:pPr lvl="1"/>
+            <a:r>
+              <a:rPr lang="en-GB" dirty="0" smtClean="0"/>
+              <a:t>Use</a:t>
+            </a:r>
+            <a:r>
+              <a:rPr lang="en-GB" dirty="0" smtClean="0"/>
+              <a:t> </a:t>
+            </a:r>
+            <a:r>
+              <a:rPr lang="en-GB" dirty="0" smtClean="0"/>
+              <a:t>productivity </a:t>
+            </a:r>
+            <a:r>
+              <a:rPr lang="en-GB" dirty="0" smtClean="0"/>
+              <a:t>tools to aid production.</a:t>
+            </a:r>
+            <a:endParaRPr lang="en-GB" dirty="0" smtClean="0"/>
+          </a:p>
+        </p:txBody>
+      </p:sp>
+    </p:spTree>
+  </p:cSld>
+  <p:clrMapOvr>
+    <a:masterClrMapping/>
+  </p:clrMapOvr>
+  <p:timing>
+    <p:tnLst>
+      <p:par>
+        <p:cTn id="1" dur="indefinite" restart="never" nodeType="tmRoot"/>
+      </p:par>
+    </p:tnLst>
+  </p:timing>
+</p:sld>
+</file>
+
+<file path=ppt/slides/slide19.xml><?xml version="1.0" encoding="utf-8"?>
+<p:sld xmlns:a="http://schemas.openxmlformats.org/drawingml/2006/main" xmlns:r="http://schemas.openxmlformats.org/officeDocument/2006/relationships" xmlns:p="http://schemas.openxmlformats.org/presentationml/2006/main">
+  <p:cSld>
+    <p:spTree>
+      <p:nvGrpSpPr>
+        <p:cNvPr id="1" name=""/>
+        <p:cNvGrpSpPr/>
+        <p:nvPr/>
+      </p:nvGrpSpPr>
+      <p:grpSpPr>
+        <a:xfrm>
+          <a:off x="0" y="0"/>
+          <a:ext cx="0" cy="0"/>
+          <a:chOff x="0" y="0"/>
+          <a:chExt cx="0" cy="0"/>
+        </a:xfrm>
+      </p:grpSpPr>
+      <p:sp>
+        <p:nvSpPr>
+          <p:cNvPr id="2" name="Title 1"/>
+          <p:cNvSpPr>
+            <a:spLocks noGrp="1"/>
+          </p:cNvSpPr>
+          <p:nvPr>
             <p:ph type="ctrTitle"/>
           </p:nvPr>
         </p:nvSpPr>
@@ -4771,9 +5151,6 @@
               <a:t>Questions</a:t>
             </a:r>
           </a:p>
-          <a:p>
-            <a:endParaRPr lang="en-GB" dirty="0"/>
-          </a:p>
         </p:txBody>
       </p:sp>
     </p:spTree>
@@ -5619,19 +5996,18 @@
         <p:spPr/>
         <p:txBody>
           <a:bodyPr>
-            <a:normAutofit lnSpcReduction="10000"/>
+            <a:normAutofit/>
           </a:bodyPr>
           <a:lstStyle/>
           <a:p>
             <a:r>
               <a:rPr lang="en-US" dirty="0" smtClean="0"/>
-              <a:t>No interaction malware detection</a:t>
-            </a:r>
-          </a:p>
-          <a:p>
-            <a:pPr lvl="1">
-              <a:buNone/>
-            </a:pPr>
+              <a:t>No interaction malware </a:t>
+            </a:r>
+            <a:r>
+              <a:rPr lang="en-US" dirty="0" smtClean="0"/>
+              <a:t>detection</a:t>
+            </a:r>
             <a:endParaRPr lang="en-US" dirty="0" smtClean="0"/>
           </a:p>
           <a:p>
@@ -5644,7 +6020,15 @@
             <a:pPr lvl="1"/>
             <a:r>
               <a:rPr lang="en-US" dirty="0" smtClean="0"/>
-              <a:t>use lightweight or simulated clients to interact with the server.</a:t>
+              <a:t>U</a:t>
+            </a:r>
+            <a:r>
+              <a:rPr lang="en-US" dirty="0" smtClean="0"/>
+              <a:t>se lightweight </a:t>
+            </a:r>
+            <a:r>
+              <a:rPr lang="en-US" dirty="0" smtClean="0"/>
+              <a:t>or simulated clients to interact with the server.</a:t>
             </a:r>
           </a:p>
           <a:p>
@@ -5657,16 +6041,181 @@
             <a:pPr lvl="1"/>
             <a:r>
               <a:rPr lang="en-US" dirty="0" smtClean="0"/>
-              <a:t>Attacks are detected via inspection of the state of the system after a server has been interacted with</a:t>
-            </a:r>
+              <a:t>Use emulated and </a:t>
+            </a:r>
+            <a:r>
+              <a:rPr lang="en-US" dirty="0" err="1" smtClean="0"/>
+              <a:t>virtualised</a:t>
+            </a:r>
+            <a:r>
+              <a:rPr lang="en-US" dirty="0" smtClean="0"/>
+              <a:t> clients, very closely resembling a generic vulnerable system.</a:t>
+            </a:r>
+            <a:endParaRPr lang="en-US" dirty="0" smtClean="0"/>
           </a:p>
           <a:p>
             <a:pPr lvl="1"/>
             <a:r>
               <a:rPr lang="en-US" dirty="0" smtClean="0"/>
-              <a:t>effective at detecting unknown attacks on clients</a:t>
+              <a:t>E</a:t>
+            </a:r>
+            <a:r>
+              <a:rPr lang="en-US" dirty="0" smtClean="0"/>
+              <a:t>ffective </a:t>
+            </a:r>
+            <a:r>
+              <a:rPr lang="en-US" dirty="0" smtClean="0"/>
+              <a:t>at detecting unknown attacks on clients</a:t>
             </a:r>
             <a:endParaRPr lang="en-US" dirty="0"/>
+          </a:p>
+        </p:txBody>
+      </p:sp>
+      <p:sp>
+        <p:nvSpPr>
+          <p:cNvPr id="4" name="Dodecagon 3"/>
+          <p:cNvSpPr/>
+          <p:nvPr/>
+        </p:nvSpPr>
+        <p:spPr>
+          <a:xfrm>
+            <a:off x="2699792" y="5805264"/>
+            <a:ext cx="864096" cy="864096"/>
+          </a:xfrm>
+          <a:prstGeom prst="dodecagon">
+            <a:avLst/>
+          </a:prstGeom>
+          <a:solidFill>
+            <a:schemeClr val="bg1">
+              <a:lumMod val="85000"/>
+              <a:lumOff val="15000"/>
+            </a:schemeClr>
+          </a:solidFill>
+        </p:spPr>
+        <p:style>
+          <a:lnRef idx="2">
+            <a:schemeClr val="accent1">
+              <a:shade val="50000"/>
+            </a:schemeClr>
+          </a:lnRef>
+          <a:fillRef idx="1">
+            <a:schemeClr val="accent1"/>
+          </a:fillRef>
+          <a:effectRef idx="0">
+            <a:schemeClr val="accent1"/>
+          </a:effectRef>
+          <a:fontRef idx="minor">
+            <a:schemeClr val="lt1"/>
+          </a:fontRef>
+        </p:style>
+        <p:txBody>
+          <a:bodyPr rtlCol="0" anchor="ctr"/>
+          <a:lstStyle/>
+          <a:p>
+            <a:pPr algn="ctr"/>
+            <a:r>
+              <a:rPr lang="en-GB" dirty="0" smtClean="0"/>
+              <a:t>No</a:t>
+            </a:r>
+            <a:endParaRPr lang="en-GB" dirty="0"/>
+          </a:p>
+        </p:txBody>
+      </p:sp>
+      <p:sp>
+        <p:nvSpPr>
+          <p:cNvPr id="5" name="Dodecagon 4"/>
+          <p:cNvSpPr/>
+          <p:nvPr/>
+        </p:nvSpPr>
+        <p:spPr>
+          <a:xfrm>
+            <a:off x="4067944" y="5805264"/>
+            <a:ext cx="864096" cy="864096"/>
+          </a:xfrm>
+          <a:prstGeom prst="dodecagon">
+            <a:avLst/>
+          </a:prstGeom>
+          <a:solidFill>
+            <a:schemeClr val="accent3">
+              <a:lumMod val="50000"/>
+            </a:schemeClr>
+          </a:solidFill>
+        </p:spPr>
+        <p:style>
+          <a:lnRef idx="2">
+            <a:schemeClr val="accent1">
+              <a:shade val="50000"/>
+            </a:schemeClr>
+          </a:lnRef>
+          <a:fillRef idx="1">
+            <a:schemeClr val="accent1"/>
+          </a:fillRef>
+          <a:effectRef idx="0">
+            <a:schemeClr val="accent1"/>
+          </a:effectRef>
+          <a:fontRef idx="minor">
+            <a:schemeClr val="lt1"/>
+          </a:fontRef>
+        </p:style>
+        <p:txBody>
+          <a:bodyPr rtlCol="0" anchor="ctr"/>
+          <a:lstStyle/>
+          <a:p>
+            <a:pPr algn="ctr"/>
+            <a:r>
+              <a:rPr lang="en-GB" dirty="0" smtClean="0"/>
+              <a:t>Low</a:t>
+            </a:r>
+            <a:endParaRPr lang="en-GB" dirty="0"/>
+          </a:p>
+        </p:txBody>
+      </p:sp>
+      <p:sp>
+        <p:nvSpPr>
+          <p:cNvPr id="6" name="Dodecagon 5"/>
+          <p:cNvSpPr/>
+          <p:nvPr/>
+        </p:nvSpPr>
+        <p:spPr>
+          <a:xfrm>
+            <a:off x="5364088" y="5805264"/>
+            <a:ext cx="864096" cy="864096"/>
+          </a:xfrm>
+          <a:prstGeom prst="dodecagon">
+            <a:avLst/>
+          </a:prstGeom>
+          <a:solidFill>
+            <a:schemeClr val="accent2">
+              <a:lumMod val="50000"/>
+            </a:schemeClr>
+          </a:solidFill>
+        </p:spPr>
+        <p:style>
+          <a:lnRef idx="2">
+            <a:schemeClr val="accent1">
+              <a:shade val="50000"/>
+            </a:schemeClr>
+          </a:lnRef>
+          <a:fillRef idx="1">
+            <a:schemeClr val="accent1"/>
+          </a:fillRef>
+          <a:effectRef idx="0">
+            <a:schemeClr val="accent1"/>
+          </a:effectRef>
+          <a:fontRef idx="minor">
+            <a:schemeClr val="lt1"/>
+          </a:fontRef>
+        </p:style>
+        <p:txBody>
+          <a:bodyPr rtlCol="0" anchor="ctr"/>
+          <a:lstStyle/>
+          <a:p>
+            <a:pPr algn="ctr"/>
+            <a:r>
+              <a:rPr lang="en-GB" dirty="0" smtClean="0"/>
+              <a:t>High</a:t>
+            </a:r>
+            <a:endParaRPr lang="en-GB" dirty="0"/>
           </a:p>
         </p:txBody>
       </p:sp>
@@ -5744,7 +6293,15 @@
           <a:p>
             <a:r>
               <a:rPr lang="en-GB" dirty="0"/>
-              <a:t>Malware detection based on repetition of the trendy keyword</a:t>
+              <a:t>Malware detection based on repetition of the </a:t>
+            </a:r>
+            <a:r>
+              <a:rPr lang="en-GB" dirty="0" smtClean="0"/>
+              <a:t>trending </a:t>
+            </a:r>
+            <a:r>
+              <a:rPr lang="en-GB" dirty="0"/>
+              <a:t>keyword</a:t>
             </a:r>
             <a:r>
               <a:rPr lang="en-GB" dirty="0" smtClean="0"/>
@@ -5792,7 +6349,11 @@
             </a:r>
             <a:r>
               <a:rPr lang="en-GB" dirty="0"/>
-              <a:t>frequently of reappearances of trendy </a:t>
+              <a:t>frequently of reappearances of </a:t>
+            </a:r>
+            <a:r>
+              <a:rPr lang="en-GB" dirty="0" smtClean="0"/>
+              <a:t>trending </a:t>
             </a:r>
             <a:r>
               <a:rPr lang="en-GB" dirty="0" smtClean="0"/>
@@ -5810,6 +6371,55 @@
               <a:rPr lang="en-GB" dirty="0"/>
               <a:t>the result of this algorithm for URL classification</a:t>
             </a:r>
+          </a:p>
+        </p:txBody>
+      </p:sp>
+      <p:sp>
+        <p:nvSpPr>
+          <p:cNvPr id="6" name="Dodecagon 5"/>
+          <p:cNvSpPr/>
+          <p:nvPr/>
+        </p:nvSpPr>
+        <p:spPr>
+          <a:xfrm>
+            <a:off x="8028384" y="5805264"/>
+            <a:ext cx="864096" cy="864096"/>
+          </a:xfrm>
+          <a:prstGeom prst="dodecagon">
+            <a:avLst/>
+          </a:prstGeom>
+          <a:solidFill>
+            <a:schemeClr val="accent3">
+              <a:lumMod val="50000"/>
+            </a:schemeClr>
+          </a:solidFill>
+        </p:spPr>
+        <p:style>
+          <a:lnRef idx="2">
+            <a:schemeClr val="accent1">
+              <a:shade val="50000"/>
+            </a:schemeClr>
+          </a:lnRef>
+          <a:fillRef idx="1">
+            <a:schemeClr val="accent1"/>
+          </a:fillRef>
+          <a:effectRef idx="0">
+            <a:schemeClr val="accent1"/>
+          </a:effectRef>
+          <a:fontRef idx="minor">
+            <a:schemeClr val="lt1"/>
+          </a:fontRef>
+        </p:style>
+        <p:txBody>
+          <a:bodyPr rtlCol="0" anchor="ctr"/>
+          <a:lstStyle/>
+          <a:p>
+            <a:pPr algn="ctr"/>
+            <a:r>
+              <a:rPr lang="en-GB" dirty="0" smtClean="0"/>
+              <a:t>Low</a:t>
+            </a:r>
+            <a:endParaRPr lang="en-GB" dirty="0"/>
           </a:p>
         </p:txBody>
       </p:sp>
@@ -6531,6 +7141,55 @@
           </a:p>
         </p:txBody>
       </p:sp>
+      <p:sp>
+        <p:nvSpPr>
+          <p:cNvPr id="21" name="Dodecagon 20"/>
+          <p:cNvSpPr/>
+          <p:nvPr/>
+        </p:nvSpPr>
+        <p:spPr>
+          <a:xfrm>
+            <a:off x="8028384" y="5805264"/>
+            <a:ext cx="864096" cy="864096"/>
+          </a:xfrm>
+          <a:prstGeom prst="dodecagon">
+            <a:avLst/>
+          </a:prstGeom>
+          <a:solidFill>
+            <a:schemeClr val="accent3">
+              <a:lumMod val="50000"/>
+            </a:schemeClr>
+          </a:solidFill>
+        </p:spPr>
+        <p:style>
+          <a:lnRef idx="2">
+            <a:schemeClr val="accent1">
+              <a:shade val="50000"/>
+            </a:schemeClr>
+          </a:lnRef>
+          <a:fillRef idx="1">
+            <a:schemeClr val="accent1"/>
+          </a:fillRef>
+          <a:effectRef idx="0">
+            <a:schemeClr val="accent1"/>
+          </a:effectRef>
+          <a:fontRef idx="minor">
+            <a:schemeClr val="lt1"/>
+          </a:fontRef>
+        </p:style>
+        <p:txBody>
+          <a:bodyPr rtlCol="0" anchor="ctr"/>
+          <a:lstStyle/>
+          <a:p>
+            <a:pPr algn="ctr"/>
+            <a:r>
+              <a:rPr lang="en-GB" dirty="0" smtClean="0"/>
+              <a:t>Low</a:t>
+            </a:r>
+            <a:endParaRPr lang="en-GB" dirty="0"/>
+          </a:p>
+        </p:txBody>
+      </p:sp>
     </p:spTree>
   </p:cSld>
   <p:clrMapOvr>
@@ -6684,16 +7343,72 @@
           </a:p>
         </p:txBody>
       </p:sp>
+      <p:sp>
+        <p:nvSpPr>
+          <p:cNvPr id="5" name="Dodecagon 4"/>
+          <p:cNvSpPr/>
+          <p:nvPr/>
+        </p:nvSpPr>
+        <p:spPr>
+          <a:xfrm>
+            <a:off x="8028384" y="5805264"/>
+            <a:ext cx="864096" cy="864096"/>
+          </a:xfrm>
+          <a:prstGeom prst="dodecagon">
+            <a:avLst/>
+          </a:prstGeom>
+          <a:solidFill>
+            <a:schemeClr val="accent3">
+              <a:lumMod val="50000"/>
+            </a:schemeClr>
+          </a:solidFill>
+        </p:spPr>
+        <p:style>
+          <a:lnRef idx="2">
+            <a:schemeClr val="accent1">
+              <a:shade val="50000"/>
+            </a:schemeClr>
+          </a:lnRef>
+          <a:fillRef idx="1">
+            <a:schemeClr val="accent1"/>
+          </a:fillRef>
+          <a:effectRef idx="0">
+            <a:schemeClr val="accent1"/>
+          </a:effectRef>
+          <a:fontRef idx="minor">
+            <a:schemeClr val="lt1"/>
+          </a:fontRef>
+        </p:style>
+        <p:txBody>
+          <a:bodyPr rtlCol="0" anchor="ctr"/>
+          <a:lstStyle/>
+          <a:p>
+            <a:pPr algn="ctr"/>
+            <a:r>
+              <a:rPr lang="en-GB" dirty="0" smtClean="0"/>
+              <a:t>Low</a:t>
+            </a:r>
+            <a:endParaRPr lang="en-GB" dirty="0"/>
+          </a:p>
+        </p:txBody>
+      </p:sp>
     </p:spTree>
     <p:extLst>
       <p:ext uri="{BB962C8B-B14F-4D97-AF65-F5344CB8AC3E}">
-        <p14:creationId xmlns:p14="http://schemas.microsoft.com/office/powerpoint/2010/main" val="372575986"/>
+        <p14:creationId xmlns:p14="http://schemas.microsoft.com/office/powerpoint/2010/main" xmlns="" val="372575986"/>
       </p:ext>
     </p:extLst>
   </p:cSld>
   <p:clrMapOvr>
     <a:masterClrMapping/>
   </p:clrMapOvr>
+  <p:timing>
+    <p:tnLst>
+      <p:par>
+        <p:cTn id="1" dur="indefinite" restart="never" nodeType="tmRoot"/>
+      </p:par>
+    </p:tnLst>
+  </p:timing>
 </p:sld>
 </file>
 
@@ -6749,7 +7464,7 @@
         <p:spPr/>
         <p:txBody>
           <a:bodyPr>
-            <a:normAutofit fontScale="85000" lnSpcReduction="10000"/>
+            <a:normAutofit fontScale="85000" lnSpcReduction="20000"/>
           </a:bodyPr>
           <a:lstStyle/>
           <a:p>
@@ -6767,30 +7482,141 @@
           <a:p>
             <a:r>
               <a:rPr lang="en-GB" dirty="0"/>
-              <a:t>Wine is a compatibility layer for running Windows applications on non-Windows </a:t>
-            </a:r>
-            <a:r>
-              <a:rPr lang="en-GB" dirty="0" err="1"/>
-              <a:t>OSes</a:t>
+              <a:t>Wine is a </a:t>
+            </a:r>
+            <a:r>
+              <a:rPr lang="en-GB" dirty="0" smtClean="0"/>
+              <a:t>reimplementation of the </a:t>
+            </a:r>
+            <a:r>
+              <a:rPr lang="en-GB" dirty="0" smtClean="0"/>
+              <a:t>Windows architecture </a:t>
+            </a:r>
+            <a:r>
+              <a:rPr lang="en-GB" dirty="0" smtClean="0"/>
+              <a:t>for </a:t>
             </a:r>
             <a:r>
               <a:rPr lang="en-GB" dirty="0"/>
+              <a:t>running Windows applications on </a:t>
+            </a:r>
+            <a:r>
+              <a:rPr lang="en-GB" dirty="0" smtClean="0"/>
+              <a:t>other OSs</a:t>
+            </a:r>
+            <a:r>
+              <a:rPr lang="en-GB" dirty="0" smtClean="0"/>
               <a:t>.</a:t>
             </a:r>
+            <a:endParaRPr lang="en-GB" dirty="0"/>
           </a:p>
           <a:p>
             <a:r>
               <a:rPr lang="en-GB" dirty="0"/>
-              <a:t>For each suspicious URL we create an isolated temp Wine environment then execute with the IE instance in it. </a:t>
-            </a:r>
-          </a:p>
-          <a:p>
+              <a:t>For each suspicious URL we create an isolated </a:t>
+            </a:r>
+            <a:r>
+              <a:rPr lang="en-GB" dirty="0" smtClean="0"/>
+              <a:t>temporary Wine </a:t>
+            </a:r>
             <a:r>
               <a:rPr lang="en-GB" dirty="0"/>
-              <a:t>With each environment an original copy of Wine-prefix is downloaded and unpacked(or checked via hash if local copy exists) to ensure consistency of results. </a:t>
-            </a:r>
-          </a:p>
-          <a:p>
+              <a:t>environment then </a:t>
+            </a:r>
+            <a:r>
+              <a:rPr lang="en-GB" dirty="0" smtClean="0"/>
+              <a:t>execute an </a:t>
+            </a:r>
+            <a:r>
+              <a:rPr lang="en-GB" dirty="0"/>
+              <a:t>IE instance </a:t>
+            </a:r>
+            <a:r>
+              <a:rPr lang="en-GB" dirty="0" smtClean="0"/>
+              <a:t>within it</a:t>
+            </a:r>
+            <a:r>
+              <a:rPr lang="en-GB" dirty="0" smtClean="0"/>
+              <a:t>. </a:t>
+            </a:r>
+            <a:endParaRPr lang="en-GB" dirty="0"/>
+          </a:p>
+          <a:p>
+            <a:r>
+              <a:rPr lang="en-GB" dirty="0" smtClean="0"/>
+              <a:t>An original </a:t>
+            </a:r>
+            <a:r>
+              <a:rPr lang="en-GB" dirty="0"/>
+              <a:t>copy of Wine-prefix is </a:t>
+            </a:r>
+            <a:r>
+              <a:rPr lang="en-GB" dirty="0" smtClean="0"/>
+              <a:t>downloaded </a:t>
+            </a:r>
+            <a:r>
+              <a:rPr lang="en-GB" dirty="0"/>
+              <a:t>and unpacked(or checked via hash if local copy exists</a:t>
+            </a:r>
+            <a:r>
+              <a:rPr lang="en-GB" dirty="0" smtClean="0"/>
+              <a:t>) for each URL, </a:t>
+            </a:r>
+            <a:r>
+              <a:rPr lang="en-GB" dirty="0"/>
+              <a:t>to ensure consistency of results. </a:t>
+            </a:r>
+          </a:p>
+          <a:p>
+            <a:endParaRPr lang="en-GB" dirty="0"/>
+          </a:p>
+        </p:txBody>
+      </p:sp>
+      <p:sp>
+        <p:nvSpPr>
+          <p:cNvPr id="4" name="Dodecagon 3"/>
+          <p:cNvSpPr/>
+          <p:nvPr/>
+        </p:nvSpPr>
+        <p:spPr>
+          <a:xfrm>
+            <a:off x="8028384" y="5805264"/>
+            <a:ext cx="864096" cy="864096"/>
+          </a:xfrm>
+          <a:prstGeom prst="dodecagon">
+            <a:avLst/>
+          </a:prstGeom>
+          <a:solidFill>
+            <a:schemeClr val="accent2">
+              <a:lumMod val="50000"/>
+            </a:schemeClr>
+          </a:solidFill>
+        </p:spPr>
+        <p:style>
+          <a:lnRef idx="2">
+            <a:schemeClr val="accent1">
+              <a:shade val="50000"/>
+            </a:schemeClr>
+          </a:lnRef>
+          <a:fillRef idx="1">
+            <a:schemeClr val="accent1"/>
+          </a:fillRef>
+          <a:effectRef idx="0">
+            <a:schemeClr val="accent1"/>
+          </a:effectRef>
+          <a:fontRef idx="minor">
+            <a:schemeClr val="lt1"/>
+          </a:fontRef>
+        </p:style>
+        <p:txBody>
+          <a:bodyPr rtlCol="0" anchor="ctr"/>
+          <a:lstStyle/>
+          <a:p>
+            <a:pPr algn="ctr"/>
+            <a:r>
+              <a:rPr lang="en-GB" dirty="0" smtClean="0"/>
+              <a:t>High</a:t>
+            </a:r>
             <a:endParaRPr lang="en-GB" dirty="0"/>
           </a:p>
         </p:txBody>
@@ -6798,7 +7624,7 @@
     </p:spTree>
     <p:extLst>
       <p:ext uri="{BB962C8B-B14F-4D97-AF65-F5344CB8AC3E}">
-        <p14:creationId xmlns:p14="http://schemas.microsoft.com/office/powerpoint/2010/main" val="352985116"/>
+        <p14:creationId xmlns:p14="http://schemas.microsoft.com/office/powerpoint/2010/main" xmlns="" val="352985116"/>
       </p:ext>
     </p:extLst>
   </p:cSld>

</xml_diff>

<commit_message>
Updated slides for final version
Slight Modifications
</commit_message>
<xml_diff>
--- a/doc/pres2/wk8-progress.pptx
+++ b/doc/pres2/wk8-progress.pptx
@@ -5,10 +5,10 @@
     <p:sldMasterId id="2147483648" r:id="rId1"/>
   </p:sldMasterIdLst>
   <p:notesMasterIdLst>
-    <p:notesMasterId r:id="rId21"/>
+    <p:notesMasterId r:id="rId20"/>
   </p:notesMasterIdLst>
   <p:handoutMasterIdLst>
-    <p:handoutMasterId r:id="rId22"/>
+    <p:handoutMasterId r:id="rId21"/>
   </p:handoutMasterIdLst>
   <p:sldIdLst>
     <p:sldId id="256" r:id="rId2"/>
@@ -16,20 +16,19 @@
     <p:sldId id="257" r:id="rId4"/>
     <p:sldId id="264" r:id="rId5"/>
     <p:sldId id="289" r:id="rId6"/>
-    <p:sldId id="279" r:id="rId7"/>
-    <p:sldId id="290" r:id="rId8"/>
-    <p:sldId id="287" r:id="rId9"/>
+    <p:sldId id="290" r:id="rId7"/>
+    <p:sldId id="287" r:id="rId8"/>
+    <p:sldId id="279" r:id="rId9"/>
     <p:sldId id="292" r:id="rId10"/>
     <p:sldId id="280" r:id="rId11"/>
     <p:sldId id="281" r:id="rId12"/>
     <p:sldId id="285" r:id="rId13"/>
-    <p:sldId id="293" r:id="rId14"/>
-    <p:sldId id="282" r:id="rId15"/>
-    <p:sldId id="291" r:id="rId16"/>
-    <p:sldId id="283" r:id="rId17"/>
-    <p:sldId id="284" r:id="rId18"/>
-    <p:sldId id="270" r:id="rId19"/>
-    <p:sldId id="272" r:id="rId20"/>
+    <p:sldId id="282" r:id="rId14"/>
+    <p:sldId id="291" r:id="rId15"/>
+    <p:sldId id="283" r:id="rId16"/>
+    <p:sldId id="284" r:id="rId17"/>
+    <p:sldId id="270" r:id="rId18"/>
+    <p:sldId id="272" r:id="rId19"/>
   </p:sldIdLst>
   <p:sldSz cx="9144000" cy="6858000" type="screen4x3"/>
   <p:notesSz cx="6858000" cy="9144000"/>
@@ -305,7 +304,7 @@
     </p:spTree>
     <p:extLst>
       <p:ext uri="{BB962C8B-B14F-4D97-AF65-F5344CB8AC3E}">
-        <p14:creationId xmlns:p14="http://schemas.microsoft.com/office/powerpoint/2010/main" xmlns="" val="1901348598"/>
+        <p14:creationId xmlns="" xmlns:p14="http://schemas.microsoft.com/office/powerpoint/2010/main" val="1901348598"/>
       </p:ext>
     </p:extLst>
   </p:cSld>
@@ -567,7 +566,7 @@
     </p:spTree>
     <p:extLst>
       <p:ext uri="{BB962C8B-B14F-4D97-AF65-F5344CB8AC3E}">
-        <p14:creationId xmlns:p14="http://schemas.microsoft.com/office/powerpoint/2010/main" xmlns="" val="1219798393"/>
+        <p14:creationId xmlns="" xmlns:p14="http://schemas.microsoft.com/office/powerpoint/2010/main" val="1219798393"/>
       </p:ext>
     </p:extLst>
   </p:cSld>
@@ -3777,7 +3776,19 @@
           <a:p>
             <a:r>
               <a:rPr lang="en-GB" dirty="0"/>
-              <a:t>Wait for some time after opening URL then check for file system activities. </a:t>
+              <a:t>Wait for some time after opening URL then check for file system </a:t>
+            </a:r>
+            <a:r>
+              <a:rPr lang="en-GB" dirty="0" smtClean="0"/>
+              <a:t>change</a:t>
+            </a:r>
+            <a:r>
+              <a:rPr lang="en-GB" dirty="0" smtClean="0"/>
+              <a:t>s</a:t>
+            </a:r>
+            <a:r>
+              <a:rPr lang="en-GB" dirty="0"/>
+              <a:t>. </a:t>
             </a:r>
           </a:p>
           <a:p>
@@ -3954,7 +3965,15 @@
           <a:p>
             <a:r>
               <a:rPr lang="en-GB" dirty="0"/>
-              <a:t>Then the webpage is crawled and all links in it are scanned.  </a:t>
+              <a:t>Then the webpage is crawled and all links in it are </a:t>
+            </a:r>
+            <a:r>
+              <a:rPr lang="en-GB" dirty="0" smtClean="0"/>
+              <a:t>also scanned</a:t>
+            </a:r>
+            <a:r>
+              <a:rPr lang="en-GB" dirty="0"/>
+              <a:t>.  </a:t>
             </a:r>
           </a:p>
           <a:p>
@@ -4101,18 +4120,17 @@
           <a:p>
             <a:r>
               <a:rPr lang="en-GB" dirty="0" smtClean="0"/>
-              <a:t>Slow, but provides high quality emulation of a vulnerable </a:t>
-            </a:r>
-            <a:r>
-              <a:rPr lang="en-GB" dirty="0" smtClean="0"/>
-              <a:t>environment</a:t>
-            </a:r>
-            <a:endParaRPr lang="en-GB" dirty="0" smtClean="0"/>
-          </a:p>
-          <a:p>
-            <a:r>
-              <a:rPr lang="en-GB" dirty="0" smtClean="0"/>
-              <a:t>Required customisation for ECS infrastructure.</a:t>
+              <a:t>Slow, but provides high quality emulation of a vulnerable environment</a:t>
+            </a:r>
+          </a:p>
+          <a:p>
+            <a:r>
+              <a:rPr lang="en-GB" dirty="0" smtClean="0"/>
+              <a:t>Required </a:t>
+            </a:r>
+            <a:r>
+              <a:rPr lang="en-GB" dirty="0" smtClean="0"/>
+              <a:t>customisation for ECS infrastructure.</a:t>
             </a:r>
             <a:endParaRPr lang="en-GB" dirty="0"/>
           </a:p>
@@ -4172,126 +4190,17 @@
   <p:clrMapOvr>
     <a:masterClrMapping/>
   </p:clrMapOvr>
+  <p:timing>
+    <p:tnLst>
+      <p:par>
+        <p:cTn id="1" dur="indefinite" restart="never" nodeType="tmRoot"/>
+      </p:par>
+    </p:tnLst>
+  </p:timing>
 </p:sld>
 </file>
 
 <file path=ppt/slides/slide13.xml><?xml version="1.0" encoding="utf-8"?>
-<p:sld xmlns:a="http://schemas.openxmlformats.org/drawingml/2006/main" xmlns:r="http://schemas.openxmlformats.org/officeDocument/2006/relationships" xmlns:p="http://schemas.openxmlformats.org/presentationml/2006/main">
-  <p:cSld>
-    <p:spTree>
-      <p:nvGrpSpPr>
-        <p:cNvPr id="1" name=""/>
-        <p:cNvGrpSpPr/>
-        <p:nvPr/>
-      </p:nvGrpSpPr>
-      <p:grpSpPr>
-        <a:xfrm>
-          <a:off x="0" y="0"/>
-          <a:ext cx="0" cy="0"/>
-          <a:chOff x="0" y="0"/>
-          <a:chExt cx="0" cy="0"/>
-        </a:xfrm>
-      </p:grpSpPr>
-      <p:sp>
-        <p:nvSpPr>
-          <p:cNvPr id="2" name="Title 1"/>
-          <p:cNvSpPr>
-            <a:spLocks noGrp="1"/>
-          </p:cNvSpPr>
-          <p:nvPr>
-            <p:ph type="title"/>
-          </p:nvPr>
-        </p:nvSpPr>
-        <p:spPr/>
-        <p:txBody>
-          <a:bodyPr/>
-          <a:lstStyle/>
-          <a:p>
-            <a:r>
-              <a:rPr lang="en-GB" dirty="0" smtClean="0"/>
-              <a:t>Capture-HPC</a:t>
-            </a:r>
-            <a:endParaRPr lang="en-GB" dirty="0"/>
-          </a:p>
-        </p:txBody>
-      </p:sp>
-      <p:sp>
-        <p:nvSpPr>
-          <p:cNvPr id="3" name="Content Placeholder 2"/>
-          <p:cNvSpPr>
-            <a:spLocks noGrp="1"/>
-          </p:cNvSpPr>
-          <p:nvPr>
-            <p:ph idx="1"/>
-          </p:nvPr>
-        </p:nvSpPr>
-        <p:spPr/>
-        <p:txBody>
-          <a:bodyPr/>
-          <a:lstStyle/>
-          <a:p>
-            <a:endParaRPr lang="en-GB" dirty="0"/>
-          </a:p>
-        </p:txBody>
-      </p:sp>
-      <p:sp>
-        <p:nvSpPr>
-          <p:cNvPr id="4" name="Dodecagon 3"/>
-          <p:cNvSpPr/>
-          <p:nvPr/>
-        </p:nvSpPr>
-        <p:spPr>
-          <a:xfrm>
-            <a:off x="8028384" y="5805264"/>
-            <a:ext cx="864096" cy="864096"/>
-          </a:xfrm>
-          <a:prstGeom prst="dodecagon">
-            <a:avLst/>
-          </a:prstGeom>
-          <a:solidFill>
-            <a:schemeClr val="accent2">
-              <a:lumMod val="50000"/>
-            </a:schemeClr>
-          </a:solidFill>
-        </p:spPr>
-        <p:style>
-          <a:lnRef idx="2">
-            <a:schemeClr val="accent1">
-              <a:shade val="50000"/>
-            </a:schemeClr>
-          </a:lnRef>
-          <a:fillRef idx="1">
-            <a:schemeClr val="accent1"/>
-          </a:fillRef>
-          <a:effectRef idx="0">
-            <a:schemeClr val="accent1"/>
-          </a:effectRef>
-          <a:fontRef idx="minor">
-            <a:schemeClr val="lt1"/>
-          </a:fontRef>
-        </p:style>
-        <p:txBody>
-          <a:bodyPr rtlCol="0" anchor="ctr"/>
-          <a:lstStyle/>
-          <a:p>
-            <a:pPr algn="ctr"/>
-            <a:r>
-              <a:rPr lang="en-GB" dirty="0" smtClean="0"/>
-              <a:t>High</a:t>
-            </a:r>
-            <a:endParaRPr lang="en-GB" dirty="0"/>
-          </a:p>
-        </p:txBody>
-      </p:sp>
-    </p:spTree>
-  </p:cSld>
-  <p:clrMapOvr>
-    <a:masterClrMapping/>
-  </p:clrMapOvr>
-</p:sld>
-</file>
-
-<file path=ppt/slides/slide14.xml><?xml version="1.0" encoding="utf-8"?>
 <p:sld xmlns:a="http://schemas.openxmlformats.org/drawingml/2006/main" xmlns:r="http://schemas.openxmlformats.org/officeDocument/2006/relationships" xmlns:p="http://schemas.openxmlformats.org/presentationml/2006/main">
   <p:cSld>
     <p:spTree>
@@ -4429,10 +4338,17 @@
   <p:clrMapOvr>
     <a:masterClrMapping/>
   </p:clrMapOvr>
+  <p:timing>
+    <p:tnLst>
+      <p:par>
+        <p:cTn id="1" dur="indefinite" restart="never" nodeType="tmRoot"/>
+      </p:par>
+    </p:tnLst>
+  </p:timing>
 </p:sld>
 </file>
 
-<file path=ppt/slides/slide15.xml><?xml version="1.0" encoding="utf-8"?>
+<file path=ppt/slides/slide14.xml><?xml version="1.0" encoding="utf-8"?>
 <p:sld xmlns:a="http://schemas.openxmlformats.org/drawingml/2006/main" xmlns:r="http://schemas.openxmlformats.org/officeDocument/2006/relationships" xmlns:p="http://schemas.openxmlformats.org/presentationml/2006/main">
   <p:cSld>
     <p:spTree>
@@ -4606,6 +4522,117 @@
   <p:clrMapOvr>
     <a:masterClrMapping/>
   </p:clrMapOvr>
+  <p:timing>
+    <p:tnLst>
+      <p:par>
+        <p:cTn id="1" dur="indefinite" restart="never" nodeType="tmRoot"/>
+      </p:par>
+    </p:tnLst>
+  </p:timing>
+</p:sld>
+</file>
+
+<file path=ppt/slides/slide15.xml><?xml version="1.0" encoding="utf-8"?>
+<p:sld xmlns:a="http://schemas.openxmlformats.org/drawingml/2006/main" xmlns:r="http://schemas.openxmlformats.org/officeDocument/2006/relationships" xmlns:p="http://schemas.openxmlformats.org/presentationml/2006/main">
+  <p:cSld>
+    <p:spTree>
+      <p:nvGrpSpPr>
+        <p:cNvPr id="1" name=""/>
+        <p:cNvGrpSpPr/>
+        <p:nvPr/>
+      </p:nvGrpSpPr>
+      <p:grpSpPr>
+        <a:xfrm>
+          <a:off x="0" y="0"/>
+          <a:ext cx="0" cy="0"/>
+          <a:chOff x="0" y="0"/>
+          <a:chExt cx="0" cy="0"/>
+        </a:xfrm>
+      </p:grpSpPr>
+      <p:sp>
+        <p:nvSpPr>
+          <p:cNvPr id="2" name="Title 1"/>
+          <p:cNvSpPr>
+            <a:spLocks noGrp="1"/>
+          </p:cNvSpPr>
+          <p:nvPr>
+            <p:ph type="title"/>
+          </p:nvPr>
+        </p:nvSpPr>
+        <p:spPr/>
+        <p:txBody>
+          <a:bodyPr/>
+          <a:lstStyle/>
+          <a:p>
+            <a:r>
+              <a:rPr lang="en-GB" dirty="0" smtClean="0"/>
+              <a:t>Framework Integration</a:t>
+            </a:r>
+            <a:endParaRPr lang="en-GB" dirty="0"/>
+          </a:p>
+        </p:txBody>
+      </p:sp>
+      <p:sp>
+        <p:nvSpPr>
+          <p:cNvPr id="3" name="Content Placeholder 2"/>
+          <p:cNvSpPr>
+            <a:spLocks noGrp="1"/>
+          </p:cNvSpPr>
+          <p:nvPr>
+            <p:ph idx="1"/>
+          </p:nvPr>
+        </p:nvSpPr>
+        <p:spPr/>
+        <p:txBody>
+          <a:bodyPr/>
+          <a:lstStyle/>
+          <a:p>
+            <a:r>
+              <a:rPr lang="en-GB" dirty="0" smtClean="0"/>
+              <a:t>Celery on top of </a:t>
+            </a:r>
+            <a:r>
+              <a:rPr lang="en-GB" dirty="0" err="1" smtClean="0"/>
+              <a:t>RabbitMQ</a:t>
+            </a:r>
+            <a:endParaRPr lang="en-GB" dirty="0" smtClean="0"/>
+          </a:p>
+          <a:p>
+            <a:r>
+              <a:rPr lang="en-GB" dirty="0" err="1" smtClean="0"/>
+              <a:t>Celerybeat</a:t>
+            </a:r>
+            <a:r>
+              <a:rPr lang="en-GB" dirty="0" smtClean="0"/>
+              <a:t> for daily trend scan/URL list updates</a:t>
+            </a:r>
+          </a:p>
+          <a:p>
+            <a:r>
+              <a:rPr lang="en-GB" dirty="0" smtClean="0"/>
+              <a:t>Calls each task with the result of the previous</a:t>
+            </a:r>
+          </a:p>
+          <a:p>
+            <a:endParaRPr lang="en-GB" dirty="0" smtClean="0"/>
+          </a:p>
+          <a:p>
+            <a:endParaRPr lang="en-GB" dirty="0"/>
+          </a:p>
+        </p:txBody>
+      </p:sp>
+    </p:spTree>
+  </p:cSld>
+  <p:clrMapOvr>
+    <a:masterClrMapping/>
+  </p:clrMapOvr>
+  <p:timing>
+    <p:tnLst>
+      <p:par>
+        <p:cTn id="1" dur="indefinite" restart="never" nodeType="tmRoot"/>
+      </p:par>
+    </p:tnLst>
+  </p:timing>
 </p:sld>
 </file>
 
@@ -4643,7 +4670,7 @@
           <a:p>
             <a:r>
               <a:rPr lang="en-GB" dirty="0" smtClean="0"/>
-              <a:t>Framework Integration</a:t>
+              <a:t>Storage of Analysis Results</a:t>
             </a:r>
             <a:endParaRPr lang="en-GB" dirty="0"/>
           </a:p>
@@ -4666,35 +4693,35 @@
           <a:p>
             <a:r>
               <a:rPr lang="en-GB" dirty="0" smtClean="0"/>
-              <a:t>Celery on top of </a:t>
+              <a:t>Want to use </a:t>
             </a:r>
             <a:r>
               <a:rPr lang="en-GB" dirty="0" err="1" smtClean="0"/>
-              <a:t>RabbitMQ</a:t>
-            </a:r>
-            <a:endParaRPr lang="en-GB" dirty="0" smtClean="0"/>
-          </a:p>
-          <a:p>
-            <a:r>
-              <a:rPr lang="en-GB" dirty="0" err="1" smtClean="0"/>
-              <a:t>Celerybeat</a:t>
-            </a:r>
-            <a:r>
-              <a:rPr lang="en-GB" dirty="0" smtClean="0"/>
-              <a:t> for daily trend scan/URL list updates</a:t>
-            </a:r>
-          </a:p>
-          <a:p>
-            <a:r>
-              <a:rPr lang="en-GB" dirty="0" smtClean="0"/>
-              <a:t>Calls each task with the result of the previous</a:t>
-            </a:r>
-          </a:p>
-          <a:p>
-            <a:endParaRPr lang="en-GB" dirty="0" smtClean="0"/>
-          </a:p>
-          <a:p>
-            <a:endParaRPr lang="en-GB" dirty="0"/>
+              <a:t>Django</a:t>
+            </a:r>
+            <a:r>
+              <a:rPr lang="en-GB" dirty="0" smtClean="0"/>
+              <a:t> ORM for easy Analysis of Results</a:t>
+            </a:r>
+          </a:p>
+          <a:p>
+            <a:r>
+              <a:rPr lang="en-GB" dirty="0" smtClean="0"/>
+              <a:t>Bulk Insert, and strict database schema</a:t>
+            </a:r>
+          </a:p>
+          <a:p>
+            <a:pPr lvl="1"/>
+            <a:r>
+              <a:rPr lang="en-GB" dirty="0" smtClean="0"/>
+              <a:t>Any error will result in the entire transaction being thrown out </a:t>
+            </a:r>
+          </a:p>
+          <a:p>
+            <a:r>
+              <a:rPr lang="en-GB" dirty="0" smtClean="0"/>
+              <a:t>Use JSON schema to validate data to be stored </a:t>
+            </a:r>
           </a:p>
         </p:txBody>
       </p:sp>
@@ -4747,7 +4774,7 @@
           <a:p>
             <a:r>
               <a:rPr lang="en-GB" dirty="0" smtClean="0"/>
-              <a:t>Storage of Analysis Results</a:t>
+              <a:t>Remaining Work</a:t>
             </a:r>
             <a:endParaRPr lang="en-GB" dirty="0"/>
           </a:p>
@@ -4770,34 +4797,45 @@
           <a:p>
             <a:r>
               <a:rPr lang="en-GB" dirty="0" smtClean="0"/>
-              <a:t>Want to use </a:t>
-            </a:r>
-            <a:r>
-              <a:rPr lang="en-GB" dirty="0" err="1" smtClean="0"/>
-              <a:t>Django</a:t>
-            </a:r>
-            <a:r>
-              <a:rPr lang="en-GB" dirty="0" smtClean="0"/>
-              <a:t> ORM for easy Analysis of Results</a:t>
-            </a:r>
-          </a:p>
-          <a:p>
-            <a:r>
-              <a:rPr lang="en-GB" dirty="0" smtClean="0"/>
-              <a:t>Bulk Insert, and strict database schema</a:t>
+              <a:t>Web Reporting interface</a:t>
             </a:r>
           </a:p>
           <a:p>
             <a:pPr lvl="1"/>
             <a:r>
               <a:rPr lang="en-GB" dirty="0" smtClean="0"/>
-              <a:t>Any error will result in the entire transaction being thrown out </a:t>
-            </a:r>
-          </a:p>
-          <a:p>
-            <a:r>
-              <a:rPr lang="en-GB" dirty="0" smtClean="0"/>
-              <a:t>Use JSON schema to validate data to be stored </a:t>
+              <a:t>Graphing</a:t>
+            </a:r>
+          </a:p>
+          <a:p>
+            <a:r>
+              <a:rPr lang="en-GB" dirty="0" smtClean="0"/>
+              <a:t>Compile sample data for report</a:t>
+            </a:r>
+          </a:p>
+          <a:p>
+            <a:r>
+              <a:rPr lang="en-GB" dirty="0" smtClean="0"/>
+              <a:t>Produce Report</a:t>
+            </a:r>
+          </a:p>
+          <a:p>
+            <a:pPr lvl="1"/>
+            <a:r>
+              <a:rPr lang="en-GB" dirty="0" smtClean="0"/>
+              <a:t>Latex template already </a:t>
+            </a:r>
+            <a:r>
+              <a:rPr lang="en-GB" dirty="0" smtClean="0"/>
+              <a:t>produced</a:t>
+            </a:r>
+            <a:endParaRPr lang="en-GB" dirty="0" smtClean="0"/>
+          </a:p>
+          <a:p>
+            <a:pPr lvl="1"/>
+            <a:r>
+              <a:rPr lang="en-GB" dirty="0" smtClean="0"/>
+              <a:t>Use productivity tools to aid production.</a:t>
             </a:r>
           </a:p>
         </p:txBody>
@@ -4841,129 +4879,6 @@
             <a:spLocks noGrp="1"/>
           </p:cNvSpPr>
           <p:nvPr>
-            <p:ph type="title"/>
-          </p:nvPr>
-        </p:nvSpPr>
-        <p:spPr/>
-        <p:txBody>
-          <a:bodyPr/>
-          <a:lstStyle/>
-          <a:p>
-            <a:r>
-              <a:rPr lang="en-GB" dirty="0" smtClean="0"/>
-              <a:t>Remaining Work</a:t>
-            </a:r>
-            <a:endParaRPr lang="en-GB" dirty="0"/>
-          </a:p>
-        </p:txBody>
-      </p:sp>
-      <p:sp>
-        <p:nvSpPr>
-          <p:cNvPr id="3" name="Content Placeholder 2"/>
-          <p:cNvSpPr>
-            <a:spLocks noGrp="1"/>
-          </p:cNvSpPr>
-          <p:nvPr>
-            <p:ph idx="1"/>
-          </p:nvPr>
-        </p:nvSpPr>
-        <p:spPr/>
-        <p:txBody>
-          <a:bodyPr/>
-          <a:lstStyle/>
-          <a:p>
-            <a:r>
-              <a:rPr lang="en-GB" dirty="0" smtClean="0"/>
-              <a:t>Web Reporting interface</a:t>
-            </a:r>
-          </a:p>
-          <a:p>
-            <a:pPr lvl="1"/>
-            <a:r>
-              <a:rPr lang="en-GB" dirty="0" smtClean="0"/>
-              <a:t>Graphing</a:t>
-            </a:r>
-          </a:p>
-          <a:p>
-            <a:r>
-              <a:rPr lang="en-GB" dirty="0" smtClean="0"/>
-              <a:t>Compile sample data for report</a:t>
-            </a:r>
-          </a:p>
-          <a:p>
-            <a:r>
-              <a:rPr lang="en-GB" dirty="0" smtClean="0"/>
-              <a:t>Produce Report</a:t>
-            </a:r>
-          </a:p>
-          <a:p>
-            <a:pPr lvl="1"/>
-            <a:r>
-              <a:rPr lang="en-GB" dirty="0" smtClean="0"/>
-              <a:t>Latex template already produce</a:t>
-            </a:r>
-          </a:p>
-          <a:p>
-            <a:pPr lvl="1"/>
-            <a:r>
-              <a:rPr lang="en-GB" dirty="0" smtClean="0"/>
-              <a:t>Use</a:t>
-            </a:r>
-            <a:r>
-              <a:rPr lang="en-GB" dirty="0" smtClean="0"/>
-              <a:t> </a:t>
-            </a:r>
-            <a:r>
-              <a:rPr lang="en-GB" dirty="0" smtClean="0"/>
-              <a:t>productivity </a:t>
-            </a:r>
-            <a:r>
-              <a:rPr lang="en-GB" dirty="0" smtClean="0"/>
-              <a:t>tools to aid production.</a:t>
-            </a:r>
-            <a:endParaRPr lang="en-GB" dirty="0" smtClean="0"/>
-          </a:p>
-        </p:txBody>
-      </p:sp>
-    </p:spTree>
-  </p:cSld>
-  <p:clrMapOvr>
-    <a:masterClrMapping/>
-  </p:clrMapOvr>
-  <p:timing>
-    <p:tnLst>
-      <p:par>
-        <p:cTn id="1" dur="indefinite" restart="never" nodeType="tmRoot"/>
-      </p:par>
-    </p:tnLst>
-  </p:timing>
-</p:sld>
-</file>
-
-<file path=ppt/slides/slide19.xml><?xml version="1.0" encoding="utf-8"?>
-<p:sld xmlns:a="http://schemas.openxmlformats.org/drawingml/2006/main" xmlns:r="http://schemas.openxmlformats.org/officeDocument/2006/relationships" xmlns:p="http://schemas.openxmlformats.org/presentationml/2006/main">
-  <p:cSld>
-    <p:spTree>
-      <p:nvGrpSpPr>
-        <p:cNvPr id="1" name=""/>
-        <p:cNvGrpSpPr/>
-        <p:nvPr/>
-      </p:nvGrpSpPr>
-      <p:grpSpPr>
-        <a:xfrm>
-          <a:off x="0" y="0"/>
-          <a:ext cx="0" cy="0"/>
-          <a:chOff x="0" y="0"/>
-          <a:chExt cx="0" cy="0"/>
-        </a:xfrm>
-      </p:grpSpPr>
-      <p:sp>
-        <p:nvSpPr>
-          <p:cNvPr id="2" name="Title 1"/>
-          <p:cNvSpPr>
-            <a:spLocks noGrp="1"/>
-          </p:cNvSpPr>
-          <p:nvPr>
             <p:ph type="ctrTitle"/>
           </p:nvPr>
         </p:nvSpPr>
@@ -5067,39 +4982,66 @@
         <p:spPr/>
         <p:txBody>
           <a:bodyPr>
-            <a:normAutofit fontScale="77500" lnSpcReduction="20000"/>
+            <a:normAutofit fontScale="85000" lnSpcReduction="20000"/>
           </a:bodyPr>
           <a:lstStyle/>
           <a:p>
             <a:r>
               <a:rPr lang="en-GB" dirty="0" smtClean="0"/>
-              <a:t>Introduction / Recap</a:t>
-            </a:r>
-          </a:p>
-          <a:p>
+              <a:t>Introduction </a:t>
+            </a:r>
+            <a:r>
+              <a:rPr lang="en-GB" dirty="0" smtClean="0"/>
+              <a:t> </a:t>
+            </a:r>
+            <a:r>
+              <a:rPr lang="en-GB" dirty="0" smtClean="0"/>
+              <a:t>&amp; </a:t>
+            </a:r>
             <a:r>
               <a:rPr lang="en-GB" dirty="0" smtClean="0"/>
               <a:t>Architecture Recap</a:t>
             </a:r>
-          </a:p>
-          <a:p>
-            <a:r>
-              <a:rPr lang="en-GB" dirty="0" smtClean="0"/>
-              <a:t>Implementation of Malware Analysis</a:t>
+            <a:endParaRPr lang="en-GB" dirty="0" smtClean="0"/>
+          </a:p>
+          <a:p>
+            <a:r>
+              <a:rPr lang="en-GB" dirty="0" smtClean="0"/>
+              <a:t>Implementation </a:t>
+            </a:r>
+            <a:r>
+              <a:rPr lang="en-GB" dirty="0" smtClean="0"/>
+              <a:t>of Malware Analysis</a:t>
             </a:r>
           </a:p>
           <a:p>
             <a:pPr lvl="1"/>
             <a:r>
               <a:rPr lang="en-GB" dirty="0" smtClean="0"/>
-              <a:t>URL Classification</a:t>
+              <a:t>URL </a:t>
+            </a:r>
+            <a:r>
+              <a:rPr lang="en-GB" dirty="0" smtClean="0"/>
+              <a:t>Classification</a:t>
             </a:r>
           </a:p>
           <a:p>
             <a:pPr lvl="1"/>
             <a:r>
               <a:rPr lang="en-GB" dirty="0" smtClean="0"/>
-              <a:t>Internet Explorer under Wine</a:t>
+              <a:t>HTML Scanning</a:t>
+            </a:r>
+            <a:endParaRPr lang="en-GB" dirty="0" smtClean="0"/>
+          </a:p>
+          <a:p>
+            <a:pPr lvl="1"/>
+            <a:r>
+              <a:rPr lang="en-GB" dirty="0" smtClean="0"/>
+              <a:t>Internet </a:t>
+            </a:r>
+            <a:r>
+              <a:rPr lang="en-GB" dirty="0" smtClean="0"/>
+              <a:t>Explorer under Wine</a:t>
             </a:r>
           </a:p>
           <a:p>
@@ -5110,8 +5052,17 @@
             </a:r>
             <a:r>
               <a:rPr lang="en-GB" dirty="0" smtClean="0"/>
-              <a:t> HTML scan</a:t>
-            </a:r>
+              <a:t> HTML </a:t>
+            </a:r>
+            <a:r>
+              <a:rPr lang="en-GB" dirty="0" smtClean="0"/>
+              <a:t>S</a:t>
+            </a:r>
+            <a:r>
+              <a:rPr lang="en-GB" dirty="0" smtClean="0"/>
+              <a:t>canning</a:t>
+            </a:r>
+            <a:endParaRPr lang="en-GB" dirty="0" smtClean="0"/>
           </a:p>
           <a:p>
             <a:pPr lvl="1"/>
@@ -5136,14 +5087,9 @@
           <a:p>
             <a:r>
               <a:rPr lang="en-GB" dirty="0" smtClean="0"/>
-              <a:t>Web Interface</a:t>
-            </a:r>
-          </a:p>
-          <a:p>
-            <a:r>
-              <a:rPr lang="en-GB" dirty="0" smtClean="0"/>
-              <a:t>Plan</a:t>
-            </a:r>
+              <a:t>Remaining Work</a:t>
+            </a:r>
+            <a:endParaRPr lang="en-GB" dirty="0" smtClean="0"/>
           </a:p>
           <a:p>
             <a:r>
@@ -5202,7 +5148,11 @@
           <a:p>
             <a:r>
               <a:rPr lang="en-GB" dirty="0" smtClean="0"/>
-              <a:t>Introduction / Recap</a:t>
+              <a:t>Introduction </a:t>
+            </a:r>
+            <a:r>
+              <a:rPr lang="en-GB" dirty="0" smtClean="0"/>
+              <a:t>&amp; Recap</a:t>
             </a:r>
             <a:endParaRPr lang="en-GB" dirty="0"/>
           </a:p>
@@ -6002,13 +5952,8 @@
           <a:p>
             <a:r>
               <a:rPr lang="en-US" dirty="0" smtClean="0"/>
-              <a:t>No interaction malware </a:t>
-            </a:r>
-            <a:r>
-              <a:rPr lang="en-US" dirty="0" smtClean="0"/>
-              <a:t>detection</a:t>
-            </a:r>
-            <a:endParaRPr lang="en-US" dirty="0" smtClean="0"/>
+              <a:t>No interaction malware detection</a:t>
+            </a:r>
           </a:p>
           <a:p>
             <a:r>
@@ -6020,15 +5965,7 @@
             <a:pPr lvl="1"/>
             <a:r>
               <a:rPr lang="en-US" dirty="0" smtClean="0"/>
-              <a:t>U</a:t>
-            </a:r>
-            <a:r>
-              <a:rPr lang="en-US" dirty="0" smtClean="0"/>
-              <a:t>se lightweight </a:t>
-            </a:r>
-            <a:r>
-              <a:rPr lang="en-US" dirty="0" smtClean="0"/>
-              <a:t>or simulated clients to interact with the server.</a:t>
+              <a:t>Use lightweight or simulated clients to interact with the server.</a:t>
             </a:r>
           </a:p>
           <a:p>
@@ -6049,23 +5986,22 @@
             </a:r>
             <a:r>
               <a:rPr lang="en-US" dirty="0" smtClean="0"/>
-              <a:t> clients, very closely resembling a generic vulnerable system.</a:t>
-            </a:r>
-            <a:endParaRPr lang="en-US" dirty="0" smtClean="0"/>
+              <a:t> clients, very closely resembling a </a:t>
+            </a:r>
+            <a:r>
+              <a:rPr lang="en-US" dirty="0" smtClean="0"/>
+              <a:t>real vulnerable </a:t>
+            </a:r>
+            <a:r>
+              <a:rPr lang="en-US" dirty="0" smtClean="0"/>
+              <a:t>system.</a:t>
+            </a:r>
           </a:p>
           <a:p>
             <a:pPr lvl="1"/>
             <a:r>
               <a:rPr lang="en-US" dirty="0" smtClean="0"/>
-              <a:t>E</a:t>
-            </a:r>
-            <a:r>
-              <a:rPr lang="en-US" dirty="0" smtClean="0"/>
-              <a:t>ffective </a:t>
-            </a:r>
-            <a:r>
-              <a:rPr lang="en-US" dirty="0" smtClean="0"/>
-              <a:t>at detecting unknown attacks on clients</a:t>
+              <a:t>Effective at detecting unknown attacks on clients</a:t>
             </a:r>
             <a:endParaRPr lang="en-US" dirty="0"/>
           </a:p>
@@ -6235,210 +6171,6 @@
 </file>
 
 <file path=ppt/slides/slide6.xml><?xml version="1.0" encoding="utf-8"?>
-<p:sld xmlns:a="http://schemas.openxmlformats.org/drawingml/2006/main" xmlns:r="http://schemas.openxmlformats.org/officeDocument/2006/relationships" xmlns:p="http://schemas.openxmlformats.org/presentationml/2006/main">
-  <p:cSld>
-    <p:spTree>
-      <p:nvGrpSpPr>
-        <p:cNvPr id="1" name=""/>
-        <p:cNvGrpSpPr/>
-        <p:nvPr/>
-      </p:nvGrpSpPr>
-      <p:grpSpPr>
-        <a:xfrm>
-          <a:off x="0" y="0"/>
-          <a:ext cx="0" cy="0"/>
-          <a:chOff x="0" y="0"/>
-          <a:chExt cx="0" cy="0"/>
-        </a:xfrm>
-      </p:grpSpPr>
-      <p:sp>
-        <p:nvSpPr>
-          <p:cNvPr id="2" name="Title 1"/>
-          <p:cNvSpPr>
-            <a:spLocks noGrp="1"/>
-          </p:cNvSpPr>
-          <p:nvPr>
-            <p:ph type="title"/>
-          </p:nvPr>
-        </p:nvSpPr>
-        <p:spPr/>
-        <p:txBody>
-          <a:bodyPr/>
-          <a:lstStyle/>
-          <a:p>
-            <a:r>
-              <a:rPr lang="en-GB" dirty="0" smtClean="0"/>
-              <a:t>URL Classification</a:t>
-            </a:r>
-            <a:endParaRPr lang="en-GB" dirty="0"/>
-          </a:p>
-        </p:txBody>
-      </p:sp>
-      <p:sp>
-        <p:nvSpPr>
-          <p:cNvPr id="3" name="Content Placeholder 2"/>
-          <p:cNvSpPr>
-            <a:spLocks noGrp="1"/>
-          </p:cNvSpPr>
-          <p:nvPr>
-            <p:ph idx="1"/>
-          </p:nvPr>
-        </p:nvSpPr>
-        <p:spPr/>
-        <p:txBody>
-          <a:bodyPr>
-            <a:normAutofit/>
-          </a:bodyPr>
-          <a:lstStyle/>
-          <a:p>
-            <a:r>
-              <a:rPr lang="en-GB" dirty="0"/>
-              <a:t>Malware detection based on repetition of the </a:t>
-            </a:r>
-            <a:r>
-              <a:rPr lang="en-GB" dirty="0" smtClean="0"/>
-              <a:t>trending </a:t>
-            </a:r>
-            <a:r>
-              <a:rPr lang="en-GB" dirty="0"/>
-              <a:t>keyword</a:t>
-            </a:r>
-            <a:r>
-              <a:rPr lang="en-GB" dirty="0" smtClean="0"/>
-              <a:t>:</a:t>
-            </a:r>
-            <a:endParaRPr lang="en-GB" dirty="0"/>
-          </a:p>
-          <a:p>
-            <a:pPr lvl="1"/>
-            <a:r>
-              <a:rPr lang="en-GB" dirty="0" smtClean="0"/>
-              <a:t>Analyse </a:t>
-            </a:r>
-            <a:r>
-              <a:rPr lang="en-GB" dirty="0"/>
-              <a:t>the content of the given URL (Crawling</a:t>
-            </a:r>
-            <a:r>
-              <a:rPr lang="en-GB" dirty="0" smtClean="0"/>
-              <a:t>)</a:t>
-            </a:r>
-            <a:endParaRPr lang="en-GB" dirty="0"/>
-          </a:p>
-          <a:p>
-            <a:pPr lvl="1"/>
-            <a:r>
-              <a:rPr lang="en-GB" dirty="0" smtClean="0"/>
-              <a:t>Check </a:t>
-            </a:r>
-            <a:r>
-              <a:rPr lang="en-GB" dirty="0"/>
-              <a:t>content of each hyperlink on the </a:t>
-            </a:r>
-            <a:r>
-              <a:rPr lang="en-GB" dirty="0" smtClean="0"/>
-              <a:t>webpage</a:t>
-            </a:r>
-            <a:endParaRPr lang="en-GB" dirty="0"/>
-          </a:p>
-          <a:p>
-            <a:pPr lvl="1"/>
-            <a:r>
-              <a:rPr lang="en-GB" dirty="0" smtClean="0"/>
-              <a:t>Consider </a:t>
-            </a:r>
-            <a:r>
-              <a:rPr lang="en-GB" dirty="0"/>
-              <a:t>frequently of reappearances of </a:t>
-            </a:r>
-            <a:r>
-              <a:rPr lang="en-GB" dirty="0" smtClean="0"/>
-              <a:t>trending </a:t>
-            </a:r>
-            <a:r>
-              <a:rPr lang="en-GB" dirty="0" smtClean="0"/>
-              <a:t>keyword</a:t>
-            </a:r>
-            <a:endParaRPr lang="en-GB" dirty="0"/>
-          </a:p>
-          <a:p>
-            <a:pPr lvl="1"/>
-            <a:r>
-              <a:rPr lang="en-GB" dirty="0" smtClean="0"/>
-              <a:t>Used </a:t>
-            </a:r>
-            <a:r>
-              <a:rPr lang="en-GB" dirty="0"/>
-              <a:t>the result of this algorithm for URL classification</a:t>
-            </a:r>
-          </a:p>
-        </p:txBody>
-      </p:sp>
-      <p:sp>
-        <p:nvSpPr>
-          <p:cNvPr id="6" name="Dodecagon 5"/>
-          <p:cNvSpPr/>
-          <p:nvPr/>
-        </p:nvSpPr>
-        <p:spPr>
-          <a:xfrm>
-            <a:off x="8028384" y="5805264"/>
-            <a:ext cx="864096" cy="864096"/>
-          </a:xfrm>
-          <a:prstGeom prst="dodecagon">
-            <a:avLst/>
-          </a:prstGeom>
-          <a:solidFill>
-            <a:schemeClr val="accent3">
-              <a:lumMod val="50000"/>
-            </a:schemeClr>
-          </a:solidFill>
-        </p:spPr>
-        <p:style>
-          <a:lnRef idx="2">
-            <a:schemeClr val="accent1">
-              <a:shade val="50000"/>
-            </a:schemeClr>
-          </a:lnRef>
-          <a:fillRef idx="1">
-            <a:schemeClr val="accent1"/>
-          </a:fillRef>
-          <a:effectRef idx="0">
-            <a:schemeClr val="accent1"/>
-          </a:effectRef>
-          <a:fontRef idx="minor">
-            <a:schemeClr val="lt1"/>
-          </a:fontRef>
-        </p:style>
-        <p:txBody>
-          <a:bodyPr rtlCol="0" anchor="ctr"/>
-          <a:lstStyle/>
-          <a:p>
-            <a:pPr algn="ctr"/>
-            <a:r>
-              <a:rPr lang="en-GB" dirty="0" smtClean="0"/>
-              <a:t>Low</a:t>
-            </a:r>
-            <a:endParaRPr lang="en-GB" dirty="0"/>
-          </a:p>
-        </p:txBody>
-      </p:sp>
-    </p:spTree>
-  </p:cSld>
-  <p:clrMapOvr>
-    <a:masterClrMapping/>
-  </p:clrMapOvr>
-  <p:timing>
-    <p:tnLst>
-      <p:par>
-        <p:cTn id="1" dur="indefinite" restart="never" nodeType="tmRoot"/>
-      </p:par>
-    </p:tnLst>
-  </p:timing>
-</p:sld>
-</file>
-
-<file path=ppt/slides/slide7.xml><?xml version="1.0" encoding="utf-8"?>
 <p:sld xmlns:a="http://schemas.openxmlformats.org/drawingml/2006/main" xmlns:r="http://schemas.openxmlformats.org/officeDocument/2006/relationships" xmlns:p="http://schemas.openxmlformats.org/presentationml/2006/main">
   <p:cSld>
     <p:spTree>
@@ -7143,7 +6875,7 @@
       </p:sp>
       <p:sp>
         <p:nvSpPr>
-          <p:cNvPr id="21" name="Dodecagon 20"/>
+          <p:cNvPr id="18" name="Dodecagon 17"/>
           <p:cNvSpPr/>
           <p:nvPr/>
         </p:nvSpPr>
@@ -7156,8 +6888,9 @@
             <a:avLst/>
           </a:prstGeom>
           <a:solidFill>
-            <a:schemeClr val="accent3">
-              <a:lumMod val="50000"/>
+            <a:schemeClr val="bg1">
+              <a:lumMod val="85000"/>
+              <a:lumOff val="15000"/>
             </a:schemeClr>
           </a:solidFill>
         </p:spPr>
@@ -7184,13 +6917,221 @@
             <a:pPr algn="ctr"/>
             <a:r>
               <a:rPr lang="en-GB" dirty="0" smtClean="0"/>
-              <a:t>Low</a:t>
+              <a:t>No</a:t>
             </a:r>
             <a:endParaRPr lang="en-GB" dirty="0"/>
           </a:p>
         </p:txBody>
       </p:sp>
     </p:spTree>
+  </p:cSld>
+  <p:clrMapOvr>
+    <a:masterClrMapping/>
+  </p:clrMapOvr>
+  <p:timing>
+    <p:tnLst>
+      <p:par>
+        <p:cTn id="1" dur="indefinite" restart="never" nodeType="tmRoot"/>
+      </p:par>
+    </p:tnLst>
+  </p:timing>
+</p:sld>
+</file>
+
+<file path=ppt/slides/slide7.xml><?xml version="1.0" encoding="utf-8"?>
+<p:sld xmlns:a="http://schemas.openxmlformats.org/drawingml/2006/main" xmlns:r="http://schemas.openxmlformats.org/officeDocument/2006/relationships" xmlns:p="http://schemas.openxmlformats.org/presentationml/2006/main">
+  <p:cSld>
+    <p:spTree>
+      <p:nvGrpSpPr>
+        <p:cNvPr id="1" name=""/>
+        <p:cNvGrpSpPr/>
+        <p:nvPr/>
+      </p:nvGrpSpPr>
+      <p:grpSpPr>
+        <a:xfrm>
+          <a:off x="0" y="0"/>
+          <a:ext cx="0" cy="0"/>
+          <a:chOff x="0" y="0"/>
+          <a:chExt cx="0" cy="0"/>
+        </a:xfrm>
+      </p:grpSpPr>
+      <p:sp>
+        <p:nvSpPr>
+          <p:cNvPr id="2" name="Title 1"/>
+          <p:cNvSpPr>
+            <a:spLocks noGrp="1"/>
+          </p:cNvSpPr>
+          <p:nvPr>
+            <p:ph type="title"/>
+          </p:nvPr>
+        </p:nvSpPr>
+        <p:spPr/>
+        <p:txBody>
+          <a:bodyPr/>
+          <a:lstStyle/>
+          <a:p>
+            <a:r>
+              <a:rPr lang="en-GB" dirty="0" smtClean="0"/>
+              <a:t>URL Classification</a:t>
+            </a:r>
+            <a:endParaRPr lang="en-GB" dirty="0"/>
+          </a:p>
+        </p:txBody>
+      </p:sp>
+      <p:sp>
+        <p:nvSpPr>
+          <p:cNvPr id="3" name="Content Placeholder 2"/>
+          <p:cNvSpPr>
+            <a:spLocks noGrp="1"/>
+          </p:cNvSpPr>
+          <p:nvPr>
+            <p:ph idx="1"/>
+          </p:nvPr>
+        </p:nvSpPr>
+        <p:spPr/>
+        <p:txBody>
+          <a:bodyPr>
+            <a:normAutofit fontScale="92500" lnSpcReduction="20000"/>
+          </a:bodyPr>
+          <a:lstStyle/>
+          <a:p>
+            <a:r>
+              <a:rPr lang="en-GB" dirty="0"/>
+              <a:t>Two machine-learning methods applied in classification algorithm:</a:t>
+            </a:r>
+          </a:p>
+          <a:p>
+            <a:pPr lvl="0"/>
+            <a:r>
+              <a:rPr lang="en-GB" dirty="0" err="1"/>
+              <a:t>Levenshtein</a:t>
+            </a:r>
+            <a:r>
+              <a:rPr lang="en-GB" dirty="0"/>
+              <a:t> distance</a:t>
+            </a:r>
+          </a:p>
+          <a:p>
+            <a:pPr lvl="1"/>
+            <a:r>
+              <a:rPr lang="en-GB" dirty="0"/>
+              <a:t>String metric for measuring the difference between two sequences</a:t>
+            </a:r>
+          </a:p>
+          <a:p>
+            <a:pPr lvl="1"/>
+            <a:r>
+              <a:rPr lang="en-GB" dirty="0"/>
+              <a:t>Minimum number of edits needed to transform one string into the other</a:t>
+            </a:r>
+          </a:p>
+          <a:p>
+            <a:pPr lvl="0"/>
+            <a:r>
+              <a:rPr lang="en-GB" dirty="0"/>
+              <a:t>K-mean Clustering </a:t>
+            </a:r>
+          </a:p>
+          <a:p>
+            <a:pPr lvl="1"/>
+            <a:r>
+              <a:rPr lang="en-GB" dirty="0"/>
+              <a:t>Data mining</a:t>
+            </a:r>
+          </a:p>
+          <a:p>
+            <a:pPr lvl="1"/>
+            <a:r>
+              <a:rPr lang="en-GB" dirty="0"/>
+              <a:t>Partition </a:t>
+            </a:r>
+            <a:r>
+              <a:rPr lang="en-GB" i="1" dirty="0"/>
+              <a:t>n</a:t>
+            </a:r>
+            <a:r>
+              <a:rPr lang="en-GB" dirty="0"/>
+              <a:t> observations into </a:t>
+            </a:r>
+            <a:r>
+              <a:rPr lang="en-GB" i="1" dirty="0"/>
+              <a:t>k</a:t>
+            </a:r>
+            <a:r>
+              <a:rPr lang="en-GB" dirty="0"/>
+              <a:t> clusters</a:t>
+            </a:r>
+          </a:p>
+          <a:p>
+            <a:pPr lvl="1"/>
+            <a:r>
+              <a:rPr lang="en-GB" dirty="0"/>
+              <a:t>Applicable on large amount of </a:t>
+            </a:r>
+            <a:r>
+              <a:rPr lang="en-GB" dirty="0" smtClean="0"/>
+              <a:t>data</a:t>
+            </a:r>
+            <a:endParaRPr lang="en-GB" dirty="0"/>
+          </a:p>
+        </p:txBody>
+      </p:sp>
+      <p:sp>
+        <p:nvSpPr>
+          <p:cNvPr id="6" name="Dodecagon 5"/>
+          <p:cNvSpPr/>
+          <p:nvPr/>
+        </p:nvSpPr>
+        <p:spPr>
+          <a:xfrm>
+            <a:off x="8028384" y="5805264"/>
+            <a:ext cx="864096" cy="864096"/>
+          </a:xfrm>
+          <a:prstGeom prst="dodecagon">
+            <a:avLst/>
+          </a:prstGeom>
+          <a:solidFill>
+            <a:schemeClr val="bg1">
+              <a:lumMod val="85000"/>
+              <a:lumOff val="15000"/>
+            </a:schemeClr>
+          </a:solidFill>
+        </p:spPr>
+        <p:style>
+          <a:lnRef idx="2">
+            <a:schemeClr val="accent1">
+              <a:shade val="50000"/>
+            </a:schemeClr>
+          </a:lnRef>
+          <a:fillRef idx="1">
+            <a:schemeClr val="accent1"/>
+          </a:fillRef>
+          <a:effectRef idx="0">
+            <a:schemeClr val="accent1"/>
+          </a:effectRef>
+          <a:fontRef idx="minor">
+            <a:schemeClr val="lt1"/>
+          </a:fontRef>
+        </p:style>
+        <p:txBody>
+          <a:bodyPr rtlCol="0" anchor="ctr"/>
+          <a:lstStyle/>
+          <a:p>
+            <a:pPr algn="ctr"/>
+            <a:r>
+              <a:rPr lang="en-GB" dirty="0" smtClean="0"/>
+              <a:t>No</a:t>
+            </a:r>
+            <a:endParaRPr lang="en-GB" dirty="0"/>
+          </a:p>
+        </p:txBody>
+      </p:sp>
+    </p:spTree>
+    <p:extLst>
+      <p:ext uri="{BB962C8B-B14F-4D97-AF65-F5344CB8AC3E}">
+        <p14:creationId xmlns="" xmlns:p14="http://schemas.microsoft.com/office/powerpoint/2010/main" val="372575986"/>
+      </p:ext>
+    </p:extLst>
   </p:cSld>
   <p:clrMapOvr>
     <a:masterClrMapping/>
@@ -7239,7 +7180,7 @@
           <a:p>
             <a:r>
               <a:rPr lang="en-GB" dirty="0" smtClean="0"/>
-              <a:t>URL Classification</a:t>
+              <a:t>HTML Scanning</a:t>
             </a:r>
             <a:endParaRPr lang="en-GB" dirty="0"/>
           </a:p>
@@ -7258,86 +7199,89 @@
         <p:spPr/>
         <p:txBody>
           <a:bodyPr>
-            <a:normAutofit fontScale="92500" lnSpcReduction="20000"/>
+            <a:normAutofit/>
           </a:bodyPr>
           <a:lstStyle/>
           <a:p>
             <a:r>
               <a:rPr lang="en-GB" dirty="0"/>
-              <a:t>Two machine-learning methods applied in classification algorithm:</a:t>
-            </a:r>
-          </a:p>
-          <a:p>
-            <a:pPr lvl="0"/>
-            <a:r>
-              <a:rPr lang="en-GB" dirty="0" err="1"/>
-              <a:t>Levenshtein</a:t>
+              <a:t>Malware detection based on repetition of the </a:t>
+            </a:r>
+            <a:r>
+              <a:rPr lang="en-GB" dirty="0" smtClean="0"/>
+              <a:t>trending </a:t>
             </a:r>
             <a:r>
               <a:rPr lang="en-GB" dirty="0"/>
-              <a:t> distance</a:t>
-            </a:r>
+              <a:t>keyword</a:t>
+            </a:r>
+            <a:r>
+              <a:rPr lang="en-GB" dirty="0" smtClean="0"/>
+              <a:t>:</a:t>
+            </a:r>
+            <a:endParaRPr lang="en-GB" dirty="0"/>
           </a:p>
           <a:p>
             <a:pPr lvl="1"/>
             <a:r>
+              <a:rPr lang="en-GB" dirty="0" smtClean="0"/>
+              <a:t>Analyse </a:t>
+            </a:r>
+            <a:r>
               <a:rPr lang="en-GB" dirty="0"/>
-              <a:t>String metric for measuring the difference between two sequences</a:t>
-            </a:r>
+              <a:t>the content of the given </a:t>
+            </a:r>
+            <a:r>
+              <a:rPr lang="en-GB" dirty="0" smtClean="0"/>
+              <a:t>URL</a:t>
+            </a:r>
+            <a:endParaRPr lang="en-GB" dirty="0"/>
           </a:p>
           <a:p>
             <a:pPr lvl="1"/>
             <a:r>
+              <a:rPr lang="en-GB" dirty="0" smtClean="0"/>
+              <a:t>Also check </a:t>
+            </a:r>
+            <a:r>
               <a:rPr lang="en-GB" dirty="0"/>
-              <a:t>Minimum number of edits needed to transform one string into the other</a:t>
-            </a:r>
-          </a:p>
-          <a:p>
-            <a:pPr lvl="0"/>
+              <a:t>content of each hyperlink on the </a:t>
+            </a:r>
+            <a:r>
+              <a:rPr lang="en-GB" dirty="0" smtClean="0"/>
+              <a:t>webpage (Crawling)</a:t>
+            </a:r>
+            <a:endParaRPr lang="en-GB" dirty="0"/>
+          </a:p>
+          <a:p>
+            <a:pPr lvl="1"/>
+            <a:r>
+              <a:rPr lang="en-GB" dirty="0" smtClean="0"/>
+              <a:t>Consider </a:t>
+            </a:r>
             <a:r>
               <a:rPr lang="en-GB" dirty="0"/>
-              <a:t>K-mean Clustering </a:t>
-            </a:r>
+              <a:t>frequently of reappearances of </a:t>
+            </a:r>
+            <a:r>
+              <a:rPr lang="en-GB" dirty="0" smtClean="0"/>
+              <a:t>trending keyword</a:t>
+            </a:r>
+            <a:endParaRPr lang="en-GB" dirty="0"/>
           </a:p>
           <a:p>
             <a:pPr lvl="1"/>
             <a:r>
+              <a:rPr lang="en-GB" dirty="0" smtClean="0"/>
+              <a:t>Used </a:t>
+            </a:r>
+            <a:r>
               <a:rPr lang="en-GB" dirty="0"/>
-              <a:t>Data mining</a:t>
-            </a:r>
-          </a:p>
-          <a:p>
-            <a:pPr lvl="1"/>
-            <a:r>
-              <a:rPr lang="en-GB" dirty="0"/>
-              <a:t>Partition </a:t>
-            </a:r>
-            <a:r>
-              <a:rPr lang="en-GB" i="1" dirty="0"/>
-              <a:t>n</a:t>
-            </a:r>
-            <a:r>
-              <a:rPr lang="en-GB" dirty="0"/>
-              <a:t> observations into </a:t>
-            </a:r>
-            <a:r>
-              <a:rPr lang="en-GB" i="1" dirty="0"/>
-              <a:t>k</a:t>
-            </a:r>
-            <a:r>
-              <a:rPr lang="en-GB" dirty="0"/>
-              <a:t> clusters</a:t>
-            </a:r>
-          </a:p>
-          <a:p>
-            <a:pPr lvl="1"/>
-            <a:r>
-              <a:rPr lang="en-GB" dirty="0"/>
-              <a:t>Applicable on large amount of </a:t>
-            </a:r>
-            <a:r>
-              <a:rPr lang="en-GB" dirty="0" smtClean="0"/>
-              <a:t>data</a:t>
+              <a:t>the result of this algorithm for URL </a:t>
+            </a:r>
+            <a:r>
+              <a:rPr lang="en-GB" dirty="0" smtClean="0"/>
+              <a:t>classification database</a:t>
             </a:r>
             <a:endParaRPr lang="en-GB" dirty="0"/>
           </a:p>
@@ -7345,7 +7289,7 @@
       </p:sp>
       <p:sp>
         <p:nvSpPr>
-          <p:cNvPr id="5" name="Dodecagon 4"/>
+          <p:cNvPr id="6" name="Dodecagon 5"/>
           <p:cNvSpPr/>
           <p:nvPr/>
         </p:nvSpPr>
@@ -7393,11 +7337,6 @@
         </p:txBody>
       </p:sp>
     </p:spTree>
-    <p:extLst>
-      <p:ext uri="{BB962C8B-B14F-4D97-AF65-F5344CB8AC3E}">
-        <p14:creationId xmlns:p14="http://schemas.microsoft.com/office/powerpoint/2010/main" xmlns="" val="372575986"/>
-      </p:ext>
-    </p:extLst>
   </p:cSld>
   <p:clrMapOvr>
     <a:masterClrMapping/>
@@ -7464,7 +7403,7 @@
         <p:spPr/>
         <p:txBody>
           <a:bodyPr>
-            <a:normAutofit fontScale="85000" lnSpcReduction="20000"/>
+            <a:normAutofit fontScale="85000" lnSpcReduction="10000"/>
           </a:bodyPr>
           <a:lstStyle/>
           <a:p>
@@ -7481,39 +7420,27 @@
           </a:p>
           <a:p>
             <a:r>
+              <a:rPr lang="en-GB" dirty="0" smtClean="0"/>
+              <a:t>“Open </a:t>
+            </a:r>
+            <a:r>
+              <a:rPr lang="en-GB" dirty="0" smtClean="0"/>
+              <a:t>Source Software for running Windows applications on other operating systems</a:t>
+            </a:r>
+            <a:r>
+              <a:rPr lang="en-GB" dirty="0" smtClean="0"/>
+              <a:t>.”</a:t>
+            </a:r>
+            <a:endParaRPr lang="en-GB" dirty="0" smtClean="0"/>
+          </a:p>
+          <a:p>
+            <a:r>
+              <a:rPr lang="en-GB" dirty="0" smtClean="0"/>
+              <a:t>For </a:t>
+            </a:r>
+            <a:r>
               <a:rPr lang="en-GB" dirty="0"/>
-              <a:t>Wine is a </a:t>
-            </a:r>
-            <a:r>
-              <a:rPr lang="en-GB" dirty="0" smtClean="0"/>
-              <a:t>reimplementation of the </a:t>
-            </a:r>
-            <a:r>
-              <a:rPr lang="en-GB" dirty="0" smtClean="0"/>
-              <a:t>Windows architecture </a:t>
-            </a:r>
-            <a:r>
-              <a:rPr lang="en-GB" dirty="0" smtClean="0"/>
-              <a:t>for </a:t>
-            </a:r>
-            <a:r>
-              <a:rPr lang="en-GB" dirty="0"/>
-              <a:t>running Windows applications on </a:t>
-            </a:r>
-            <a:r>
-              <a:rPr lang="en-GB" dirty="0" smtClean="0"/>
-              <a:t>other OSs</a:t>
-            </a:r>
-            <a:r>
-              <a:rPr lang="en-GB" dirty="0" smtClean="0"/>
-              <a:t>.</a:t>
-            </a:r>
-            <a:endParaRPr lang="en-GB" dirty="0"/>
-          </a:p>
-          <a:p>
-            <a:r>
-              <a:rPr lang="en-GB" dirty="0"/>
-              <a:t>For each suspicious URL we create an isolated </a:t>
+              <a:t>each suspicious URL we create an isolated </a:t>
             </a:r>
             <a:r>
               <a:rPr lang="en-GB" dirty="0" smtClean="0"/>
@@ -7533,11 +7460,7 @@
             </a:r>
             <a:r>
               <a:rPr lang="en-GB" dirty="0" smtClean="0"/>
-              <a:t>within it</a:t>
-            </a:r>
-            <a:r>
-              <a:rPr lang="en-GB" dirty="0" smtClean="0"/>
-              <a:t>. </a:t>
+              <a:t>within it. </a:t>
             </a:r>
             <a:endParaRPr lang="en-GB" dirty="0"/>
           </a:p>
@@ -7566,9 +7489,6 @@
               <a:rPr lang="en-GB" dirty="0"/>
               <a:t>to ensure consistency of results. </a:t>
             </a:r>
-          </a:p>
-          <a:p>
-            <a:endParaRPr lang="en-GB" dirty="0"/>
           </a:p>
         </p:txBody>
       </p:sp>
@@ -7624,7 +7544,7 @@
     </p:spTree>
     <p:extLst>
       <p:ext uri="{BB962C8B-B14F-4D97-AF65-F5344CB8AC3E}">
-        <p14:creationId xmlns:p14="http://schemas.microsoft.com/office/powerpoint/2010/main" xmlns="" val="352985116"/>
+        <p14:creationId xmlns="" xmlns:p14="http://schemas.microsoft.com/office/powerpoint/2010/main" val="352985116"/>
       </p:ext>
     </p:extLst>
   </p:cSld>

</xml_diff>